<commit_message>
felkészülés a második bemutatóra!
</commit_message>
<xml_diff>
--- a/2_bemutato.pptx
+++ b/2_bemutato.pptx
@@ -117,6 +117,22 @@
       </a:defRPr>
     </a:lvl9pPr>
   </p:defaultTextStyle>
+  <p:extLst>
+    <p:ext uri="{EFAFB233-063F-42B5-8137-9DF3F51BA10A}">
+      <p15:sldGuideLst xmlns:p15="http://schemas.microsoft.com/office/powerpoint/2012/main">
+        <p15:guide id="1" orient="horz" pos="2160">
+          <p15:clr>
+            <a:srgbClr val="A4A3A4"/>
+          </p15:clr>
+        </p15:guide>
+        <p15:guide id="2" pos="2880">
+          <p15:clr>
+            <a:srgbClr val="A4A3A4"/>
+          </p15:clr>
+        </p15:guide>
+      </p15:sldGuideLst>
+    </p:ext>
+  </p:extLst>
 </p:presentation>
 </file>
 
@@ -4593,7 +4609,7 @@
 <dgm:dataModel xmlns:dgm="http://schemas.openxmlformats.org/drawingml/2006/diagram" xmlns:a="http://schemas.openxmlformats.org/drawingml/2006/main">
   <dgm:ptLst>
     <dgm:pt modelId="{AE6B133A-6205-43D9-80BC-6B2EE320F44E}" type="doc">
-      <dgm:prSet loTypeId="urn:microsoft.com/office/officeart/2008/layout/CircleAccentTimeline" loCatId="process" qsTypeId="urn:microsoft.com/office/officeart/2005/8/quickstyle/simple1" qsCatId="simple" csTypeId="urn:microsoft.com/office/officeart/2005/8/colors/colorful4" csCatId="colorful" phldr="1"/>
+      <dgm:prSet loTypeId="urn:microsoft.com/office/officeart/2005/8/layout/chevron2" loCatId="process" qsTypeId="urn:microsoft.com/office/officeart/2005/8/quickstyle/simple1" qsCatId="simple" csTypeId="urn:microsoft.com/office/officeart/2005/8/colors/colorful4" csCatId="colorful" phldr="1"/>
       <dgm:spPr/>
       <dgm:t>
         <a:bodyPr/>
@@ -4651,7 +4667,6 @@
             <a:rPr lang="hu-HU" dirty="0" smtClean="0"/>
             <a:t>Március</a:t>
           </a:r>
-          <a:endParaRPr lang="hu-HU" dirty="0" smtClean="0"/>
         </a:p>
       </dgm:t>
     </dgm:pt>
@@ -4687,7 +4702,11 @@
           <a:pPr algn="l"/>
           <a:r>
             <a:rPr lang="hu-HU" sz="1600" dirty="0" smtClean="0"/>
-            <a:t>back end fejlesztése </a:t>
+            <a:t>back end </a:t>
+          </a:r>
+          <a:r>
+            <a:rPr lang="hu-HU" sz="1600" dirty="0" smtClean="0"/>
+            <a:t>fejlesztése</a:t>
           </a:r>
           <a:endParaRPr lang="hu-HU" sz="1600" dirty="0" smtClean="0"/>
         </a:p>
@@ -4727,7 +4746,6 @@
             <a:rPr lang="hu-HU" sz="1600" dirty="0" smtClean="0"/>
             <a:t>javítások és funkciók </a:t>
           </a:r>
-          <a:endParaRPr lang="hu-HU" sz="1600" dirty="0" smtClean="0"/>
         </a:p>
       </dgm:t>
     </dgm:pt>
@@ -4764,7 +4782,6 @@
             <a:rPr lang="hu-HU" dirty="0" smtClean="0"/>
             <a:t>Április</a:t>
           </a:r>
-          <a:endParaRPr lang="hu-HU" dirty="0" smtClean="0"/>
         </a:p>
       </dgm:t>
     </dgm:pt>
@@ -4881,7 +4898,6 @@
             <a:rPr lang="hu-HU" sz="1600" dirty="0" smtClean="0"/>
             <a:t> szolgáltató</a:t>
           </a:r>
-          <a:endParaRPr lang="hu-HU" sz="1600" dirty="0" smtClean="0"/>
         </a:p>
       </dgm:t>
     </dgm:pt>
@@ -4920,8 +4936,8 @@
             <a:t>bemutató és </a:t>
           </a:r>
           <a:r>
-            <a:rPr lang="hu-HU" sz="1600" dirty="0" err="1" smtClean="0"/>
-            <a:t>dokumen-táció</a:t>
+            <a:rPr lang="hu-HU" sz="1600" dirty="0" smtClean="0"/>
+            <a:t>dokumentáció</a:t>
           </a:r>
           <a:endParaRPr lang="hu-HU" sz="1600" dirty="0" smtClean="0"/>
         </a:p>
@@ -4962,12 +4978,8 @@
             <a:t>a tervek </a:t>
           </a:r>
           <a:r>
-            <a:rPr lang="hu-HU" sz="1600" dirty="0" err="1" smtClean="0"/>
-            <a:t>megvalósí-tása</a:t>
-          </a:r>
-          <a:r>
             <a:rPr lang="hu-HU" sz="1600" dirty="0" smtClean="0"/>
-            <a:t> </a:t>
+            <a:t>megvalósítása </a:t>
           </a:r>
           <a:endParaRPr lang="hu-HU" sz="1600" dirty="0" smtClean="0"/>
         </a:p>
@@ -5008,8 +5020,8 @@
             <a:t>második prezentáció és </a:t>
           </a:r>
           <a:r>
-            <a:rPr lang="hu-HU" sz="1600" dirty="0" err="1" smtClean="0"/>
-            <a:t>dokumentá-ció</a:t>
+            <a:rPr lang="hu-HU" sz="1600" dirty="0" smtClean="0"/>
+            <a:t>dokumentáció</a:t>
           </a:r>
           <a:endParaRPr lang="hu-HU" sz="1600" dirty="0"/>
         </a:p>
@@ -5037,24 +5049,28 @@
         </a:p>
       </dgm:t>
     </dgm:pt>
-    <dgm:pt modelId="{16B0D3DC-6FA4-4217-86F4-1DADEB1EC43B}" type="pres">
-      <dgm:prSet presAssocID="{AE6B133A-6205-43D9-80BC-6B2EE320F44E}" presName="Name0" presStyleCnt="0">
-        <dgm:presLayoutVars>
-          <dgm:dir/>
-        </dgm:presLayoutVars>
-      </dgm:prSet>
+    <dgm:pt modelId="{D32F9420-C203-4C46-B1E3-6C0FE9FE1920}">
+      <dgm:prSet custT="1"/>
       <dgm:spPr/>
+      <dgm:t>
+        <a:bodyPr/>
+        <a:lstStyle/>
+        <a:p>
+          <a:pPr algn="l"/>
+          <a:r>
+            <a:rPr lang="hu-HU" sz="1600" dirty="0" err="1" smtClean="0"/>
+            <a:t>Reszponzívvá</a:t>
+          </a:r>
+          <a:r>
+            <a:rPr lang="hu-HU" sz="1600" dirty="0" smtClean="0"/>
+            <a:t> tétel </a:t>
+          </a:r>
+          <a:endParaRPr lang="hu-HU" sz="1600" dirty="0" smtClean="0"/>
+        </a:p>
+      </dgm:t>
     </dgm:pt>
-    <dgm:pt modelId="{79FB4AC3-A60E-4F2C-AFD7-E5833D4BF772}" type="pres">
-      <dgm:prSet presAssocID="{1C9CECCB-50DE-4D2B-99D5-ABA29B35DFBC}" presName="parComposite" presStyleCnt="0"/>
-      <dgm:spPr/>
-    </dgm:pt>
-    <dgm:pt modelId="{1F756714-37B5-4F75-A247-8FE45784CABC}" type="pres">
-      <dgm:prSet presAssocID="{1C9CECCB-50DE-4D2B-99D5-ABA29B35DFBC}" presName="parBigCircle" presStyleLbl="node0" presStyleIdx="0" presStyleCnt="4"/>
-      <dgm:spPr/>
-    </dgm:pt>
-    <dgm:pt modelId="{177BF0D3-F856-494A-AFF5-D888C0EEA0CF}" type="pres">
-      <dgm:prSet presAssocID="{1C9CECCB-50DE-4D2B-99D5-ABA29B35DFBC}" presName="parTx" presStyleLbl="revTx" presStyleIdx="0" presStyleCnt="18"/>
+    <dgm:pt modelId="{E6D7AEF9-8A6F-4EDF-A803-0CCE2704BFF0}" type="parTrans" cxnId="{FCC42658-BE1C-47D9-B89A-82D5091CF4AE}">
+      <dgm:prSet/>
       <dgm:spPr/>
       <dgm:t>
         <a:bodyPr/>
@@ -5064,88 +5080,8 @@
         </a:p>
       </dgm:t>
     </dgm:pt>
-    <dgm:pt modelId="{51068F1D-C5A5-47A5-AD7E-E01C8D8235FB}" type="pres">
-      <dgm:prSet presAssocID="{1C9CECCB-50DE-4D2B-99D5-ABA29B35DFBC}" presName="bSpace" presStyleCnt="0"/>
-      <dgm:spPr/>
-    </dgm:pt>
-    <dgm:pt modelId="{46553BCB-874D-4778-98DE-84D7FC8AD734}" type="pres">
-      <dgm:prSet presAssocID="{1C9CECCB-50DE-4D2B-99D5-ABA29B35DFBC}" presName="parBackupNorm" presStyleCnt="0"/>
-      <dgm:spPr/>
-    </dgm:pt>
-    <dgm:pt modelId="{8A970F04-869B-4503-A090-5815E909F995}" type="pres">
-      <dgm:prSet presAssocID="{E285B57B-71F9-4070-A7C6-11C825FF1A39}" presName="parSpace" presStyleCnt="0"/>
-      <dgm:spPr/>
-    </dgm:pt>
-    <dgm:pt modelId="{E6780CBD-BBD6-4FD8-B35A-EEEB2C3A1539}" type="pres">
-      <dgm:prSet presAssocID="{A6ED393E-8314-4A72-9590-5BF98C8F7B81}" presName="desBackupLeftNorm" presStyleCnt="0"/>
-      <dgm:spPr/>
-    </dgm:pt>
-    <dgm:pt modelId="{526BB410-0E1C-46D7-8F2B-450733E3C2B4}" type="pres">
-      <dgm:prSet presAssocID="{A6ED393E-8314-4A72-9590-5BF98C8F7B81}" presName="desComposite" presStyleCnt="0"/>
-      <dgm:spPr/>
-    </dgm:pt>
-    <dgm:pt modelId="{7E6FE1E0-EF27-4D9C-807A-D3231675303F}" type="pres">
-      <dgm:prSet presAssocID="{A6ED393E-8314-4A72-9590-5BF98C8F7B81}" presName="desCircle" presStyleLbl="node1" presStyleIdx="0" presStyleCnt="7"/>
-      <dgm:spPr/>
-    </dgm:pt>
-    <dgm:pt modelId="{4FEE82F5-3C15-4E43-B016-E1888271A9C0}" type="pres">
-      <dgm:prSet presAssocID="{A6ED393E-8314-4A72-9590-5BF98C8F7B81}" presName="chTx" presStyleLbl="revTx" presStyleIdx="1" presStyleCnt="18"/>
-      <dgm:spPr/>
-    </dgm:pt>
-    <dgm:pt modelId="{30DC637A-2E1B-44BA-B694-75AFF0A0EBBB}" type="pres">
-      <dgm:prSet presAssocID="{A6ED393E-8314-4A72-9590-5BF98C8F7B81}" presName="desTx" presStyleLbl="revTx" presStyleIdx="2" presStyleCnt="18">
-        <dgm:presLayoutVars>
-          <dgm:bulletEnabled val="1"/>
-        </dgm:presLayoutVars>
-      </dgm:prSet>
-      <dgm:spPr/>
-    </dgm:pt>
-    <dgm:pt modelId="{E9A5FB67-A270-4022-83FF-EF79B8824638}" type="pres">
-      <dgm:prSet presAssocID="{A6ED393E-8314-4A72-9590-5BF98C8F7B81}" presName="desBackupRightNorm" presStyleCnt="0"/>
-      <dgm:spPr/>
-    </dgm:pt>
-    <dgm:pt modelId="{74A41939-1E0C-4A85-A507-B4206C685724}" type="pres">
-      <dgm:prSet presAssocID="{07750E72-A0D5-49FE-AA95-56BAAFAE4365}" presName="desSpace" presStyleCnt="0"/>
-      <dgm:spPr/>
-    </dgm:pt>
-    <dgm:pt modelId="{279C9357-D8FF-43A5-B5C3-7EA0CE62A389}" type="pres">
-      <dgm:prSet presAssocID="{9B6009A0-34DD-41BE-85D6-1DCA9D912DDD}" presName="parComposite" presStyleCnt="0"/>
-      <dgm:spPr/>
-    </dgm:pt>
-    <dgm:pt modelId="{6FF362DB-B871-4752-B158-37ED7CD74FE6}" type="pres">
-      <dgm:prSet presAssocID="{9B6009A0-34DD-41BE-85D6-1DCA9D912DDD}" presName="parBigCircle" presStyleLbl="node0" presStyleIdx="1" presStyleCnt="4"/>
-      <dgm:spPr/>
-    </dgm:pt>
-    <dgm:pt modelId="{55655EFE-21DF-4952-8611-EAB8177F831B}" type="pres">
-      <dgm:prSet presAssocID="{9B6009A0-34DD-41BE-85D6-1DCA9D912DDD}" presName="parTx" presStyleLbl="revTx" presStyleIdx="3" presStyleCnt="18"/>
-      <dgm:spPr/>
-    </dgm:pt>
-    <dgm:pt modelId="{23DC08B4-FD19-46C0-8FBA-BCEFB7C507DD}" type="pres">
-      <dgm:prSet presAssocID="{9B6009A0-34DD-41BE-85D6-1DCA9D912DDD}" presName="bSpace" presStyleCnt="0"/>
-      <dgm:spPr/>
-    </dgm:pt>
-    <dgm:pt modelId="{3B14F69C-1211-4B1C-8662-9FC376167917}" type="pres">
-      <dgm:prSet presAssocID="{9B6009A0-34DD-41BE-85D6-1DCA9D912DDD}" presName="parBackupNorm" presStyleCnt="0"/>
-      <dgm:spPr/>
-    </dgm:pt>
-    <dgm:pt modelId="{BA524F52-4F95-4BA6-B2B4-27A4FD2A6A4D}" type="pres">
-      <dgm:prSet presAssocID="{8A4C909D-1D3B-47B8-8349-1D301929092B}" presName="parSpace" presStyleCnt="0"/>
-      <dgm:spPr/>
-    </dgm:pt>
-    <dgm:pt modelId="{F965CA72-4EE4-490C-9889-8749CFBC0901}" type="pres">
-      <dgm:prSet presAssocID="{96394EB0-09C2-4771-A560-951C52E002D5}" presName="desBackupLeftNorm" presStyleCnt="0"/>
-      <dgm:spPr/>
-    </dgm:pt>
-    <dgm:pt modelId="{6E87F1D0-370E-4416-B8BD-EBC80807F355}" type="pres">
-      <dgm:prSet presAssocID="{96394EB0-09C2-4771-A560-951C52E002D5}" presName="desComposite" presStyleCnt="0"/>
-      <dgm:spPr/>
-    </dgm:pt>
-    <dgm:pt modelId="{96B4C896-39C7-45C3-8550-AC773C9A805F}" type="pres">
-      <dgm:prSet presAssocID="{96394EB0-09C2-4771-A560-951C52E002D5}" presName="desCircle" presStyleLbl="node1" presStyleIdx="1" presStyleCnt="7"/>
-      <dgm:spPr/>
-    </dgm:pt>
-    <dgm:pt modelId="{5DDD4FD9-7081-4AE1-9FAA-B3A90AA4BFED}" type="pres">
-      <dgm:prSet presAssocID="{96394EB0-09C2-4771-A560-951C52E002D5}" presName="chTx" presStyleLbl="revTx" presStyleIdx="4" presStyleCnt="18"/>
+    <dgm:pt modelId="{F78A7A50-485B-47BA-B0D3-0BD30116DB2E}" type="sibTrans" cxnId="{FCC42658-BE1C-47D9-B89A-82D5091CF4AE}">
+      <dgm:prSet/>
       <dgm:spPr/>
       <dgm:t>
         <a:bodyPr/>
@@ -5155,36 +5091,14 @@
         </a:p>
       </dgm:t>
     </dgm:pt>
-    <dgm:pt modelId="{E5F96A21-45DA-4792-B61A-7BE86BC82BA2}" type="pres">
-      <dgm:prSet presAssocID="{96394EB0-09C2-4771-A560-951C52E002D5}" presName="desTx" presStyleLbl="revTx" presStyleIdx="5" presStyleCnt="18">
+    <dgm:pt modelId="{4CD21B61-05A5-4875-AD76-993982BA655F}" type="pres">
+      <dgm:prSet presAssocID="{AE6B133A-6205-43D9-80BC-6B2EE320F44E}" presName="linearFlow" presStyleCnt="0">
         <dgm:presLayoutVars>
-          <dgm:bulletEnabled val="1"/>
+          <dgm:dir/>
+          <dgm:animLvl val="lvl"/>
+          <dgm:resizeHandles val="exact"/>
         </dgm:presLayoutVars>
       </dgm:prSet>
-      <dgm:spPr/>
-    </dgm:pt>
-    <dgm:pt modelId="{FD746EF9-CDCF-4778-9A9B-A62114672503}" type="pres">
-      <dgm:prSet presAssocID="{96394EB0-09C2-4771-A560-951C52E002D5}" presName="desBackupRightNorm" presStyleCnt="0"/>
-      <dgm:spPr/>
-    </dgm:pt>
-    <dgm:pt modelId="{393942AF-6575-48F2-9D35-64A6A89FF419}" type="pres">
-      <dgm:prSet presAssocID="{66058863-F3E9-4CB1-BB43-7CD66CBEFBBD}" presName="desSpace" presStyleCnt="0"/>
-      <dgm:spPr/>
-    </dgm:pt>
-    <dgm:pt modelId="{18587857-50AE-4E71-8714-5990294E0BD9}" type="pres">
-      <dgm:prSet presAssocID="{2F79A582-958F-481C-86CD-02535DF8A91B}" presName="desBackupLeftNorm" presStyleCnt="0"/>
-      <dgm:spPr/>
-    </dgm:pt>
-    <dgm:pt modelId="{92326C54-44F4-46F3-82C9-56B026F65B24}" type="pres">
-      <dgm:prSet presAssocID="{2F79A582-958F-481C-86CD-02535DF8A91B}" presName="desComposite" presStyleCnt="0"/>
-      <dgm:spPr/>
-    </dgm:pt>
-    <dgm:pt modelId="{0FC2D113-702D-40D6-82BE-F042188D80B6}" type="pres">
-      <dgm:prSet presAssocID="{2F79A582-958F-481C-86CD-02535DF8A91B}" presName="desCircle" presStyleLbl="node1" presStyleIdx="2" presStyleCnt="7"/>
-      <dgm:spPr/>
-    </dgm:pt>
-    <dgm:pt modelId="{331D9851-285C-46A6-882D-715632A19BC9}" type="pres">
-      <dgm:prSet presAssocID="{2F79A582-958F-481C-86CD-02535DF8A91B}" presName="chTx" presStyleLbl="revTx" presStyleIdx="6" presStyleCnt="18"/>
       <dgm:spPr/>
       <dgm:t>
         <a:bodyPr/>
@@ -5194,36 +5108,17 @@
         </a:p>
       </dgm:t>
     </dgm:pt>
-    <dgm:pt modelId="{87CBAF4E-E538-4A21-BFED-F910E33AA535}" type="pres">
-      <dgm:prSet presAssocID="{2F79A582-958F-481C-86CD-02535DF8A91B}" presName="desTx" presStyleLbl="revTx" presStyleIdx="7" presStyleCnt="18">
+    <dgm:pt modelId="{4F586563-9A1F-4FA0-B7F3-AA102BBBC85A}" type="pres">
+      <dgm:prSet presAssocID="{1C9CECCB-50DE-4D2B-99D5-ABA29B35DFBC}" presName="composite" presStyleCnt="0"/>
+      <dgm:spPr/>
+    </dgm:pt>
+    <dgm:pt modelId="{66245363-1E46-4D66-8535-2E93FB394B99}" type="pres">
+      <dgm:prSet presAssocID="{1C9CECCB-50DE-4D2B-99D5-ABA29B35DFBC}" presName="parentText" presStyleLbl="alignNode1" presStyleIdx="0" presStyleCnt="4">
         <dgm:presLayoutVars>
+          <dgm:chMax val="1"/>
           <dgm:bulletEnabled val="1"/>
         </dgm:presLayoutVars>
       </dgm:prSet>
-      <dgm:spPr/>
-    </dgm:pt>
-    <dgm:pt modelId="{ABEAA64D-C1F7-4636-A754-93670C8E7C9C}" type="pres">
-      <dgm:prSet presAssocID="{2F79A582-958F-481C-86CD-02535DF8A91B}" presName="desBackupRightNorm" presStyleCnt="0"/>
-      <dgm:spPr/>
-    </dgm:pt>
-    <dgm:pt modelId="{02833FA8-0E91-433F-B751-BFAA79260A66}" type="pres">
-      <dgm:prSet presAssocID="{205EFCFB-D476-4A1D-A0B4-73432D3E9C22}" presName="desSpace" presStyleCnt="0"/>
-      <dgm:spPr/>
-    </dgm:pt>
-    <dgm:pt modelId="{50D8D37F-2D28-425A-AF93-03113762E601}" type="pres">
-      <dgm:prSet presAssocID="{BDF70A35-FA81-4308-8130-B3D271844A7C}" presName="desBackupLeftNorm" presStyleCnt="0"/>
-      <dgm:spPr/>
-    </dgm:pt>
-    <dgm:pt modelId="{30CD2911-BEC0-441B-818C-C2F6222BD109}" type="pres">
-      <dgm:prSet presAssocID="{BDF70A35-FA81-4308-8130-B3D271844A7C}" presName="desComposite" presStyleCnt="0"/>
-      <dgm:spPr/>
-    </dgm:pt>
-    <dgm:pt modelId="{75779121-453E-4240-9A7A-00802073DDAD}" type="pres">
-      <dgm:prSet presAssocID="{BDF70A35-FA81-4308-8130-B3D271844A7C}" presName="desCircle" presStyleLbl="node1" presStyleIdx="3" presStyleCnt="7"/>
-      <dgm:spPr/>
-    </dgm:pt>
-    <dgm:pt modelId="{75E59408-38EA-485E-9E84-322A427117FB}" type="pres">
-      <dgm:prSet presAssocID="{BDF70A35-FA81-4308-8130-B3D271844A7C}" presName="chTx" presStyleLbl="revTx" presStyleIdx="8" presStyleCnt="18" custLinFactNeighborX="1783" custLinFactNeighborY="9076"/>
       <dgm:spPr/>
       <dgm:t>
         <a:bodyPr/>
@@ -5233,60 +5128,12 @@
         </a:p>
       </dgm:t>
     </dgm:pt>
-    <dgm:pt modelId="{A5630AAE-9C7A-4CC1-BD9E-C29457CDC3DC}" type="pres">
-      <dgm:prSet presAssocID="{BDF70A35-FA81-4308-8130-B3D271844A7C}" presName="desTx" presStyleLbl="revTx" presStyleIdx="9" presStyleCnt="18">
+    <dgm:pt modelId="{EC82F665-CD99-47BC-8883-8DFECEA12D39}" type="pres">
+      <dgm:prSet presAssocID="{1C9CECCB-50DE-4D2B-99D5-ABA29B35DFBC}" presName="descendantText" presStyleLbl="alignAcc1" presStyleIdx="0" presStyleCnt="4">
         <dgm:presLayoutVars>
           <dgm:bulletEnabled val="1"/>
         </dgm:presLayoutVars>
       </dgm:prSet>
-      <dgm:spPr/>
-    </dgm:pt>
-    <dgm:pt modelId="{CE359063-8473-4036-B86C-DD7F6F1D40E0}" type="pres">
-      <dgm:prSet presAssocID="{BDF70A35-FA81-4308-8130-B3D271844A7C}" presName="desBackupRightNorm" presStyleCnt="0"/>
-      <dgm:spPr/>
-    </dgm:pt>
-    <dgm:pt modelId="{0CE675AC-71F4-454A-ABEC-971CD09ED719}" type="pres">
-      <dgm:prSet presAssocID="{49F73C2E-A8F3-4429-AB84-6AB45279DD4F}" presName="desSpace" presStyleCnt="0"/>
-      <dgm:spPr/>
-    </dgm:pt>
-    <dgm:pt modelId="{9BCE0B24-8E95-47D8-87C0-EBA09A80B24E}" type="pres">
-      <dgm:prSet presAssocID="{DC73ED8C-4FB5-48CE-8E01-CD9C762CDA97}" presName="parComposite" presStyleCnt="0"/>
-      <dgm:spPr/>
-    </dgm:pt>
-    <dgm:pt modelId="{F92B2C29-A84B-44F4-AAA8-FF8A646DA0F5}" type="pres">
-      <dgm:prSet presAssocID="{DC73ED8C-4FB5-48CE-8E01-CD9C762CDA97}" presName="parBigCircle" presStyleLbl="node0" presStyleIdx="2" presStyleCnt="4"/>
-      <dgm:spPr/>
-    </dgm:pt>
-    <dgm:pt modelId="{816A918E-DBFA-40F0-B723-DA3CE7E1F180}" type="pres">
-      <dgm:prSet presAssocID="{DC73ED8C-4FB5-48CE-8E01-CD9C762CDA97}" presName="parTx" presStyleLbl="revTx" presStyleIdx="10" presStyleCnt="18"/>
-      <dgm:spPr/>
-    </dgm:pt>
-    <dgm:pt modelId="{A5EA0166-949A-4854-BC30-77090B2781DA}" type="pres">
-      <dgm:prSet presAssocID="{DC73ED8C-4FB5-48CE-8E01-CD9C762CDA97}" presName="bSpace" presStyleCnt="0"/>
-      <dgm:spPr/>
-    </dgm:pt>
-    <dgm:pt modelId="{728443F6-B69E-4D76-82B5-2902323453D9}" type="pres">
-      <dgm:prSet presAssocID="{DC73ED8C-4FB5-48CE-8E01-CD9C762CDA97}" presName="parBackupNorm" presStyleCnt="0"/>
-      <dgm:spPr/>
-    </dgm:pt>
-    <dgm:pt modelId="{2712391E-8AB6-4817-A693-3701A736A683}" type="pres">
-      <dgm:prSet presAssocID="{7702F005-E044-4498-890A-9D83FBEBAE94}" presName="parSpace" presStyleCnt="0"/>
-      <dgm:spPr/>
-    </dgm:pt>
-    <dgm:pt modelId="{9F7095BF-8226-4337-A7E2-8443B171060C}" type="pres">
-      <dgm:prSet presAssocID="{57B4FFCB-0B6B-4B6C-8A93-745FD68DC668}" presName="desBackupLeftNorm" presStyleCnt="0"/>
-      <dgm:spPr/>
-    </dgm:pt>
-    <dgm:pt modelId="{1D0F86F2-C1C5-4626-B022-5B89C1156003}" type="pres">
-      <dgm:prSet presAssocID="{57B4FFCB-0B6B-4B6C-8A93-745FD68DC668}" presName="desComposite" presStyleCnt="0"/>
-      <dgm:spPr/>
-    </dgm:pt>
-    <dgm:pt modelId="{5CE32B6C-E51C-4BD8-9A88-320303DEB68C}" type="pres">
-      <dgm:prSet presAssocID="{57B4FFCB-0B6B-4B6C-8A93-745FD68DC668}" presName="desCircle" presStyleLbl="node1" presStyleIdx="4" presStyleCnt="7"/>
-      <dgm:spPr/>
-    </dgm:pt>
-    <dgm:pt modelId="{06B6C995-C32D-47A2-B38C-E475342560ED}" type="pres">
-      <dgm:prSet presAssocID="{57B4FFCB-0B6B-4B6C-8A93-745FD68DC668}" presName="chTx" presStyleLbl="revTx" presStyleIdx="11" presStyleCnt="18" custLinFactNeighborX="216" custLinFactNeighborY="9076"/>
       <dgm:spPr/>
       <dgm:t>
         <a:bodyPr/>
@@ -5296,92 +5143,21 @@
         </a:p>
       </dgm:t>
     </dgm:pt>
-    <dgm:pt modelId="{E3D436F3-0708-4ACA-B1EA-24447276246C}" type="pres">
-      <dgm:prSet presAssocID="{57B4FFCB-0B6B-4B6C-8A93-745FD68DC668}" presName="desTx" presStyleLbl="revTx" presStyleIdx="12" presStyleCnt="18">
+    <dgm:pt modelId="{8DAE6EB9-39E5-4D74-9F4A-5F564CF1DB05}" type="pres">
+      <dgm:prSet presAssocID="{E285B57B-71F9-4070-A7C6-11C825FF1A39}" presName="sp" presStyleCnt="0"/>
+      <dgm:spPr/>
+    </dgm:pt>
+    <dgm:pt modelId="{FD1AE64E-5E67-4526-95AF-4485A6790E64}" type="pres">
+      <dgm:prSet presAssocID="{9B6009A0-34DD-41BE-85D6-1DCA9D912DDD}" presName="composite" presStyleCnt="0"/>
+      <dgm:spPr/>
+    </dgm:pt>
+    <dgm:pt modelId="{C8E2BCEB-9701-402B-AA34-DF1DEDC22283}" type="pres">
+      <dgm:prSet presAssocID="{9B6009A0-34DD-41BE-85D6-1DCA9D912DDD}" presName="parentText" presStyleLbl="alignNode1" presStyleIdx="1" presStyleCnt="4">
         <dgm:presLayoutVars>
+          <dgm:chMax val="1"/>
           <dgm:bulletEnabled val="1"/>
         </dgm:presLayoutVars>
       </dgm:prSet>
-      <dgm:spPr/>
-    </dgm:pt>
-    <dgm:pt modelId="{DF5E0343-8BF9-4C32-AB71-AA32163E9E58}" type="pres">
-      <dgm:prSet presAssocID="{57B4FFCB-0B6B-4B6C-8A93-745FD68DC668}" presName="desBackupRightNorm" presStyleCnt="0"/>
-      <dgm:spPr/>
-    </dgm:pt>
-    <dgm:pt modelId="{1B858FF8-1AE3-4EFF-A9C2-C0EBCF32E38B}" type="pres">
-      <dgm:prSet presAssocID="{AD9FAEE0-4900-45E1-B433-781E9E741ECC}" presName="desSpace" presStyleCnt="0"/>
-      <dgm:spPr/>
-    </dgm:pt>
-    <dgm:pt modelId="{E887AA7E-F5AD-44DD-B2DA-B26FA46E226D}" type="pres">
-      <dgm:prSet presAssocID="{93426CB5-072A-4A73-BD60-8562071939E7}" presName="desBackupLeftNorm" presStyleCnt="0"/>
-      <dgm:spPr/>
-    </dgm:pt>
-    <dgm:pt modelId="{5734ED35-A5B0-4222-B778-3804843633D9}" type="pres">
-      <dgm:prSet presAssocID="{93426CB5-072A-4A73-BD60-8562071939E7}" presName="desComposite" presStyleCnt="0"/>
-      <dgm:spPr/>
-    </dgm:pt>
-    <dgm:pt modelId="{D3E8D938-A134-4F99-9B05-5F374ADB3038}" type="pres">
-      <dgm:prSet presAssocID="{93426CB5-072A-4A73-BD60-8562071939E7}" presName="desCircle" presStyleLbl="node1" presStyleIdx="5" presStyleCnt="7"/>
-      <dgm:spPr/>
-    </dgm:pt>
-    <dgm:pt modelId="{F1C34573-A1AD-4553-B6D3-4697A7C89051}" type="pres">
-      <dgm:prSet presAssocID="{93426CB5-072A-4A73-BD60-8562071939E7}" presName="chTx" presStyleLbl="revTx" presStyleIdx="13" presStyleCnt="18" custLinFactNeighborX="40377" custLinFactNeighborY="9076"/>
-      <dgm:spPr/>
-    </dgm:pt>
-    <dgm:pt modelId="{B9C15728-DC26-4D85-ADDE-E80575E2E9EF}" type="pres">
-      <dgm:prSet presAssocID="{93426CB5-072A-4A73-BD60-8562071939E7}" presName="desTx" presStyleLbl="revTx" presStyleIdx="14" presStyleCnt="18">
-        <dgm:presLayoutVars>
-          <dgm:bulletEnabled val="1"/>
-        </dgm:presLayoutVars>
-      </dgm:prSet>
-      <dgm:spPr/>
-    </dgm:pt>
-    <dgm:pt modelId="{0B6E0333-F6A6-4518-8157-04CCCDD39196}" type="pres">
-      <dgm:prSet presAssocID="{93426CB5-072A-4A73-BD60-8562071939E7}" presName="desBackupRightNorm" presStyleCnt="0"/>
-      <dgm:spPr/>
-    </dgm:pt>
-    <dgm:pt modelId="{2F511738-7745-46EC-9305-2653C1BC3E90}" type="pres">
-      <dgm:prSet presAssocID="{E83BF0F2-8E46-41BC-A2A1-061ED100B3D7}" presName="desSpace" presStyleCnt="0"/>
-      <dgm:spPr/>
-    </dgm:pt>
-    <dgm:pt modelId="{85D0B60A-9CBB-46CB-B497-038385B0B419}" type="pres">
-      <dgm:prSet presAssocID="{0921180B-CE79-46F8-8FF5-851177EAF4BB}" presName="parComposite" presStyleCnt="0"/>
-      <dgm:spPr/>
-    </dgm:pt>
-    <dgm:pt modelId="{A018408A-BEDE-4476-B17C-40A4EE127940}" type="pres">
-      <dgm:prSet presAssocID="{0921180B-CE79-46F8-8FF5-851177EAF4BB}" presName="parBigCircle" presStyleLbl="node0" presStyleIdx="3" presStyleCnt="4"/>
-      <dgm:spPr/>
-    </dgm:pt>
-    <dgm:pt modelId="{3F0F2F79-813B-4F6C-AF8C-4AE3BC8E5DE1}" type="pres">
-      <dgm:prSet presAssocID="{0921180B-CE79-46F8-8FF5-851177EAF4BB}" presName="parTx" presStyleLbl="revTx" presStyleIdx="15" presStyleCnt="18"/>
-      <dgm:spPr/>
-    </dgm:pt>
-    <dgm:pt modelId="{46D494A6-8FEA-4D2B-9650-0126701F9F7B}" type="pres">
-      <dgm:prSet presAssocID="{0921180B-CE79-46F8-8FF5-851177EAF4BB}" presName="bSpace" presStyleCnt="0"/>
-      <dgm:spPr/>
-    </dgm:pt>
-    <dgm:pt modelId="{6B10A80C-BB03-4E11-8669-66F1A36CA368}" type="pres">
-      <dgm:prSet presAssocID="{0921180B-CE79-46F8-8FF5-851177EAF4BB}" presName="parBackupNorm" presStyleCnt="0"/>
-      <dgm:spPr/>
-    </dgm:pt>
-    <dgm:pt modelId="{8CBB0B0F-B801-419E-A271-FECA0D38BDB1}" type="pres">
-      <dgm:prSet presAssocID="{75BD6862-8701-4779-BF37-F89CA3E50E97}" presName="parSpace" presStyleCnt="0"/>
-      <dgm:spPr/>
-    </dgm:pt>
-    <dgm:pt modelId="{3219EB3B-0C16-48C7-8E20-ED024ECBC2BF}" type="pres">
-      <dgm:prSet presAssocID="{510EFD7B-1058-437C-8DA9-EF30D565B8C1}" presName="desBackupLeftNorm" presStyleCnt="0"/>
-      <dgm:spPr/>
-    </dgm:pt>
-    <dgm:pt modelId="{718FF79C-3639-445F-A5A2-FE2951A4752A}" type="pres">
-      <dgm:prSet presAssocID="{510EFD7B-1058-437C-8DA9-EF30D565B8C1}" presName="desComposite" presStyleCnt="0"/>
-      <dgm:spPr/>
-    </dgm:pt>
-    <dgm:pt modelId="{70DFB032-A1F1-4FA4-880B-578355A18589}" type="pres">
-      <dgm:prSet presAssocID="{510EFD7B-1058-437C-8DA9-EF30D565B8C1}" presName="desCircle" presStyleLbl="node1" presStyleIdx="6" presStyleCnt="7"/>
-      <dgm:spPr/>
-    </dgm:pt>
-    <dgm:pt modelId="{7CFFD670-DC0B-4A7F-8671-BA53DAD59CF2}" type="pres">
-      <dgm:prSet presAssocID="{510EFD7B-1058-437C-8DA9-EF30D565B8C1}" presName="chTx" presStyleLbl="revTx" presStyleIdx="16" presStyleCnt="18" custLinFactNeighborX="1504" custLinFactNeighborY="20631"/>
       <dgm:spPr/>
       <dgm:t>
         <a:bodyPr/>
@@ -5391,126 +5167,147 @@
         </a:p>
       </dgm:t>
     </dgm:pt>
-    <dgm:pt modelId="{AAB8024B-B234-4D18-9EA3-77B62614EA77}" type="pres">
-      <dgm:prSet presAssocID="{510EFD7B-1058-437C-8DA9-EF30D565B8C1}" presName="desTx" presStyleLbl="revTx" presStyleIdx="17" presStyleCnt="18">
+    <dgm:pt modelId="{F6E6A1FA-855E-43D9-9C5C-3FA19A2551E8}" type="pres">
+      <dgm:prSet presAssocID="{9B6009A0-34DD-41BE-85D6-1DCA9D912DDD}" presName="descendantText" presStyleLbl="alignAcc1" presStyleIdx="1" presStyleCnt="4">
         <dgm:presLayoutVars>
           <dgm:bulletEnabled val="1"/>
         </dgm:presLayoutVars>
       </dgm:prSet>
       <dgm:spPr/>
+      <dgm:t>
+        <a:bodyPr/>
+        <a:lstStyle/>
+        <a:p>
+          <a:endParaRPr lang="hu-HU"/>
+        </a:p>
+      </dgm:t>
     </dgm:pt>
-    <dgm:pt modelId="{B1361DA3-9D8B-491C-B081-16B239E43E62}" type="pres">
-      <dgm:prSet presAssocID="{510EFD7B-1058-437C-8DA9-EF30D565B8C1}" presName="desBackupRightNorm" presStyleCnt="0"/>
+    <dgm:pt modelId="{74B00B3E-9D16-420B-9229-B56182F2F8E1}" type="pres">
+      <dgm:prSet presAssocID="{8A4C909D-1D3B-47B8-8349-1D301929092B}" presName="sp" presStyleCnt="0"/>
       <dgm:spPr/>
     </dgm:pt>
-    <dgm:pt modelId="{2AE2B09D-A33D-4031-8A95-108C003A8BD3}" type="pres">
-      <dgm:prSet presAssocID="{3C764822-77FD-4906-B113-F07F063AA732}" presName="desSpace" presStyleCnt="0"/>
+    <dgm:pt modelId="{591A2073-C6B3-4390-ABBB-7E3FABD56425}" type="pres">
+      <dgm:prSet presAssocID="{DC73ED8C-4FB5-48CE-8E01-CD9C762CDA97}" presName="composite" presStyleCnt="0"/>
       <dgm:spPr/>
+    </dgm:pt>
+    <dgm:pt modelId="{D7C58A9C-367C-4958-8266-477D81CEE5EB}" type="pres">
+      <dgm:prSet presAssocID="{DC73ED8C-4FB5-48CE-8E01-CD9C762CDA97}" presName="parentText" presStyleLbl="alignNode1" presStyleIdx="2" presStyleCnt="4">
+        <dgm:presLayoutVars>
+          <dgm:chMax val="1"/>
+          <dgm:bulletEnabled val="1"/>
+        </dgm:presLayoutVars>
+      </dgm:prSet>
+      <dgm:spPr/>
+      <dgm:t>
+        <a:bodyPr/>
+        <a:lstStyle/>
+        <a:p>
+          <a:endParaRPr lang="hu-HU"/>
+        </a:p>
+      </dgm:t>
+    </dgm:pt>
+    <dgm:pt modelId="{BF266C17-73DC-4CC9-9525-7D744C2912FD}" type="pres">
+      <dgm:prSet presAssocID="{DC73ED8C-4FB5-48CE-8E01-CD9C762CDA97}" presName="descendantText" presStyleLbl="alignAcc1" presStyleIdx="2" presStyleCnt="4">
+        <dgm:presLayoutVars>
+          <dgm:bulletEnabled val="1"/>
+        </dgm:presLayoutVars>
+      </dgm:prSet>
+      <dgm:spPr/>
+      <dgm:t>
+        <a:bodyPr/>
+        <a:lstStyle/>
+        <a:p>
+          <a:endParaRPr lang="hu-HU"/>
+        </a:p>
+      </dgm:t>
+    </dgm:pt>
+    <dgm:pt modelId="{4EDB3104-6A4A-4DF2-96F1-DE790C067B89}" type="pres">
+      <dgm:prSet presAssocID="{7702F005-E044-4498-890A-9D83FBEBAE94}" presName="sp" presStyleCnt="0"/>
+      <dgm:spPr/>
+    </dgm:pt>
+    <dgm:pt modelId="{2E50FB2B-BAA2-4CFF-A1D2-4CB9CC55B5E9}" type="pres">
+      <dgm:prSet presAssocID="{0921180B-CE79-46F8-8FF5-851177EAF4BB}" presName="composite" presStyleCnt="0"/>
+      <dgm:spPr/>
+    </dgm:pt>
+    <dgm:pt modelId="{A5B6C357-1D6A-41AB-B622-4324F70A706C}" type="pres">
+      <dgm:prSet presAssocID="{0921180B-CE79-46F8-8FF5-851177EAF4BB}" presName="parentText" presStyleLbl="alignNode1" presStyleIdx="3" presStyleCnt="4">
+        <dgm:presLayoutVars>
+          <dgm:chMax val="1"/>
+          <dgm:bulletEnabled val="1"/>
+        </dgm:presLayoutVars>
+      </dgm:prSet>
+      <dgm:spPr/>
+      <dgm:t>
+        <a:bodyPr/>
+        <a:lstStyle/>
+        <a:p>
+          <a:endParaRPr lang="hu-HU"/>
+        </a:p>
+      </dgm:t>
+    </dgm:pt>
+    <dgm:pt modelId="{4FA10526-71BD-4956-8C52-FA52A8EB6C20}" type="pres">
+      <dgm:prSet presAssocID="{0921180B-CE79-46F8-8FF5-851177EAF4BB}" presName="descendantText" presStyleLbl="alignAcc1" presStyleIdx="3" presStyleCnt="4">
+        <dgm:presLayoutVars>
+          <dgm:bulletEnabled val="1"/>
+        </dgm:presLayoutVars>
+      </dgm:prSet>
+      <dgm:spPr/>
+      <dgm:t>
+        <a:bodyPr/>
+        <a:lstStyle/>
+        <a:p>
+          <a:endParaRPr lang="hu-HU"/>
+        </a:p>
+      </dgm:t>
     </dgm:pt>
   </dgm:ptLst>
   <dgm:cxnLst>
-    <dgm:cxn modelId="{EEBC508F-3DDC-40F5-9100-E9C7031BE273}" srcId="{AE6B133A-6205-43D9-80BC-6B2EE320F44E}" destId="{0921180B-CE79-46F8-8FF5-851177EAF4BB}" srcOrd="3" destOrd="0" parTransId="{E99B7AE3-60AE-4CC5-BC59-F3A3EB44CC6B}" sibTransId="{75BD6862-8701-4779-BF37-F89CA3E50E97}"/>
-    <dgm:cxn modelId="{9DBDFEF2-847B-4207-AA20-B8177669EF61}" srcId="{9B6009A0-34DD-41BE-85D6-1DCA9D912DDD}" destId="{96394EB0-09C2-4771-A560-951C52E002D5}" srcOrd="0" destOrd="0" parTransId="{3668F559-CB50-43B9-846E-6EE75B1E9215}" sibTransId="{66058863-F3E9-4CB1-BB43-7CD66CBEFBBD}"/>
+    <dgm:cxn modelId="{463E08FC-CAA0-42DE-8099-F1297C0D18A3}" type="presOf" srcId="{AE6B133A-6205-43D9-80BC-6B2EE320F44E}" destId="{4CD21B61-05A5-4875-AD76-993982BA655F}" srcOrd="0" destOrd="0" presId="urn:microsoft.com/office/officeart/2005/8/layout/chevron2"/>
+    <dgm:cxn modelId="{FB46286B-594F-4011-9D75-FC1349537CB5}" srcId="{9B6009A0-34DD-41BE-85D6-1DCA9D912DDD}" destId="{2F79A582-958F-481C-86CD-02535DF8A91B}" srcOrd="1" destOrd="0" parTransId="{11648259-EF63-44F1-9040-7E9C00A51375}" sibTransId="{205EFCFB-D476-4A1D-A0B4-73432D3E9C22}"/>
+    <dgm:cxn modelId="{AC086A7D-A437-4B30-A83D-4492614920BE}" srcId="{1C9CECCB-50DE-4D2B-99D5-ABA29B35DFBC}" destId="{A6ED393E-8314-4A72-9590-5BF98C8F7B81}" srcOrd="0" destOrd="0" parTransId="{ABC1A243-07DB-41AF-8144-E163075EF1D9}" sibTransId="{07750E72-A0D5-49FE-AA95-56BAAFAE4365}"/>
     <dgm:cxn modelId="{C6B8DFBA-23EE-4BCA-AEC4-87E3CDC2C870}" srcId="{DC73ED8C-4FB5-48CE-8E01-CD9C762CDA97}" destId="{57B4FFCB-0B6B-4B6C-8A93-745FD68DC668}" srcOrd="0" destOrd="0" parTransId="{9E736EDB-1D67-4CBB-A9F8-05D397BB8DB8}" sibTransId="{AD9FAEE0-4900-45E1-B433-781E9E741ECC}"/>
     <dgm:cxn modelId="{0CEC8B70-CBF9-4767-B780-A0AEED287E2B}" srcId="{AE6B133A-6205-43D9-80BC-6B2EE320F44E}" destId="{9B6009A0-34DD-41BE-85D6-1DCA9D912DDD}" srcOrd="1" destOrd="0" parTransId="{D8D75004-7F13-42A8-96B0-7D86E1AA1DC3}" sibTransId="{8A4C909D-1D3B-47B8-8349-1D301929092B}"/>
-    <dgm:cxn modelId="{D007B482-1215-4F2E-AA65-E218AB4C5B4F}" type="presOf" srcId="{9B6009A0-34DD-41BE-85D6-1DCA9D912DDD}" destId="{55655EFE-21DF-4952-8611-EAB8177F831B}" srcOrd="0" destOrd="0" presId="urn:microsoft.com/office/officeart/2008/layout/CircleAccentTimeline"/>
-    <dgm:cxn modelId="{699C8DC2-C58B-45FC-9589-1033244D94DB}" type="presOf" srcId="{A6ED393E-8314-4A72-9590-5BF98C8F7B81}" destId="{4FEE82F5-3C15-4E43-B016-E1888271A9C0}" srcOrd="0" destOrd="0" presId="urn:microsoft.com/office/officeart/2008/layout/CircleAccentTimeline"/>
-    <dgm:cxn modelId="{92372EFF-5F95-426B-B587-403117519AD7}" type="presOf" srcId="{DC73ED8C-4FB5-48CE-8E01-CD9C762CDA97}" destId="{816A918E-DBFA-40F0-B723-DA3CE7E1F180}" srcOrd="0" destOrd="0" presId="urn:microsoft.com/office/officeart/2008/layout/CircleAccentTimeline"/>
-    <dgm:cxn modelId="{6297336C-A30F-4D76-9BC4-5322B47A9E79}" type="presOf" srcId="{1C9CECCB-50DE-4D2B-99D5-ABA29B35DFBC}" destId="{177BF0D3-F856-494A-AFF5-D888C0EEA0CF}" srcOrd="0" destOrd="0" presId="urn:microsoft.com/office/officeart/2008/layout/CircleAccentTimeline"/>
-    <dgm:cxn modelId="{8294F829-CFF5-4B15-AF03-FFD3961F0AE2}" type="presOf" srcId="{BDF70A35-FA81-4308-8130-B3D271844A7C}" destId="{75E59408-38EA-485E-9E84-322A427117FB}" srcOrd="0" destOrd="0" presId="urn:microsoft.com/office/officeart/2008/layout/CircleAccentTimeline"/>
-    <dgm:cxn modelId="{A3EA7E12-89A2-4C08-9AD4-56C513A23912}" type="presOf" srcId="{57B4FFCB-0B6B-4B6C-8A93-745FD68DC668}" destId="{06B6C995-C32D-47A2-B38C-E475342560ED}" srcOrd="0" destOrd="0" presId="urn:microsoft.com/office/officeart/2008/layout/CircleAccentTimeline"/>
-    <dgm:cxn modelId="{FB46286B-594F-4011-9D75-FC1349537CB5}" srcId="{9B6009A0-34DD-41BE-85D6-1DCA9D912DDD}" destId="{2F79A582-958F-481C-86CD-02535DF8A91B}" srcOrd="1" destOrd="0" parTransId="{11648259-EF63-44F1-9040-7E9C00A51375}" sibTransId="{205EFCFB-D476-4A1D-A0B4-73432D3E9C22}"/>
-    <dgm:cxn modelId="{52E6BE38-0F43-4F58-984D-7F1A923B91B6}" type="presOf" srcId="{2F79A582-958F-481C-86CD-02535DF8A91B}" destId="{331D9851-285C-46A6-882D-715632A19BC9}" srcOrd="0" destOrd="0" presId="urn:microsoft.com/office/officeart/2008/layout/CircleAccentTimeline"/>
-    <dgm:cxn modelId="{BBD834E2-2217-496D-98ED-0667E2DC6FC7}" type="presOf" srcId="{510EFD7B-1058-437C-8DA9-EF30D565B8C1}" destId="{7CFFD670-DC0B-4A7F-8671-BA53DAD59CF2}" srcOrd="0" destOrd="0" presId="urn:microsoft.com/office/officeart/2008/layout/CircleAccentTimeline"/>
-    <dgm:cxn modelId="{E5C76CD0-5F6E-4EA0-B138-BD5CE5057F42}" srcId="{9B6009A0-34DD-41BE-85D6-1DCA9D912DDD}" destId="{BDF70A35-FA81-4308-8130-B3D271844A7C}" srcOrd="2" destOrd="0" parTransId="{76EAB760-1FB0-4971-BE86-ED90B0AB46D8}" sibTransId="{49F73C2E-A8F3-4429-AB84-6AB45279DD4F}"/>
+    <dgm:cxn modelId="{FCC42658-BE1C-47D9-B89A-82D5091CF4AE}" srcId="{9B6009A0-34DD-41BE-85D6-1DCA9D912DDD}" destId="{D32F9420-C203-4C46-B1E3-6C0FE9FE1920}" srcOrd="2" destOrd="0" parTransId="{E6D7AEF9-8A6F-4EDF-A803-0CCE2704BFF0}" sibTransId="{F78A7A50-485B-47BA-B0D3-0BD30116DB2E}"/>
+    <dgm:cxn modelId="{BF533010-F60E-4A1D-8B17-2B24B5D61971}" type="presOf" srcId="{57B4FFCB-0B6B-4B6C-8A93-745FD68DC668}" destId="{BF266C17-73DC-4CC9-9525-7D744C2912FD}" srcOrd="0" destOrd="0" presId="urn:microsoft.com/office/officeart/2005/8/layout/chevron2"/>
+    <dgm:cxn modelId="{96054714-96C9-4679-9E6B-987A2DD29978}" type="presOf" srcId="{1C9CECCB-50DE-4D2B-99D5-ABA29B35DFBC}" destId="{66245363-1E46-4D66-8535-2E93FB394B99}" srcOrd="0" destOrd="0" presId="urn:microsoft.com/office/officeart/2005/8/layout/chevron2"/>
+    <dgm:cxn modelId="{983DFE98-0E67-4B6F-86EE-A005C3E74B82}" srcId="{DC73ED8C-4FB5-48CE-8E01-CD9C762CDA97}" destId="{93426CB5-072A-4A73-BD60-8562071939E7}" srcOrd="1" destOrd="0" parTransId="{45443C3F-A763-429B-9E93-E4E286807D74}" sibTransId="{E83BF0F2-8E46-41BC-A2A1-061ED100B3D7}"/>
+    <dgm:cxn modelId="{27A6647A-FEB7-47AA-B6F9-AFE23E44A813}" type="presOf" srcId="{0921180B-CE79-46F8-8FF5-851177EAF4BB}" destId="{A5B6C357-1D6A-41AB-B622-4324F70A706C}" srcOrd="0" destOrd="0" presId="urn:microsoft.com/office/officeart/2005/8/layout/chevron2"/>
+    <dgm:cxn modelId="{DFE7C865-2F43-490D-A21B-7CD1FFF36B51}" type="presOf" srcId="{510EFD7B-1058-437C-8DA9-EF30D565B8C1}" destId="{4FA10526-71BD-4956-8C52-FA52A8EB6C20}" srcOrd="0" destOrd="0" presId="urn:microsoft.com/office/officeart/2005/8/layout/chevron2"/>
     <dgm:cxn modelId="{DFDED960-5AFE-4DE5-B90A-211A9D9066FE}" srcId="{0921180B-CE79-46F8-8FF5-851177EAF4BB}" destId="{510EFD7B-1058-437C-8DA9-EF30D565B8C1}" srcOrd="0" destOrd="0" parTransId="{D8DA2A79-5507-4B84-8401-05C83BF53530}" sibTransId="{3C764822-77FD-4906-B113-F07F063AA732}"/>
-    <dgm:cxn modelId="{B32D7F73-3A84-4B0D-AF66-B2234B9E583C}" type="presOf" srcId="{93426CB5-072A-4A73-BD60-8562071939E7}" destId="{F1C34573-A1AD-4553-B6D3-4697A7C89051}" srcOrd="0" destOrd="0" presId="urn:microsoft.com/office/officeart/2008/layout/CircleAccentTimeline"/>
-    <dgm:cxn modelId="{EC8A76FF-81BD-4D2D-A150-A0B8BDA1BEC1}" type="presOf" srcId="{96394EB0-09C2-4771-A560-951C52E002D5}" destId="{5DDD4FD9-7081-4AE1-9FAA-B3A90AA4BFED}" srcOrd="0" destOrd="0" presId="urn:microsoft.com/office/officeart/2008/layout/CircleAccentTimeline"/>
-    <dgm:cxn modelId="{983DFE98-0E67-4B6F-86EE-A005C3E74B82}" srcId="{DC73ED8C-4FB5-48CE-8E01-CD9C762CDA97}" destId="{93426CB5-072A-4A73-BD60-8562071939E7}" srcOrd="1" destOrd="0" parTransId="{45443C3F-A763-429B-9E93-E4E286807D74}" sibTransId="{E83BF0F2-8E46-41BC-A2A1-061ED100B3D7}"/>
-    <dgm:cxn modelId="{AC086A7D-A437-4B30-A83D-4492614920BE}" srcId="{1C9CECCB-50DE-4D2B-99D5-ABA29B35DFBC}" destId="{A6ED393E-8314-4A72-9590-5BF98C8F7B81}" srcOrd="0" destOrd="0" parTransId="{ABC1A243-07DB-41AF-8144-E163075EF1D9}" sibTransId="{07750E72-A0D5-49FE-AA95-56BAAFAE4365}"/>
-    <dgm:cxn modelId="{FAA9B806-467E-4CE8-BEFA-54E7F0F55AC8}" type="presOf" srcId="{0921180B-CE79-46F8-8FF5-851177EAF4BB}" destId="{3F0F2F79-813B-4F6C-AF8C-4AE3BC8E5DE1}" srcOrd="0" destOrd="0" presId="urn:microsoft.com/office/officeart/2008/layout/CircleAccentTimeline"/>
+    <dgm:cxn modelId="{CBC307C5-A9FC-4647-9CF5-7FE0BB064BB5}" type="presOf" srcId="{9B6009A0-34DD-41BE-85D6-1DCA9D912DDD}" destId="{C8E2BCEB-9701-402B-AA34-DF1DEDC22283}" srcOrd="0" destOrd="0" presId="urn:microsoft.com/office/officeart/2005/8/layout/chevron2"/>
+    <dgm:cxn modelId="{81DE38FB-D139-4056-B182-8F1084FA02EE}" type="presOf" srcId="{BDF70A35-FA81-4308-8130-B3D271844A7C}" destId="{F6E6A1FA-855E-43D9-9C5C-3FA19A2551E8}" srcOrd="0" destOrd="3" presId="urn:microsoft.com/office/officeart/2005/8/layout/chevron2"/>
+    <dgm:cxn modelId="{E5C76CD0-5F6E-4EA0-B138-BD5CE5057F42}" srcId="{9B6009A0-34DD-41BE-85D6-1DCA9D912DDD}" destId="{BDF70A35-FA81-4308-8130-B3D271844A7C}" srcOrd="3" destOrd="0" parTransId="{76EAB760-1FB0-4971-BE86-ED90B0AB46D8}" sibTransId="{49F73C2E-A8F3-4429-AB84-6AB45279DD4F}"/>
+    <dgm:cxn modelId="{BAD27C92-B32C-43B3-B955-5AC6A1119032}" type="presOf" srcId="{2F79A582-958F-481C-86CD-02535DF8A91B}" destId="{F6E6A1FA-855E-43D9-9C5C-3FA19A2551E8}" srcOrd="0" destOrd="1" presId="urn:microsoft.com/office/officeart/2005/8/layout/chevron2"/>
+    <dgm:cxn modelId="{9DBDFEF2-847B-4207-AA20-B8177669EF61}" srcId="{9B6009A0-34DD-41BE-85D6-1DCA9D912DDD}" destId="{96394EB0-09C2-4771-A560-951C52E002D5}" srcOrd="0" destOrd="0" parTransId="{3668F559-CB50-43B9-846E-6EE75B1E9215}" sibTransId="{66058863-F3E9-4CB1-BB43-7CD66CBEFBBD}"/>
+    <dgm:cxn modelId="{02C2554F-34E8-4286-BE6B-58649DB18837}" srcId="{AE6B133A-6205-43D9-80BC-6B2EE320F44E}" destId="{1C9CECCB-50DE-4D2B-99D5-ABA29B35DFBC}" srcOrd="0" destOrd="0" parTransId="{631BF903-3410-45CE-BD28-397E8A4E1645}" sibTransId="{E285B57B-71F9-4070-A7C6-11C825FF1A39}"/>
+    <dgm:cxn modelId="{0CF84D82-10ED-4B31-A36F-BC737FA2868D}" type="presOf" srcId="{DC73ED8C-4FB5-48CE-8E01-CD9C762CDA97}" destId="{D7C58A9C-367C-4958-8266-477D81CEE5EB}" srcOrd="0" destOrd="0" presId="urn:microsoft.com/office/officeart/2005/8/layout/chevron2"/>
+    <dgm:cxn modelId="{54D8CF99-548B-4125-BEE3-88954380F6DE}" type="presOf" srcId="{96394EB0-09C2-4771-A560-951C52E002D5}" destId="{F6E6A1FA-855E-43D9-9C5C-3FA19A2551E8}" srcOrd="0" destOrd="0" presId="urn:microsoft.com/office/officeart/2005/8/layout/chevron2"/>
     <dgm:cxn modelId="{F96D7160-E936-4B4F-8BAB-02E9D45D0B9B}" srcId="{AE6B133A-6205-43D9-80BC-6B2EE320F44E}" destId="{DC73ED8C-4FB5-48CE-8E01-CD9C762CDA97}" srcOrd="2" destOrd="0" parTransId="{76C1DCF0-25C1-4851-B163-F23BC90812D6}" sibTransId="{7702F005-E044-4498-890A-9D83FBEBAE94}"/>
-    <dgm:cxn modelId="{38400C86-6472-4905-9638-7BEE46210E07}" type="presOf" srcId="{AE6B133A-6205-43D9-80BC-6B2EE320F44E}" destId="{16B0D3DC-6FA4-4217-86F4-1DADEB1EC43B}" srcOrd="0" destOrd="0" presId="urn:microsoft.com/office/officeart/2008/layout/CircleAccentTimeline"/>
-    <dgm:cxn modelId="{02C2554F-34E8-4286-BE6B-58649DB18837}" srcId="{AE6B133A-6205-43D9-80BC-6B2EE320F44E}" destId="{1C9CECCB-50DE-4D2B-99D5-ABA29B35DFBC}" srcOrd="0" destOrd="0" parTransId="{631BF903-3410-45CE-BD28-397E8A4E1645}" sibTransId="{E285B57B-71F9-4070-A7C6-11C825FF1A39}"/>
-    <dgm:cxn modelId="{05023261-E0F9-4B2D-A3D5-F31FC022DB91}" type="presParOf" srcId="{16B0D3DC-6FA4-4217-86F4-1DADEB1EC43B}" destId="{79FB4AC3-A60E-4F2C-AFD7-E5833D4BF772}" srcOrd="0" destOrd="0" presId="urn:microsoft.com/office/officeart/2008/layout/CircleAccentTimeline"/>
-    <dgm:cxn modelId="{242DF8E4-539B-4205-9356-EF7CB86D0985}" type="presParOf" srcId="{79FB4AC3-A60E-4F2C-AFD7-E5833D4BF772}" destId="{1F756714-37B5-4F75-A247-8FE45784CABC}" srcOrd="0" destOrd="0" presId="urn:microsoft.com/office/officeart/2008/layout/CircleAccentTimeline"/>
-    <dgm:cxn modelId="{797C0963-7372-4F10-945D-52A2A1E6C14F}" type="presParOf" srcId="{79FB4AC3-A60E-4F2C-AFD7-E5833D4BF772}" destId="{177BF0D3-F856-494A-AFF5-D888C0EEA0CF}" srcOrd="1" destOrd="0" presId="urn:microsoft.com/office/officeart/2008/layout/CircleAccentTimeline"/>
-    <dgm:cxn modelId="{F8B22B50-4B05-4A63-8A96-C935092B882F}" type="presParOf" srcId="{79FB4AC3-A60E-4F2C-AFD7-E5833D4BF772}" destId="{51068F1D-C5A5-47A5-AD7E-E01C8D8235FB}" srcOrd="2" destOrd="0" presId="urn:microsoft.com/office/officeart/2008/layout/CircleAccentTimeline"/>
-    <dgm:cxn modelId="{BD460D01-6640-4D8E-8E38-C57E8CCAAED5}" type="presParOf" srcId="{16B0D3DC-6FA4-4217-86F4-1DADEB1EC43B}" destId="{46553BCB-874D-4778-98DE-84D7FC8AD734}" srcOrd="1" destOrd="0" presId="urn:microsoft.com/office/officeart/2008/layout/CircleAccentTimeline"/>
-    <dgm:cxn modelId="{FAB8CBE5-F7B3-45A1-BD2F-43D7B7229E9C}" type="presParOf" srcId="{16B0D3DC-6FA4-4217-86F4-1DADEB1EC43B}" destId="{8A970F04-869B-4503-A090-5815E909F995}" srcOrd="2" destOrd="0" presId="urn:microsoft.com/office/officeart/2008/layout/CircleAccentTimeline"/>
-    <dgm:cxn modelId="{FE2E25F7-CA30-47C7-8E83-42E55831B708}" type="presParOf" srcId="{16B0D3DC-6FA4-4217-86F4-1DADEB1EC43B}" destId="{E6780CBD-BBD6-4FD8-B35A-EEEB2C3A1539}" srcOrd="3" destOrd="0" presId="urn:microsoft.com/office/officeart/2008/layout/CircleAccentTimeline"/>
-    <dgm:cxn modelId="{5EC0AEB6-4A52-4D77-8D18-8158C3C706ED}" type="presParOf" srcId="{16B0D3DC-6FA4-4217-86F4-1DADEB1EC43B}" destId="{526BB410-0E1C-46D7-8F2B-450733E3C2B4}" srcOrd="4" destOrd="0" presId="urn:microsoft.com/office/officeart/2008/layout/CircleAccentTimeline"/>
-    <dgm:cxn modelId="{0E129EC6-5A13-4BBA-9F15-D77FD29F0E35}" type="presParOf" srcId="{526BB410-0E1C-46D7-8F2B-450733E3C2B4}" destId="{7E6FE1E0-EF27-4D9C-807A-D3231675303F}" srcOrd="0" destOrd="0" presId="urn:microsoft.com/office/officeart/2008/layout/CircleAccentTimeline"/>
-    <dgm:cxn modelId="{AB5E9608-30CC-4944-8568-2E197C09CC32}" type="presParOf" srcId="{526BB410-0E1C-46D7-8F2B-450733E3C2B4}" destId="{4FEE82F5-3C15-4E43-B016-E1888271A9C0}" srcOrd="1" destOrd="0" presId="urn:microsoft.com/office/officeart/2008/layout/CircleAccentTimeline"/>
-    <dgm:cxn modelId="{3938C65D-6202-4FF1-972B-1EADCA001047}" type="presParOf" srcId="{526BB410-0E1C-46D7-8F2B-450733E3C2B4}" destId="{30DC637A-2E1B-44BA-B694-75AFF0A0EBBB}" srcOrd="2" destOrd="0" presId="urn:microsoft.com/office/officeart/2008/layout/CircleAccentTimeline"/>
-    <dgm:cxn modelId="{34D468F0-0FAC-4ABC-A1C4-F46C019A1D1F}" type="presParOf" srcId="{16B0D3DC-6FA4-4217-86F4-1DADEB1EC43B}" destId="{E9A5FB67-A270-4022-83FF-EF79B8824638}" srcOrd="5" destOrd="0" presId="urn:microsoft.com/office/officeart/2008/layout/CircleAccentTimeline"/>
-    <dgm:cxn modelId="{CBF19C94-F52B-4AAE-AD25-BA69E53D46C8}" type="presParOf" srcId="{16B0D3DC-6FA4-4217-86F4-1DADEB1EC43B}" destId="{74A41939-1E0C-4A85-A507-B4206C685724}" srcOrd="6" destOrd="0" presId="urn:microsoft.com/office/officeart/2008/layout/CircleAccentTimeline"/>
-    <dgm:cxn modelId="{43D4A610-AF2E-495B-81E8-265F88570801}" type="presParOf" srcId="{16B0D3DC-6FA4-4217-86F4-1DADEB1EC43B}" destId="{279C9357-D8FF-43A5-B5C3-7EA0CE62A389}" srcOrd="7" destOrd="0" presId="urn:microsoft.com/office/officeart/2008/layout/CircleAccentTimeline"/>
-    <dgm:cxn modelId="{3CBE7C82-B7AC-4F7B-B7EB-39E66F612F92}" type="presParOf" srcId="{279C9357-D8FF-43A5-B5C3-7EA0CE62A389}" destId="{6FF362DB-B871-4752-B158-37ED7CD74FE6}" srcOrd="0" destOrd="0" presId="urn:microsoft.com/office/officeart/2008/layout/CircleAccentTimeline"/>
-    <dgm:cxn modelId="{F815A567-C3AD-4F2E-9335-3B19FFCEC5DE}" type="presParOf" srcId="{279C9357-D8FF-43A5-B5C3-7EA0CE62A389}" destId="{55655EFE-21DF-4952-8611-EAB8177F831B}" srcOrd="1" destOrd="0" presId="urn:microsoft.com/office/officeart/2008/layout/CircleAccentTimeline"/>
-    <dgm:cxn modelId="{D650DCF4-DDC3-4831-A943-E14C5EA4B83E}" type="presParOf" srcId="{279C9357-D8FF-43A5-B5C3-7EA0CE62A389}" destId="{23DC08B4-FD19-46C0-8FBA-BCEFB7C507DD}" srcOrd="2" destOrd="0" presId="urn:microsoft.com/office/officeart/2008/layout/CircleAccentTimeline"/>
-    <dgm:cxn modelId="{12FA05A2-E4BF-4C99-BEDD-F323B4F746EE}" type="presParOf" srcId="{16B0D3DC-6FA4-4217-86F4-1DADEB1EC43B}" destId="{3B14F69C-1211-4B1C-8662-9FC376167917}" srcOrd="8" destOrd="0" presId="urn:microsoft.com/office/officeart/2008/layout/CircleAccentTimeline"/>
-    <dgm:cxn modelId="{F063AD41-64D6-41A1-B49D-636BAF2EBE3C}" type="presParOf" srcId="{16B0D3DC-6FA4-4217-86F4-1DADEB1EC43B}" destId="{BA524F52-4F95-4BA6-B2B4-27A4FD2A6A4D}" srcOrd="9" destOrd="0" presId="urn:microsoft.com/office/officeart/2008/layout/CircleAccentTimeline"/>
-    <dgm:cxn modelId="{8B9EDAB7-97DF-4D70-BCDB-464BB32DFF48}" type="presParOf" srcId="{16B0D3DC-6FA4-4217-86F4-1DADEB1EC43B}" destId="{F965CA72-4EE4-490C-9889-8749CFBC0901}" srcOrd="10" destOrd="0" presId="urn:microsoft.com/office/officeart/2008/layout/CircleAccentTimeline"/>
-    <dgm:cxn modelId="{E7442627-9953-4858-9ABE-7348AD165DC8}" type="presParOf" srcId="{16B0D3DC-6FA4-4217-86F4-1DADEB1EC43B}" destId="{6E87F1D0-370E-4416-B8BD-EBC80807F355}" srcOrd="11" destOrd="0" presId="urn:microsoft.com/office/officeart/2008/layout/CircleAccentTimeline"/>
-    <dgm:cxn modelId="{C2D13FDF-59CD-4FE2-A04C-28344A992FE6}" type="presParOf" srcId="{6E87F1D0-370E-4416-B8BD-EBC80807F355}" destId="{96B4C896-39C7-45C3-8550-AC773C9A805F}" srcOrd="0" destOrd="0" presId="urn:microsoft.com/office/officeart/2008/layout/CircleAccentTimeline"/>
-    <dgm:cxn modelId="{61956517-2276-4724-B6EB-AFEA3EB4DABC}" type="presParOf" srcId="{6E87F1D0-370E-4416-B8BD-EBC80807F355}" destId="{5DDD4FD9-7081-4AE1-9FAA-B3A90AA4BFED}" srcOrd="1" destOrd="0" presId="urn:microsoft.com/office/officeart/2008/layout/CircleAccentTimeline"/>
-    <dgm:cxn modelId="{06402E39-3A2F-427E-971D-E078B838B154}" type="presParOf" srcId="{6E87F1D0-370E-4416-B8BD-EBC80807F355}" destId="{E5F96A21-45DA-4792-B61A-7BE86BC82BA2}" srcOrd="2" destOrd="0" presId="urn:microsoft.com/office/officeart/2008/layout/CircleAccentTimeline"/>
-    <dgm:cxn modelId="{FE076AA4-FD43-4858-BF0C-88E30EDCA59F}" type="presParOf" srcId="{16B0D3DC-6FA4-4217-86F4-1DADEB1EC43B}" destId="{FD746EF9-CDCF-4778-9A9B-A62114672503}" srcOrd="12" destOrd="0" presId="urn:microsoft.com/office/officeart/2008/layout/CircleAccentTimeline"/>
-    <dgm:cxn modelId="{8C98BC8A-A624-484B-BD3E-084E06E8EFC4}" type="presParOf" srcId="{16B0D3DC-6FA4-4217-86F4-1DADEB1EC43B}" destId="{393942AF-6575-48F2-9D35-64A6A89FF419}" srcOrd="13" destOrd="0" presId="urn:microsoft.com/office/officeart/2008/layout/CircleAccentTimeline"/>
-    <dgm:cxn modelId="{1E509A18-1400-4A46-803B-7CDC55B8E091}" type="presParOf" srcId="{16B0D3DC-6FA4-4217-86F4-1DADEB1EC43B}" destId="{18587857-50AE-4E71-8714-5990294E0BD9}" srcOrd="14" destOrd="0" presId="urn:microsoft.com/office/officeart/2008/layout/CircleAccentTimeline"/>
-    <dgm:cxn modelId="{176049B8-029B-4947-84DB-1C80C25DA284}" type="presParOf" srcId="{16B0D3DC-6FA4-4217-86F4-1DADEB1EC43B}" destId="{92326C54-44F4-46F3-82C9-56B026F65B24}" srcOrd="15" destOrd="0" presId="urn:microsoft.com/office/officeart/2008/layout/CircleAccentTimeline"/>
-    <dgm:cxn modelId="{02AE90F2-D40C-49DD-9F42-3AC81A5668DD}" type="presParOf" srcId="{92326C54-44F4-46F3-82C9-56B026F65B24}" destId="{0FC2D113-702D-40D6-82BE-F042188D80B6}" srcOrd="0" destOrd="0" presId="urn:microsoft.com/office/officeart/2008/layout/CircleAccentTimeline"/>
-    <dgm:cxn modelId="{2C38A559-2290-421D-8A3B-8130589C858E}" type="presParOf" srcId="{92326C54-44F4-46F3-82C9-56B026F65B24}" destId="{331D9851-285C-46A6-882D-715632A19BC9}" srcOrd="1" destOrd="0" presId="urn:microsoft.com/office/officeart/2008/layout/CircleAccentTimeline"/>
-    <dgm:cxn modelId="{52535089-8C8A-4D88-A11A-FAA16D7882BD}" type="presParOf" srcId="{92326C54-44F4-46F3-82C9-56B026F65B24}" destId="{87CBAF4E-E538-4A21-BFED-F910E33AA535}" srcOrd="2" destOrd="0" presId="urn:microsoft.com/office/officeart/2008/layout/CircleAccentTimeline"/>
-    <dgm:cxn modelId="{6756431B-13A2-40E1-A2A2-00A5EF9C7317}" type="presParOf" srcId="{16B0D3DC-6FA4-4217-86F4-1DADEB1EC43B}" destId="{ABEAA64D-C1F7-4636-A754-93670C8E7C9C}" srcOrd="16" destOrd="0" presId="urn:microsoft.com/office/officeart/2008/layout/CircleAccentTimeline"/>
-    <dgm:cxn modelId="{1D5DEFFC-FFA2-4D8B-AE5C-CA736C836FDC}" type="presParOf" srcId="{16B0D3DC-6FA4-4217-86F4-1DADEB1EC43B}" destId="{02833FA8-0E91-433F-B751-BFAA79260A66}" srcOrd="17" destOrd="0" presId="urn:microsoft.com/office/officeart/2008/layout/CircleAccentTimeline"/>
-    <dgm:cxn modelId="{97D5EA76-3C62-4457-A036-C53D464AEBF1}" type="presParOf" srcId="{16B0D3DC-6FA4-4217-86F4-1DADEB1EC43B}" destId="{50D8D37F-2D28-425A-AF93-03113762E601}" srcOrd="18" destOrd="0" presId="urn:microsoft.com/office/officeart/2008/layout/CircleAccentTimeline"/>
-    <dgm:cxn modelId="{C397BB3F-9E1A-45F0-9E12-73E1725D6CDD}" type="presParOf" srcId="{16B0D3DC-6FA4-4217-86F4-1DADEB1EC43B}" destId="{30CD2911-BEC0-441B-818C-C2F6222BD109}" srcOrd="19" destOrd="0" presId="urn:microsoft.com/office/officeart/2008/layout/CircleAccentTimeline"/>
-    <dgm:cxn modelId="{4B30EAF7-7DEC-4763-B309-0623AF750A92}" type="presParOf" srcId="{30CD2911-BEC0-441B-818C-C2F6222BD109}" destId="{75779121-453E-4240-9A7A-00802073DDAD}" srcOrd="0" destOrd="0" presId="urn:microsoft.com/office/officeart/2008/layout/CircleAccentTimeline"/>
-    <dgm:cxn modelId="{190285A0-6DA3-4668-B53D-31D5524B888A}" type="presParOf" srcId="{30CD2911-BEC0-441B-818C-C2F6222BD109}" destId="{75E59408-38EA-485E-9E84-322A427117FB}" srcOrd="1" destOrd="0" presId="urn:microsoft.com/office/officeart/2008/layout/CircleAccentTimeline"/>
-    <dgm:cxn modelId="{215BA58E-2A7B-4152-A848-CE559E3CA6BF}" type="presParOf" srcId="{30CD2911-BEC0-441B-818C-C2F6222BD109}" destId="{A5630AAE-9C7A-4CC1-BD9E-C29457CDC3DC}" srcOrd="2" destOrd="0" presId="urn:microsoft.com/office/officeart/2008/layout/CircleAccentTimeline"/>
-    <dgm:cxn modelId="{D22F2C40-AC72-4E48-A8C9-3CBDCFD16524}" type="presParOf" srcId="{16B0D3DC-6FA4-4217-86F4-1DADEB1EC43B}" destId="{CE359063-8473-4036-B86C-DD7F6F1D40E0}" srcOrd="20" destOrd="0" presId="urn:microsoft.com/office/officeart/2008/layout/CircleAccentTimeline"/>
-    <dgm:cxn modelId="{E0D64A0F-58A1-47B9-B7B6-4DEDDE59AA11}" type="presParOf" srcId="{16B0D3DC-6FA4-4217-86F4-1DADEB1EC43B}" destId="{0CE675AC-71F4-454A-ABEC-971CD09ED719}" srcOrd="21" destOrd="0" presId="urn:microsoft.com/office/officeart/2008/layout/CircleAccentTimeline"/>
-    <dgm:cxn modelId="{CD75F449-97AE-4DCD-8431-69E609CD2A83}" type="presParOf" srcId="{16B0D3DC-6FA4-4217-86F4-1DADEB1EC43B}" destId="{9BCE0B24-8E95-47D8-87C0-EBA09A80B24E}" srcOrd="22" destOrd="0" presId="urn:microsoft.com/office/officeart/2008/layout/CircleAccentTimeline"/>
-    <dgm:cxn modelId="{6C090F04-C9BB-4EE2-9E40-0823A1662D67}" type="presParOf" srcId="{9BCE0B24-8E95-47D8-87C0-EBA09A80B24E}" destId="{F92B2C29-A84B-44F4-AAA8-FF8A646DA0F5}" srcOrd="0" destOrd="0" presId="urn:microsoft.com/office/officeart/2008/layout/CircleAccentTimeline"/>
-    <dgm:cxn modelId="{C43D7827-943A-4294-8A8B-C64F5B71E109}" type="presParOf" srcId="{9BCE0B24-8E95-47D8-87C0-EBA09A80B24E}" destId="{816A918E-DBFA-40F0-B723-DA3CE7E1F180}" srcOrd="1" destOrd="0" presId="urn:microsoft.com/office/officeart/2008/layout/CircleAccentTimeline"/>
-    <dgm:cxn modelId="{7FF33866-810E-4110-BF0F-04F4D41F854B}" type="presParOf" srcId="{9BCE0B24-8E95-47D8-87C0-EBA09A80B24E}" destId="{A5EA0166-949A-4854-BC30-77090B2781DA}" srcOrd="2" destOrd="0" presId="urn:microsoft.com/office/officeart/2008/layout/CircleAccentTimeline"/>
-    <dgm:cxn modelId="{9EF44032-0B0D-4B4F-99C5-3D693A2F33AB}" type="presParOf" srcId="{16B0D3DC-6FA4-4217-86F4-1DADEB1EC43B}" destId="{728443F6-B69E-4D76-82B5-2902323453D9}" srcOrd="23" destOrd="0" presId="urn:microsoft.com/office/officeart/2008/layout/CircleAccentTimeline"/>
-    <dgm:cxn modelId="{EA711AAF-3D51-47A2-B03D-5045F344DB27}" type="presParOf" srcId="{16B0D3DC-6FA4-4217-86F4-1DADEB1EC43B}" destId="{2712391E-8AB6-4817-A693-3701A736A683}" srcOrd="24" destOrd="0" presId="urn:microsoft.com/office/officeart/2008/layout/CircleAccentTimeline"/>
-    <dgm:cxn modelId="{7A3CF481-D861-45D1-97B0-8DE3F56D9BE4}" type="presParOf" srcId="{16B0D3DC-6FA4-4217-86F4-1DADEB1EC43B}" destId="{9F7095BF-8226-4337-A7E2-8443B171060C}" srcOrd="25" destOrd="0" presId="urn:microsoft.com/office/officeart/2008/layout/CircleAccentTimeline"/>
-    <dgm:cxn modelId="{E39D5C5C-36D9-44F3-B9BF-AF6C5D6F9AE5}" type="presParOf" srcId="{16B0D3DC-6FA4-4217-86F4-1DADEB1EC43B}" destId="{1D0F86F2-C1C5-4626-B022-5B89C1156003}" srcOrd="26" destOrd="0" presId="urn:microsoft.com/office/officeart/2008/layout/CircleAccentTimeline"/>
-    <dgm:cxn modelId="{B9882934-50F3-416D-9E42-A5C4394B287F}" type="presParOf" srcId="{1D0F86F2-C1C5-4626-B022-5B89C1156003}" destId="{5CE32B6C-E51C-4BD8-9A88-320303DEB68C}" srcOrd="0" destOrd="0" presId="urn:microsoft.com/office/officeart/2008/layout/CircleAccentTimeline"/>
-    <dgm:cxn modelId="{D27A87BB-20DC-43AB-BCD1-458BB63366EB}" type="presParOf" srcId="{1D0F86F2-C1C5-4626-B022-5B89C1156003}" destId="{06B6C995-C32D-47A2-B38C-E475342560ED}" srcOrd="1" destOrd="0" presId="urn:microsoft.com/office/officeart/2008/layout/CircleAccentTimeline"/>
-    <dgm:cxn modelId="{915BEAFB-33DF-4873-9D3B-CB359D7ACAB8}" type="presParOf" srcId="{1D0F86F2-C1C5-4626-B022-5B89C1156003}" destId="{E3D436F3-0708-4ACA-B1EA-24447276246C}" srcOrd="2" destOrd="0" presId="urn:microsoft.com/office/officeart/2008/layout/CircleAccentTimeline"/>
-    <dgm:cxn modelId="{7D3CF2C4-6F46-4126-ABFA-3B58EED24FC0}" type="presParOf" srcId="{16B0D3DC-6FA4-4217-86F4-1DADEB1EC43B}" destId="{DF5E0343-8BF9-4C32-AB71-AA32163E9E58}" srcOrd="27" destOrd="0" presId="urn:microsoft.com/office/officeart/2008/layout/CircleAccentTimeline"/>
-    <dgm:cxn modelId="{D656229C-CAEE-4526-8B17-8C9B4CA3ADEE}" type="presParOf" srcId="{16B0D3DC-6FA4-4217-86F4-1DADEB1EC43B}" destId="{1B858FF8-1AE3-4EFF-A9C2-C0EBCF32E38B}" srcOrd="28" destOrd="0" presId="urn:microsoft.com/office/officeart/2008/layout/CircleAccentTimeline"/>
-    <dgm:cxn modelId="{2E3104AD-1117-4949-A88D-6C3049BDD0E5}" type="presParOf" srcId="{16B0D3DC-6FA4-4217-86F4-1DADEB1EC43B}" destId="{E887AA7E-F5AD-44DD-B2DA-B26FA46E226D}" srcOrd="29" destOrd="0" presId="urn:microsoft.com/office/officeart/2008/layout/CircleAccentTimeline"/>
-    <dgm:cxn modelId="{7FC5001E-96F4-4662-9E6C-809ABA2A8065}" type="presParOf" srcId="{16B0D3DC-6FA4-4217-86F4-1DADEB1EC43B}" destId="{5734ED35-A5B0-4222-B778-3804843633D9}" srcOrd="30" destOrd="0" presId="urn:microsoft.com/office/officeart/2008/layout/CircleAccentTimeline"/>
-    <dgm:cxn modelId="{3000AAD7-3101-4F51-9770-87E04BE8A038}" type="presParOf" srcId="{5734ED35-A5B0-4222-B778-3804843633D9}" destId="{D3E8D938-A134-4F99-9B05-5F374ADB3038}" srcOrd="0" destOrd="0" presId="urn:microsoft.com/office/officeart/2008/layout/CircleAccentTimeline"/>
-    <dgm:cxn modelId="{9F589B2E-C0FB-4C52-B862-5127D8A71948}" type="presParOf" srcId="{5734ED35-A5B0-4222-B778-3804843633D9}" destId="{F1C34573-A1AD-4553-B6D3-4697A7C89051}" srcOrd="1" destOrd="0" presId="urn:microsoft.com/office/officeart/2008/layout/CircleAccentTimeline"/>
-    <dgm:cxn modelId="{90663298-A84F-4FA4-84D6-6CF7B0444946}" type="presParOf" srcId="{5734ED35-A5B0-4222-B778-3804843633D9}" destId="{B9C15728-DC26-4D85-ADDE-E80575E2E9EF}" srcOrd="2" destOrd="0" presId="urn:microsoft.com/office/officeart/2008/layout/CircleAccentTimeline"/>
-    <dgm:cxn modelId="{BCEF9F84-FEFE-4669-AA1D-11831AC41D39}" type="presParOf" srcId="{16B0D3DC-6FA4-4217-86F4-1DADEB1EC43B}" destId="{0B6E0333-F6A6-4518-8157-04CCCDD39196}" srcOrd="31" destOrd="0" presId="urn:microsoft.com/office/officeart/2008/layout/CircleAccentTimeline"/>
-    <dgm:cxn modelId="{C3845231-F907-49E0-949B-72A395A3F1BC}" type="presParOf" srcId="{16B0D3DC-6FA4-4217-86F4-1DADEB1EC43B}" destId="{2F511738-7745-46EC-9305-2653C1BC3E90}" srcOrd="32" destOrd="0" presId="urn:microsoft.com/office/officeart/2008/layout/CircleAccentTimeline"/>
-    <dgm:cxn modelId="{35E0900B-87A3-41DE-8A9C-5326E8972130}" type="presParOf" srcId="{16B0D3DC-6FA4-4217-86F4-1DADEB1EC43B}" destId="{85D0B60A-9CBB-46CB-B497-038385B0B419}" srcOrd="33" destOrd="0" presId="urn:microsoft.com/office/officeart/2008/layout/CircleAccentTimeline"/>
-    <dgm:cxn modelId="{DBD3AA87-7B93-4093-BB0C-312574E9D2BF}" type="presParOf" srcId="{85D0B60A-9CBB-46CB-B497-038385B0B419}" destId="{A018408A-BEDE-4476-B17C-40A4EE127940}" srcOrd="0" destOrd="0" presId="urn:microsoft.com/office/officeart/2008/layout/CircleAccentTimeline"/>
-    <dgm:cxn modelId="{900185E6-28EC-46C5-992F-0FAE0A9C1CA5}" type="presParOf" srcId="{85D0B60A-9CBB-46CB-B497-038385B0B419}" destId="{3F0F2F79-813B-4F6C-AF8C-4AE3BC8E5DE1}" srcOrd="1" destOrd="0" presId="urn:microsoft.com/office/officeart/2008/layout/CircleAccentTimeline"/>
-    <dgm:cxn modelId="{6E5D0D78-E056-4810-940D-5BA055BCD952}" type="presParOf" srcId="{85D0B60A-9CBB-46CB-B497-038385B0B419}" destId="{46D494A6-8FEA-4D2B-9650-0126701F9F7B}" srcOrd="2" destOrd="0" presId="urn:microsoft.com/office/officeart/2008/layout/CircleAccentTimeline"/>
-    <dgm:cxn modelId="{3B0C8002-C65B-46B1-9B2D-F668A29D2FC7}" type="presParOf" srcId="{16B0D3DC-6FA4-4217-86F4-1DADEB1EC43B}" destId="{6B10A80C-BB03-4E11-8669-66F1A36CA368}" srcOrd="34" destOrd="0" presId="urn:microsoft.com/office/officeart/2008/layout/CircleAccentTimeline"/>
-    <dgm:cxn modelId="{B1637C97-9B9E-48A6-8FE2-709E24255390}" type="presParOf" srcId="{16B0D3DC-6FA4-4217-86F4-1DADEB1EC43B}" destId="{8CBB0B0F-B801-419E-A271-FECA0D38BDB1}" srcOrd="35" destOrd="0" presId="urn:microsoft.com/office/officeart/2008/layout/CircleAccentTimeline"/>
-    <dgm:cxn modelId="{B7FAA44A-E9C4-4C06-ABC0-AB6D59B5B001}" type="presParOf" srcId="{16B0D3DC-6FA4-4217-86F4-1DADEB1EC43B}" destId="{3219EB3B-0C16-48C7-8E20-ED024ECBC2BF}" srcOrd="36" destOrd="0" presId="urn:microsoft.com/office/officeart/2008/layout/CircleAccentTimeline"/>
-    <dgm:cxn modelId="{F944619E-726D-4173-800D-C203D5D99187}" type="presParOf" srcId="{16B0D3DC-6FA4-4217-86F4-1DADEB1EC43B}" destId="{718FF79C-3639-445F-A5A2-FE2951A4752A}" srcOrd="37" destOrd="0" presId="urn:microsoft.com/office/officeart/2008/layout/CircleAccentTimeline"/>
-    <dgm:cxn modelId="{886D3361-67AB-481F-B2D6-A72FB3991A7D}" type="presParOf" srcId="{718FF79C-3639-445F-A5A2-FE2951A4752A}" destId="{70DFB032-A1F1-4FA4-880B-578355A18589}" srcOrd="0" destOrd="0" presId="urn:microsoft.com/office/officeart/2008/layout/CircleAccentTimeline"/>
-    <dgm:cxn modelId="{8A4CAB31-C437-48C2-996D-7688B62A2E7D}" type="presParOf" srcId="{718FF79C-3639-445F-A5A2-FE2951A4752A}" destId="{7CFFD670-DC0B-4A7F-8671-BA53DAD59CF2}" srcOrd="1" destOrd="0" presId="urn:microsoft.com/office/officeart/2008/layout/CircleAccentTimeline"/>
-    <dgm:cxn modelId="{A3DA3FCE-9EC3-45E9-B84B-07ACD5305EFD}" type="presParOf" srcId="{718FF79C-3639-445F-A5A2-FE2951A4752A}" destId="{AAB8024B-B234-4D18-9EA3-77B62614EA77}" srcOrd="2" destOrd="0" presId="urn:microsoft.com/office/officeart/2008/layout/CircleAccentTimeline"/>
-    <dgm:cxn modelId="{59780080-ABC2-4B12-B5F3-15CDA465F3A8}" type="presParOf" srcId="{16B0D3DC-6FA4-4217-86F4-1DADEB1EC43B}" destId="{B1361DA3-9D8B-491C-B081-16B239E43E62}" srcOrd="38" destOrd="0" presId="urn:microsoft.com/office/officeart/2008/layout/CircleAccentTimeline"/>
-    <dgm:cxn modelId="{7D8FBC24-7FCE-4D0A-8C6B-BE1B6E1940BC}" type="presParOf" srcId="{16B0D3DC-6FA4-4217-86F4-1DADEB1EC43B}" destId="{2AE2B09D-A33D-4031-8A95-108C003A8BD3}" srcOrd="39" destOrd="0" presId="urn:microsoft.com/office/officeart/2008/layout/CircleAccentTimeline"/>
+    <dgm:cxn modelId="{5BED41A4-6705-4611-8A95-DAB5ACAD9070}" type="presOf" srcId="{D32F9420-C203-4C46-B1E3-6C0FE9FE1920}" destId="{F6E6A1FA-855E-43D9-9C5C-3FA19A2551E8}" srcOrd="0" destOrd="2" presId="urn:microsoft.com/office/officeart/2005/8/layout/chevron2"/>
+    <dgm:cxn modelId="{341D72ED-6C14-4200-9713-21F657712395}" type="presOf" srcId="{93426CB5-072A-4A73-BD60-8562071939E7}" destId="{BF266C17-73DC-4CC9-9525-7D744C2912FD}" srcOrd="0" destOrd="1" presId="urn:microsoft.com/office/officeart/2005/8/layout/chevron2"/>
+    <dgm:cxn modelId="{EEBC508F-3DDC-40F5-9100-E9C7031BE273}" srcId="{AE6B133A-6205-43D9-80BC-6B2EE320F44E}" destId="{0921180B-CE79-46F8-8FF5-851177EAF4BB}" srcOrd="3" destOrd="0" parTransId="{E99B7AE3-60AE-4CC5-BC59-F3A3EB44CC6B}" sibTransId="{75BD6862-8701-4779-BF37-F89CA3E50E97}"/>
+    <dgm:cxn modelId="{D3692BD3-12C9-41E6-BF29-B43886E0FE02}" type="presOf" srcId="{A6ED393E-8314-4A72-9590-5BF98C8F7B81}" destId="{EC82F665-CD99-47BC-8883-8DFECEA12D39}" srcOrd="0" destOrd="0" presId="urn:microsoft.com/office/officeart/2005/8/layout/chevron2"/>
+    <dgm:cxn modelId="{7DA5F5C4-093F-4A81-B5DE-5A3033B14149}" type="presParOf" srcId="{4CD21B61-05A5-4875-AD76-993982BA655F}" destId="{4F586563-9A1F-4FA0-B7F3-AA102BBBC85A}" srcOrd="0" destOrd="0" presId="urn:microsoft.com/office/officeart/2005/8/layout/chevron2"/>
+    <dgm:cxn modelId="{C00EBE45-8BB3-43C5-B2F0-9E61E4758DA5}" type="presParOf" srcId="{4F586563-9A1F-4FA0-B7F3-AA102BBBC85A}" destId="{66245363-1E46-4D66-8535-2E93FB394B99}" srcOrd="0" destOrd="0" presId="urn:microsoft.com/office/officeart/2005/8/layout/chevron2"/>
+    <dgm:cxn modelId="{BCBECADA-68A6-4CE6-852C-9CF7A617513F}" type="presParOf" srcId="{4F586563-9A1F-4FA0-B7F3-AA102BBBC85A}" destId="{EC82F665-CD99-47BC-8883-8DFECEA12D39}" srcOrd="1" destOrd="0" presId="urn:microsoft.com/office/officeart/2005/8/layout/chevron2"/>
+    <dgm:cxn modelId="{21F11B52-8BF0-4DDA-B5FE-DFC89ABF2BD4}" type="presParOf" srcId="{4CD21B61-05A5-4875-AD76-993982BA655F}" destId="{8DAE6EB9-39E5-4D74-9F4A-5F564CF1DB05}" srcOrd="1" destOrd="0" presId="urn:microsoft.com/office/officeart/2005/8/layout/chevron2"/>
+    <dgm:cxn modelId="{A5E3094F-4729-4F79-89CA-ED1E7AC33136}" type="presParOf" srcId="{4CD21B61-05A5-4875-AD76-993982BA655F}" destId="{FD1AE64E-5E67-4526-95AF-4485A6790E64}" srcOrd="2" destOrd="0" presId="urn:microsoft.com/office/officeart/2005/8/layout/chevron2"/>
+    <dgm:cxn modelId="{F33CD969-B0E7-402B-8F79-17F9635371CF}" type="presParOf" srcId="{FD1AE64E-5E67-4526-95AF-4485A6790E64}" destId="{C8E2BCEB-9701-402B-AA34-DF1DEDC22283}" srcOrd="0" destOrd="0" presId="urn:microsoft.com/office/officeart/2005/8/layout/chevron2"/>
+    <dgm:cxn modelId="{C6D6EDB3-2260-4B6B-B673-C3C2BB7DACEE}" type="presParOf" srcId="{FD1AE64E-5E67-4526-95AF-4485A6790E64}" destId="{F6E6A1FA-855E-43D9-9C5C-3FA19A2551E8}" srcOrd="1" destOrd="0" presId="urn:microsoft.com/office/officeart/2005/8/layout/chevron2"/>
+    <dgm:cxn modelId="{7ED8F030-9959-4EF7-A669-F85660055CBA}" type="presParOf" srcId="{4CD21B61-05A5-4875-AD76-993982BA655F}" destId="{74B00B3E-9D16-420B-9229-B56182F2F8E1}" srcOrd="3" destOrd="0" presId="urn:microsoft.com/office/officeart/2005/8/layout/chevron2"/>
+    <dgm:cxn modelId="{C9EC9F1C-CEDC-4283-963B-BF2483711898}" type="presParOf" srcId="{4CD21B61-05A5-4875-AD76-993982BA655F}" destId="{591A2073-C6B3-4390-ABBB-7E3FABD56425}" srcOrd="4" destOrd="0" presId="urn:microsoft.com/office/officeart/2005/8/layout/chevron2"/>
+    <dgm:cxn modelId="{3B312927-A83D-462E-B27E-C0EABD0DC1E3}" type="presParOf" srcId="{591A2073-C6B3-4390-ABBB-7E3FABD56425}" destId="{D7C58A9C-367C-4958-8266-477D81CEE5EB}" srcOrd="0" destOrd="0" presId="urn:microsoft.com/office/officeart/2005/8/layout/chevron2"/>
+    <dgm:cxn modelId="{298E8124-35CC-4ACF-9FBA-68C9088B7556}" type="presParOf" srcId="{591A2073-C6B3-4390-ABBB-7E3FABD56425}" destId="{BF266C17-73DC-4CC9-9525-7D744C2912FD}" srcOrd="1" destOrd="0" presId="urn:microsoft.com/office/officeart/2005/8/layout/chevron2"/>
+    <dgm:cxn modelId="{068F7E32-0061-4EA3-BF09-1EE267314B53}" type="presParOf" srcId="{4CD21B61-05A5-4875-AD76-993982BA655F}" destId="{4EDB3104-6A4A-4DF2-96F1-DE790C067B89}" srcOrd="5" destOrd="0" presId="urn:microsoft.com/office/officeart/2005/8/layout/chevron2"/>
+    <dgm:cxn modelId="{6972C526-E6D7-4B43-A470-E5AC70F8FCD5}" type="presParOf" srcId="{4CD21B61-05A5-4875-AD76-993982BA655F}" destId="{2E50FB2B-BAA2-4CFF-A1D2-4CB9CC55B5E9}" srcOrd="6" destOrd="0" presId="urn:microsoft.com/office/officeart/2005/8/layout/chevron2"/>
+    <dgm:cxn modelId="{5E8723D1-C93A-4E9E-8467-4A1F8C066F95}" type="presParOf" srcId="{2E50FB2B-BAA2-4CFF-A1D2-4CB9CC55B5E9}" destId="{A5B6C357-1D6A-41AB-B622-4324F70A706C}" srcOrd="0" destOrd="0" presId="urn:microsoft.com/office/officeart/2005/8/layout/chevron2"/>
+    <dgm:cxn modelId="{C71C2763-42B7-4BA9-B9F7-9B58A470B796}" type="presParOf" srcId="{2E50FB2B-BAA2-4CFF-A1D2-4CB9CC55B5E9}" destId="{4FA10526-71BD-4956-8C52-FA52A8EB6C20}" srcOrd="1" destOrd="0" presId="urn:microsoft.com/office/officeart/2005/8/layout/chevron2"/>
   </dgm:cxnLst>
   <dgm:bg/>
   <dgm:whole/>
   <dgm:extLst>
     <a:ext uri="http://schemas.microsoft.com/office/drawing/2008/diagram">
-      <dsp:dataModelExt xmlns:dsp="http://schemas.microsoft.com/office/drawing/2008/diagram" relId="rId7" minVer="http://schemas.openxmlformats.org/drawingml/2006/diagram"/>
+      <dsp:dataModelExt xmlns:dsp="http://schemas.microsoft.com/office/drawing/2008/diagram" relId="rId6" minVer="http://schemas.openxmlformats.org/drawingml/2006/diagram"/>
     </a:ext>
   </dgm:extLst>
 </dgm:dataModel>
@@ -7168,23 +6965,21 @@
       <dsp:cNvGrpSpPr/>
     </dsp:nvGrpSpPr>
     <dsp:grpSpPr/>
-    <dsp:sp modelId="{1F756714-37B5-4F75-A247-8FE45784CABC}">
+    <dsp:sp modelId="{66245363-1E46-4D66-8535-2E93FB394B99}">
       <dsp:nvSpPr>
         <dsp:cNvPr id="0" name=""/>
         <dsp:cNvSpPr/>
       </dsp:nvSpPr>
       <dsp:spPr>
-        <a:xfrm>
-          <a:off x="2661" y="2330354"/>
-          <a:ext cx="1044085" cy="1044085"/>
+        <a:xfrm rot="5400000">
+          <a:off x="-214504" y="221799"/>
+          <a:ext cx="1430031" cy="1001022"/>
         </a:xfrm>
-        <a:prstGeom prst="donut">
-          <a:avLst>
-            <a:gd name="adj" fmla="val 20000"/>
-          </a:avLst>
+        <a:prstGeom prst="chevron">
+          <a:avLst/>
         </a:prstGeom>
         <a:solidFill>
-          <a:schemeClr val="accent3">
+          <a:schemeClr val="accent4">
             <a:hueOff val="0"/>
             <a:satOff val="0"/>
             <a:lumOff val="0"/>
@@ -7193,7 +6988,7 @@
         </a:solidFill>
         <a:ln w="26425" cap="flat" cmpd="sng" algn="ctr">
           <a:solidFill>
-            <a:schemeClr val="lt1">
+            <a:schemeClr val="accent4">
               <a:hueOff val="0"/>
               <a:satOff val="0"/>
               <a:lumOff val="0"/>
@@ -7218,45 +7013,13 @@
           <a:schemeClr val="lt1"/>
         </a:fontRef>
       </dsp:style>
-    </dsp:sp>
-    <dsp:sp modelId="{177BF0D3-F856-494A-AFF5-D888C0EEA0CF}">
-      <dsp:nvSpPr>
-        <dsp:cNvPr id="0" name=""/>
-        <dsp:cNvSpPr/>
-      </dsp:nvSpPr>
-      <dsp:spPr>
-        <a:xfrm rot="17700000">
-          <a:off x="370549" y="1479211"/>
-          <a:ext cx="1297914" cy="625494"/>
-        </a:xfrm>
-        <a:prstGeom prst="rect">
-          <a:avLst/>
-        </a:prstGeom>
-        <a:noFill/>
-        <a:ln>
-          <a:noFill/>
-        </a:ln>
-        <a:effectLst/>
-      </dsp:spPr>
-      <dsp:style>
-        <a:lnRef idx="0">
-          <a:scrgbClr r="0" g="0" b="0"/>
-        </a:lnRef>
-        <a:fillRef idx="0">
-          <a:scrgbClr r="0" g="0" b="0"/>
-        </a:fillRef>
-        <a:effectRef idx="0">
-          <a:scrgbClr r="0" g="0" b="0"/>
-        </a:effectRef>
-        <a:fontRef idx="minor"/>
-      </dsp:style>
       <dsp:txBody>
-        <a:bodyPr spcFirstLastPara="0" vert="horz" wrap="square" lIns="58420" tIns="0" rIns="0" bIns="0" numCol="1" spcCol="1270" anchor="ctr" anchorCtr="0">
+        <a:bodyPr spcFirstLastPara="0" vert="horz" wrap="square" lIns="11430" tIns="11430" rIns="11430" bIns="11430" numCol="1" spcCol="1270" anchor="ctr" anchorCtr="0">
           <a:noAutofit/>
         </a:bodyPr>
         <a:lstStyle/>
         <a:p>
-          <a:pPr lvl="0" algn="l" defTabSz="1022350">
+          <a:pPr lvl="0" algn="ctr" defTabSz="800100">
             <a:lnSpc>
               <a:spcPct val="90000"/>
             </a:lnSpc>
@@ -7268,32 +7031,33 @@
             </a:spcAft>
           </a:pPr>
           <a:r>
-            <a:rPr lang="hu-HU" sz="2300" kern="1200" dirty="0" smtClean="0"/>
+            <a:rPr lang="hu-HU" sz="1800" kern="1200" dirty="0" smtClean="0"/>
             <a:t>Januártól</a:t>
           </a:r>
-          <a:endParaRPr lang="hu-HU" sz="2300" kern="1200" dirty="0"/>
+          <a:endParaRPr lang="hu-HU" sz="1800" kern="1200" dirty="0"/>
         </a:p>
       </dsp:txBody>
-      <dsp:txXfrm>
-        <a:off x="370549" y="1479211"/>
-        <a:ext cx="1297914" cy="625494"/>
+      <dsp:txXfrm rot="-5400000">
+        <a:off x="1" y="507805"/>
+        <a:ext cx="1001022" cy="429009"/>
       </dsp:txXfrm>
     </dsp:sp>
-    <dsp:sp modelId="{7E6FE1E0-EF27-4D9C-807A-D3231675303F}">
+    <dsp:sp modelId="{EC82F665-CD99-47BC-8883-8DFECEA12D39}">
       <dsp:nvSpPr>
         <dsp:cNvPr id="0" name=""/>
         <dsp:cNvSpPr/>
       </dsp:nvSpPr>
       <dsp:spPr>
-        <a:xfrm>
-          <a:off x="1125390" y="2581423"/>
-          <a:ext cx="541946" cy="541946"/>
+        <a:xfrm rot="5400000">
+          <a:off x="4289394" y="-3281077"/>
+          <a:ext cx="929520" cy="7506265"/>
         </a:xfrm>
-        <a:prstGeom prst="ellipse">
+        <a:prstGeom prst="round2SameRect">
           <a:avLst/>
         </a:prstGeom>
         <a:solidFill>
-          <a:schemeClr val="accent4">
+          <a:schemeClr val="lt1">
+            <a:alpha val="90000"/>
             <a:hueOff val="0"/>
             <a:satOff val="0"/>
             <a:lumOff val="0"/>
@@ -7302,10 +7066,86 @@
         </a:solidFill>
         <a:ln w="26425" cap="flat" cmpd="sng" algn="ctr">
           <a:solidFill>
-            <a:schemeClr val="lt1">
+            <a:schemeClr val="accent4">
               <a:hueOff val="0"/>
               <a:satOff val="0"/>
               <a:lumOff val="0"/>
+              <a:alphaOff val="0"/>
+            </a:schemeClr>
+          </a:solidFill>
+          <a:prstDash val="solid"/>
+        </a:ln>
+        <a:effectLst/>
+      </dsp:spPr>
+      <dsp:style>
+        <a:lnRef idx="2">
+          <a:scrgbClr r="0" g="0" b="0"/>
+        </a:lnRef>
+        <a:fillRef idx="1">
+          <a:scrgbClr r="0" g="0" b="0"/>
+        </a:fillRef>
+        <a:effectRef idx="0">
+          <a:scrgbClr r="0" g="0" b="0"/>
+        </a:effectRef>
+        <a:fontRef idx="minor"/>
+      </dsp:style>
+      <dsp:txBody>
+        <a:bodyPr spcFirstLastPara="0" vert="horz" wrap="square" lIns="113792" tIns="10160" rIns="10160" bIns="10160" numCol="1" spcCol="1270" anchor="ctr" anchorCtr="0">
+          <a:noAutofit/>
+        </a:bodyPr>
+        <a:lstStyle/>
+        <a:p>
+          <a:pPr marL="171450" lvl="1" indent="-171450" algn="l" defTabSz="711200">
+            <a:lnSpc>
+              <a:spcPct val="90000"/>
+            </a:lnSpc>
+            <a:spcBef>
+              <a:spcPct val="0"/>
+            </a:spcBef>
+            <a:spcAft>
+              <a:spcPct val="15000"/>
+            </a:spcAft>
+            <a:buChar char="••"/>
+          </a:pPr>
+          <a:r>
+            <a:rPr lang="hu-HU" sz="1600" kern="1200" dirty="0" smtClean="0"/>
+            <a:t>front end fejlesztés</a:t>
+          </a:r>
+          <a:endParaRPr lang="hu-HU" sz="1600" kern="1200" dirty="0"/>
+        </a:p>
+      </dsp:txBody>
+      <dsp:txXfrm rot="-5400000">
+        <a:off x="1001022" y="52670"/>
+        <a:ext cx="7460890" cy="838770"/>
+      </dsp:txXfrm>
+    </dsp:sp>
+    <dsp:sp modelId="{C8E2BCEB-9701-402B-AA34-DF1DEDC22283}">
+      <dsp:nvSpPr>
+        <dsp:cNvPr id="0" name=""/>
+        <dsp:cNvSpPr/>
+      </dsp:nvSpPr>
+      <dsp:spPr>
+        <a:xfrm rot="5400000">
+          <a:off x="-214504" y="1507328"/>
+          <a:ext cx="1430031" cy="1001022"/>
+        </a:xfrm>
+        <a:prstGeom prst="chevron">
+          <a:avLst/>
+        </a:prstGeom>
+        <a:solidFill>
+          <a:schemeClr val="accent4">
+            <a:hueOff val="72430"/>
+            <a:satOff val="-690"/>
+            <a:lumOff val="6928"/>
+            <a:alphaOff val="0"/>
+          </a:schemeClr>
+        </a:solidFill>
+        <a:ln w="26425" cap="flat" cmpd="sng" algn="ctr">
+          <a:solidFill>
+            <a:schemeClr val="accent4">
+              <a:hueOff val="72430"/>
+              <a:satOff val="-690"/>
+              <a:lumOff val="6928"/>
               <a:alphaOff val="0"/>
             </a:schemeClr>
           </a:solidFill>
@@ -7327,45 +7167,13 @@
           <a:schemeClr val="lt1"/>
         </a:fontRef>
       </dsp:style>
-    </dsp:sp>
-    <dsp:sp modelId="{4FEE82F5-3C15-4E43-B016-E1888271A9C0}">
-      <dsp:nvSpPr>
-        <dsp:cNvPr id="0" name=""/>
-        <dsp:cNvSpPr/>
-      </dsp:nvSpPr>
-      <dsp:spPr>
-        <a:xfrm rot="17700000">
-          <a:off x="483529" y="3335727"/>
-          <a:ext cx="1122756" cy="541351"/>
-        </a:xfrm>
-        <a:prstGeom prst="rect">
-          <a:avLst/>
-        </a:prstGeom>
-        <a:noFill/>
-        <a:ln>
-          <a:noFill/>
-        </a:ln>
-        <a:effectLst/>
-      </dsp:spPr>
-      <dsp:style>
-        <a:lnRef idx="0">
-          <a:scrgbClr r="0" g="0" b="0"/>
-        </a:lnRef>
-        <a:fillRef idx="0">
-          <a:scrgbClr r="0" g="0" b="0"/>
-        </a:fillRef>
-        <a:effectRef idx="0">
-          <a:scrgbClr r="0" g="0" b="0"/>
-        </a:effectRef>
-        <a:fontRef idx="minor"/>
-      </dsp:style>
       <dsp:txBody>
-        <a:bodyPr spcFirstLastPara="0" vert="horz" wrap="square" lIns="0" tIns="0" rIns="40640" bIns="0" numCol="1" spcCol="1270" anchor="ctr" anchorCtr="0">
+        <a:bodyPr spcFirstLastPara="0" vert="horz" wrap="square" lIns="11430" tIns="11430" rIns="11430" bIns="11430" numCol="1" spcCol="1270" anchor="ctr" anchorCtr="0">
           <a:noAutofit/>
         </a:bodyPr>
         <a:lstStyle/>
         <a:p>
-          <a:pPr lvl="0" algn="l" defTabSz="711200">
+          <a:pPr lvl="0" algn="ctr" defTabSz="800100">
             <a:lnSpc>
               <a:spcPct val="90000"/>
             </a:lnSpc>
@@ -7377,66 +7185,32 @@
             </a:spcAft>
           </a:pPr>
           <a:r>
-            <a:rPr lang="hu-HU" sz="1600" kern="1200" dirty="0" smtClean="0"/>
-            <a:t>front end fejlesztés</a:t>
+            <a:rPr lang="hu-HU" sz="1800" kern="1200" dirty="0" smtClean="0"/>
+            <a:t>Március</a:t>
           </a:r>
-          <a:endParaRPr lang="hu-HU" sz="1600" kern="1200" dirty="0"/>
         </a:p>
       </dsp:txBody>
-      <dsp:txXfrm>
-        <a:off x="483529" y="3335727"/>
-        <a:ext cx="1122756" cy="541351"/>
+      <dsp:txXfrm rot="-5400000">
+        <a:off x="1" y="1793334"/>
+        <a:ext cx="1001022" cy="429009"/>
       </dsp:txXfrm>
     </dsp:sp>
-    <dsp:sp modelId="{30DC637A-2E1B-44BA-B694-75AFF0A0EBBB}">
+    <dsp:sp modelId="{F6E6A1FA-855E-43D9-9C5C-3FA19A2551E8}">
       <dsp:nvSpPr>
         <dsp:cNvPr id="0" name=""/>
         <dsp:cNvSpPr/>
       </dsp:nvSpPr>
       <dsp:spPr>
-        <a:xfrm rot="17700000">
-          <a:off x="1186441" y="1827714"/>
-          <a:ext cx="1122756" cy="541351"/>
+        <a:xfrm rot="5400000">
+          <a:off x="4289394" y="-1995548"/>
+          <a:ext cx="929520" cy="7506265"/>
         </a:xfrm>
-        <a:prstGeom prst="rect">
+        <a:prstGeom prst="round2SameRect">
           <a:avLst/>
         </a:prstGeom>
-        <a:noFill/>
-        <a:ln>
-          <a:noFill/>
-        </a:ln>
-        <a:effectLst/>
-      </dsp:spPr>
-      <dsp:style>
-        <a:lnRef idx="0">
-          <a:scrgbClr r="0" g="0" b="0"/>
-        </a:lnRef>
-        <a:fillRef idx="0">
-          <a:scrgbClr r="0" g="0" b="0"/>
-        </a:fillRef>
-        <a:effectRef idx="0">
-          <a:scrgbClr r="0" g="0" b="0"/>
-        </a:effectRef>
-        <a:fontRef idx="minor"/>
-      </dsp:style>
-    </dsp:sp>
-    <dsp:sp modelId="{6FF362DB-B871-4752-B158-37ED7CD74FE6}">
-      <dsp:nvSpPr>
-        <dsp:cNvPr id="0" name=""/>
-        <dsp:cNvSpPr/>
-      </dsp:nvSpPr>
-      <dsp:spPr>
-        <a:xfrm>
-          <a:off x="1745981" y="2330354"/>
-          <a:ext cx="1044085" cy="1044085"/>
-        </a:xfrm>
-        <a:prstGeom prst="donut">
-          <a:avLst>
-            <a:gd name="adj" fmla="val 20000"/>
-          </a:avLst>
-        </a:prstGeom>
         <a:solidFill>
-          <a:schemeClr val="accent3">
+          <a:schemeClr val="lt1">
+            <a:alpha val="90000"/>
             <a:hueOff val="0"/>
             <a:satOff val="0"/>
             <a:lumOff val="0"/>
@@ -7445,10 +7219,153 @@
         </a:solidFill>
         <a:ln w="26425" cap="flat" cmpd="sng" algn="ctr">
           <a:solidFill>
-            <a:schemeClr val="lt1">
-              <a:hueOff val="0"/>
-              <a:satOff val="0"/>
-              <a:lumOff val="0"/>
+            <a:schemeClr val="accent4">
+              <a:hueOff val="72430"/>
+              <a:satOff val="-690"/>
+              <a:lumOff val="6928"/>
+              <a:alphaOff val="0"/>
+            </a:schemeClr>
+          </a:solidFill>
+          <a:prstDash val="solid"/>
+        </a:ln>
+        <a:effectLst/>
+      </dsp:spPr>
+      <dsp:style>
+        <a:lnRef idx="2">
+          <a:scrgbClr r="0" g="0" b="0"/>
+        </a:lnRef>
+        <a:fillRef idx="1">
+          <a:scrgbClr r="0" g="0" b="0"/>
+        </a:fillRef>
+        <a:effectRef idx="0">
+          <a:scrgbClr r="0" g="0" b="0"/>
+        </a:effectRef>
+        <a:fontRef idx="minor"/>
+      </dsp:style>
+      <dsp:txBody>
+        <a:bodyPr spcFirstLastPara="0" vert="horz" wrap="square" lIns="113792" tIns="10160" rIns="10160" bIns="10160" numCol="1" spcCol="1270" anchor="ctr" anchorCtr="0">
+          <a:noAutofit/>
+        </a:bodyPr>
+        <a:lstStyle/>
+        <a:p>
+          <a:pPr marL="171450" lvl="1" indent="-171450" algn="l" defTabSz="711200">
+            <a:lnSpc>
+              <a:spcPct val="90000"/>
+            </a:lnSpc>
+            <a:spcBef>
+              <a:spcPct val="0"/>
+            </a:spcBef>
+            <a:spcAft>
+              <a:spcPct val="15000"/>
+            </a:spcAft>
+            <a:buChar char="••"/>
+          </a:pPr>
+          <a:r>
+            <a:rPr lang="hu-HU" sz="1600" kern="1200" dirty="0" err="1" smtClean="0"/>
+            <a:t>domain</a:t>
+          </a:r>
+          <a:r>
+            <a:rPr lang="hu-HU" sz="1600" kern="1200" dirty="0" smtClean="0"/>
+            <a:t> szolgáltató</a:t>
+          </a:r>
+        </a:p>
+        <a:p>
+          <a:pPr marL="171450" lvl="1" indent="-171450" algn="l" defTabSz="711200">
+            <a:lnSpc>
+              <a:spcPct val="90000"/>
+            </a:lnSpc>
+            <a:spcBef>
+              <a:spcPct val="0"/>
+            </a:spcBef>
+            <a:spcAft>
+              <a:spcPct val="15000"/>
+            </a:spcAft>
+            <a:buChar char="••"/>
+          </a:pPr>
+          <a:r>
+            <a:rPr lang="hu-HU" sz="1600" kern="1200" dirty="0" smtClean="0"/>
+            <a:t>back end </a:t>
+          </a:r>
+          <a:r>
+            <a:rPr lang="hu-HU" sz="1600" kern="1200" dirty="0" smtClean="0"/>
+            <a:t>fejlesztése</a:t>
+          </a:r>
+          <a:endParaRPr lang="hu-HU" sz="1600" kern="1200" dirty="0" smtClean="0"/>
+        </a:p>
+        <a:p>
+          <a:pPr marL="171450" lvl="1" indent="-171450" algn="l" defTabSz="711200">
+            <a:lnSpc>
+              <a:spcPct val="90000"/>
+            </a:lnSpc>
+            <a:spcBef>
+              <a:spcPct val="0"/>
+            </a:spcBef>
+            <a:spcAft>
+              <a:spcPct val="15000"/>
+            </a:spcAft>
+            <a:buChar char="••"/>
+          </a:pPr>
+          <a:r>
+            <a:rPr lang="hu-HU" sz="1600" kern="1200" dirty="0" err="1" smtClean="0"/>
+            <a:t>Reszponzívvá</a:t>
+          </a:r>
+          <a:r>
+            <a:rPr lang="hu-HU" sz="1600" kern="1200" dirty="0" smtClean="0"/>
+            <a:t> tétel </a:t>
+          </a:r>
+          <a:endParaRPr lang="hu-HU" sz="1600" kern="1200" dirty="0" smtClean="0"/>
+        </a:p>
+        <a:p>
+          <a:pPr marL="171450" lvl="1" indent="-171450" algn="l" defTabSz="711200">
+            <a:lnSpc>
+              <a:spcPct val="90000"/>
+            </a:lnSpc>
+            <a:spcBef>
+              <a:spcPct val="0"/>
+            </a:spcBef>
+            <a:spcAft>
+              <a:spcPct val="15000"/>
+            </a:spcAft>
+            <a:buChar char="••"/>
+          </a:pPr>
+          <a:r>
+            <a:rPr lang="hu-HU" sz="1600" kern="1200" dirty="0" smtClean="0"/>
+            <a:t>javítások és funkciók </a:t>
+          </a:r>
+        </a:p>
+      </dsp:txBody>
+      <dsp:txXfrm rot="-5400000">
+        <a:off x="1001022" y="1338199"/>
+        <a:ext cx="7460890" cy="838770"/>
+      </dsp:txXfrm>
+    </dsp:sp>
+    <dsp:sp modelId="{D7C58A9C-367C-4958-8266-477D81CEE5EB}">
+      <dsp:nvSpPr>
+        <dsp:cNvPr id="0" name=""/>
+        <dsp:cNvSpPr/>
+      </dsp:nvSpPr>
+      <dsp:spPr>
+        <a:xfrm rot="5400000">
+          <a:off x="-214504" y="2792857"/>
+          <a:ext cx="1430031" cy="1001022"/>
+        </a:xfrm>
+        <a:prstGeom prst="chevron">
+          <a:avLst/>
+        </a:prstGeom>
+        <a:solidFill>
+          <a:schemeClr val="accent4">
+            <a:hueOff val="144860"/>
+            <a:satOff val="-1380"/>
+            <a:lumOff val="13856"/>
+            <a:alphaOff val="0"/>
+          </a:schemeClr>
+        </a:solidFill>
+        <a:ln w="26425" cap="flat" cmpd="sng" algn="ctr">
+          <a:solidFill>
+            <a:schemeClr val="accent4">
+              <a:hueOff val="144860"/>
+              <a:satOff val="-1380"/>
+              <a:lumOff val="13856"/>
               <a:alphaOff val="0"/>
             </a:schemeClr>
           </a:solidFill>
@@ -7470,45 +7387,13 @@
           <a:schemeClr val="lt1"/>
         </a:fontRef>
       </dsp:style>
-    </dsp:sp>
-    <dsp:sp modelId="{55655EFE-21DF-4952-8611-EAB8177F831B}">
-      <dsp:nvSpPr>
-        <dsp:cNvPr id="0" name=""/>
-        <dsp:cNvSpPr/>
-      </dsp:nvSpPr>
-      <dsp:spPr>
-        <a:xfrm rot="17700000">
-          <a:off x="2113869" y="1479211"/>
-          <a:ext cx="1297914" cy="625494"/>
-        </a:xfrm>
-        <a:prstGeom prst="rect">
-          <a:avLst/>
-        </a:prstGeom>
-        <a:noFill/>
-        <a:ln>
-          <a:noFill/>
-        </a:ln>
-        <a:effectLst/>
-      </dsp:spPr>
-      <dsp:style>
-        <a:lnRef idx="0">
-          <a:scrgbClr r="0" g="0" b="0"/>
-        </a:lnRef>
-        <a:fillRef idx="0">
-          <a:scrgbClr r="0" g="0" b="0"/>
-        </a:fillRef>
-        <a:effectRef idx="0">
-          <a:scrgbClr r="0" g="0" b="0"/>
-        </a:effectRef>
-        <a:fontRef idx="minor"/>
-      </dsp:style>
       <dsp:txBody>
-        <a:bodyPr spcFirstLastPara="0" vert="horz" wrap="square" lIns="58420" tIns="0" rIns="0" bIns="0" numCol="1" spcCol="1270" anchor="ctr" anchorCtr="0">
+        <a:bodyPr spcFirstLastPara="0" vert="horz" wrap="square" lIns="11430" tIns="11430" rIns="11430" bIns="11430" numCol="1" spcCol="1270" anchor="ctr" anchorCtr="0">
           <a:noAutofit/>
         </a:bodyPr>
         <a:lstStyle/>
         <a:p>
-          <a:pPr lvl="0" algn="l" defTabSz="1022350">
+          <a:pPr lvl="0" algn="ctr" defTabSz="800100">
             <a:lnSpc>
               <a:spcPct val="90000"/>
             </a:lnSpc>
@@ -7520,44 +7405,147 @@
             </a:spcAft>
           </a:pPr>
           <a:r>
-            <a:rPr lang="hu-HU" sz="2300" kern="1200" dirty="0" smtClean="0"/>
-            <a:t>Március</a:t>
+            <a:rPr lang="hu-HU" sz="1800" kern="1200" dirty="0" smtClean="0"/>
+            <a:t>Április</a:t>
           </a:r>
-          <a:endParaRPr lang="hu-HU" sz="2300" kern="1200" dirty="0" smtClean="0"/>
         </a:p>
       </dsp:txBody>
-      <dsp:txXfrm>
-        <a:off x="2113869" y="1479211"/>
-        <a:ext cx="1297914" cy="625494"/>
+      <dsp:txXfrm rot="-5400000">
+        <a:off x="1" y="3078863"/>
+        <a:ext cx="1001022" cy="429009"/>
       </dsp:txXfrm>
     </dsp:sp>
-    <dsp:sp modelId="{96B4C896-39C7-45C3-8550-AC773C9A805F}">
+    <dsp:sp modelId="{BF266C17-73DC-4CC9-9525-7D744C2912FD}">
       <dsp:nvSpPr>
         <dsp:cNvPr id="0" name=""/>
         <dsp:cNvSpPr/>
       </dsp:nvSpPr>
       <dsp:spPr>
-        <a:xfrm>
-          <a:off x="2868710" y="2581423"/>
-          <a:ext cx="541946" cy="541946"/>
+        <a:xfrm rot="5400000">
+          <a:off x="4289394" y="-710019"/>
+          <a:ext cx="929520" cy="7506265"/>
         </a:xfrm>
-        <a:prstGeom prst="ellipse">
+        <a:prstGeom prst="round2SameRect">
           <a:avLst/>
         </a:prstGeom>
         <a:solidFill>
-          <a:schemeClr val="accent4">
-            <a:hueOff val="36215"/>
-            <a:satOff val="-345"/>
-            <a:lumOff val="3464"/>
+          <a:schemeClr val="lt1">
+            <a:alpha val="90000"/>
+            <a:hueOff val="0"/>
+            <a:satOff val="0"/>
+            <a:lumOff val="0"/>
             <a:alphaOff val="0"/>
           </a:schemeClr>
         </a:solidFill>
         <a:ln w="26425" cap="flat" cmpd="sng" algn="ctr">
           <a:solidFill>
-            <a:schemeClr val="lt1">
-              <a:hueOff val="0"/>
-              <a:satOff val="0"/>
-              <a:lumOff val="0"/>
+            <a:schemeClr val="accent4">
+              <a:hueOff val="144860"/>
+              <a:satOff val="-1380"/>
+              <a:lumOff val="13856"/>
+              <a:alphaOff val="0"/>
+            </a:schemeClr>
+          </a:solidFill>
+          <a:prstDash val="solid"/>
+        </a:ln>
+        <a:effectLst/>
+      </dsp:spPr>
+      <dsp:style>
+        <a:lnRef idx="2">
+          <a:scrgbClr r="0" g="0" b="0"/>
+        </a:lnRef>
+        <a:fillRef idx="1">
+          <a:scrgbClr r="0" g="0" b="0"/>
+        </a:fillRef>
+        <a:effectRef idx="0">
+          <a:scrgbClr r="0" g="0" b="0"/>
+        </a:effectRef>
+        <a:fontRef idx="minor"/>
+      </dsp:style>
+      <dsp:txBody>
+        <a:bodyPr spcFirstLastPara="0" vert="horz" wrap="square" lIns="113792" tIns="10160" rIns="10160" bIns="10160" numCol="1" spcCol="1270" anchor="ctr" anchorCtr="0">
+          <a:noAutofit/>
+        </a:bodyPr>
+        <a:lstStyle/>
+        <a:p>
+          <a:pPr marL="171450" lvl="1" indent="-171450" algn="l" defTabSz="711200">
+            <a:lnSpc>
+              <a:spcPct val="90000"/>
+            </a:lnSpc>
+            <a:spcBef>
+              <a:spcPct val="0"/>
+            </a:spcBef>
+            <a:spcAft>
+              <a:spcPct val="15000"/>
+            </a:spcAft>
+            <a:buChar char="••"/>
+          </a:pPr>
+          <a:r>
+            <a:rPr lang="hu-HU" sz="1600" kern="1200" dirty="0" smtClean="0"/>
+            <a:t>bemutató és </a:t>
+          </a:r>
+          <a:r>
+            <a:rPr lang="hu-HU" sz="1600" kern="1200" dirty="0" smtClean="0"/>
+            <a:t>dokumentáció</a:t>
+          </a:r>
+          <a:endParaRPr lang="hu-HU" sz="1600" kern="1200" dirty="0" smtClean="0"/>
+        </a:p>
+        <a:p>
+          <a:pPr marL="171450" lvl="1" indent="-171450" algn="l" defTabSz="711200">
+            <a:lnSpc>
+              <a:spcPct val="90000"/>
+            </a:lnSpc>
+            <a:spcBef>
+              <a:spcPct val="0"/>
+            </a:spcBef>
+            <a:spcAft>
+              <a:spcPct val="15000"/>
+            </a:spcAft>
+            <a:buChar char="••"/>
+          </a:pPr>
+          <a:r>
+            <a:rPr lang="hu-HU" sz="1600" kern="1200" dirty="0" smtClean="0"/>
+            <a:t>a tervek </a:t>
+          </a:r>
+          <a:r>
+            <a:rPr lang="hu-HU" sz="1600" kern="1200" dirty="0" smtClean="0"/>
+            <a:t>megvalósítása </a:t>
+          </a:r>
+          <a:endParaRPr lang="hu-HU" sz="1600" kern="1200" dirty="0" smtClean="0"/>
+        </a:p>
+      </dsp:txBody>
+      <dsp:txXfrm rot="-5400000">
+        <a:off x="1001022" y="2623728"/>
+        <a:ext cx="7460890" cy="838770"/>
+      </dsp:txXfrm>
+    </dsp:sp>
+    <dsp:sp modelId="{A5B6C357-1D6A-41AB-B622-4324F70A706C}">
+      <dsp:nvSpPr>
+        <dsp:cNvPr id="0" name=""/>
+        <dsp:cNvSpPr/>
+      </dsp:nvSpPr>
+      <dsp:spPr>
+        <a:xfrm rot="5400000">
+          <a:off x="-214504" y="4078386"/>
+          <a:ext cx="1430031" cy="1001022"/>
+        </a:xfrm>
+        <a:prstGeom prst="chevron">
+          <a:avLst/>
+        </a:prstGeom>
+        <a:solidFill>
+          <a:schemeClr val="accent4">
+            <a:hueOff val="217290"/>
+            <a:satOff val="-2070"/>
+            <a:lumOff val="20784"/>
+            <a:alphaOff val="0"/>
+          </a:schemeClr>
+        </a:solidFill>
+        <a:ln w="26425" cap="flat" cmpd="sng" algn="ctr">
+          <a:solidFill>
+            <a:schemeClr val="accent4">
+              <a:hueOff val="217290"/>
+              <a:satOff val="-2070"/>
+              <a:lumOff val="20784"/>
               <a:alphaOff val="0"/>
             </a:schemeClr>
           </a:solidFill>
@@ -7579,45 +7567,13 @@
           <a:schemeClr val="lt1"/>
         </a:fontRef>
       </dsp:style>
-    </dsp:sp>
-    <dsp:sp modelId="{5DDD4FD9-7081-4AE1-9FAA-B3A90AA4BFED}">
-      <dsp:nvSpPr>
-        <dsp:cNvPr id="0" name=""/>
-        <dsp:cNvSpPr/>
-      </dsp:nvSpPr>
-      <dsp:spPr>
-        <a:xfrm rot="17700000">
-          <a:off x="2226849" y="3335727"/>
-          <a:ext cx="1122756" cy="541351"/>
-        </a:xfrm>
-        <a:prstGeom prst="rect">
-          <a:avLst/>
-        </a:prstGeom>
-        <a:noFill/>
-        <a:ln>
-          <a:noFill/>
-        </a:ln>
-        <a:effectLst/>
-      </dsp:spPr>
-      <dsp:style>
-        <a:lnRef idx="0">
-          <a:scrgbClr r="0" g="0" b="0"/>
-        </a:lnRef>
-        <a:fillRef idx="0">
-          <a:scrgbClr r="0" g="0" b="0"/>
-        </a:fillRef>
-        <a:effectRef idx="0">
-          <a:scrgbClr r="0" g="0" b="0"/>
-        </a:effectRef>
-        <a:fontRef idx="minor"/>
-      </dsp:style>
       <dsp:txBody>
-        <a:bodyPr spcFirstLastPara="0" vert="horz" wrap="square" lIns="0" tIns="0" rIns="40640" bIns="0" numCol="1" spcCol="1270" anchor="ctr" anchorCtr="0">
+        <a:bodyPr spcFirstLastPara="0" vert="horz" wrap="square" lIns="11430" tIns="11430" rIns="11430" bIns="11430" numCol="1" spcCol="1270" anchor="ctr" anchorCtr="0">
           <a:noAutofit/>
         </a:bodyPr>
         <a:lstStyle/>
         <a:p>
-          <a:pPr lvl="0" algn="l" defTabSz="711200">
+          <a:pPr lvl="0" algn="ctr" defTabSz="800100">
             <a:lnSpc>
               <a:spcPct val="90000"/>
             </a:lnSpc>
@@ -7629,80 +7585,45 @@
             </a:spcAft>
           </a:pPr>
           <a:r>
-            <a:rPr lang="hu-HU" sz="1600" kern="1200" dirty="0" err="1" smtClean="0"/>
-            <a:t>domain</a:t>
+            <a:rPr lang="hu-HU" sz="1800" kern="1200" dirty="0" smtClean="0"/>
+            <a:t>Május</a:t>
           </a:r>
-          <a:r>
-            <a:rPr lang="hu-HU" sz="1600" kern="1200" dirty="0" smtClean="0"/>
-            <a:t> szolgáltató</a:t>
-          </a:r>
-          <a:endParaRPr lang="hu-HU" sz="1600" kern="1200" dirty="0" smtClean="0"/>
+          <a:endParaRPr lang="hu-HU" sz="1800" kern="1200" dirty="0"/>
         </a:p>
       </dsp:txBody>
-      <dsp:txXfrm>
-        <a:off x="2226849" y="3335727"/>
-        <a:ext cx="1122756" cy="541351"/>
+      <dsp:txXfrm rot="-5400000">
+        <a:off x="1" y="4364392"/>
+        <a:ext cx="1001022" cy="429009"/>
       </dsp:txXfrm>
     </dsp:sp>
-    <dsp:sp modelId="{E5F96A21-45DA-4792-B61A-7BE86BC82BA2}">
+    <dsp:sp modelId="{4FA10526-71BD-4956-8C52-FA52A8EB6C20}">
       <dsp:nvSpPr>
         <dsp:cNvPr id="0" name=""/>
         <dsp:cNvSpPr/>
       </dsp:nvSpPr>
       <dsp:spPr>
-        <a:xfrm rot="17700000">
-          <a:off x="2929761" y="1827714"/>
-          <a:ext cx="1122756" cy="541351"/>
+        <a:xfrm rot="5400000">
+          <a:off x="4289394" y="575509"/>
+          <a:ext cx="929520" cy="7506265"/>
         </a:xfrm>
-        <a:prstGeom prst="rect">
-          <a:avLst/>
-        </a:prstGeom>
-        <a:noFill/>
-        <a:ln>
-          <a:noFill/>
-        </a:ln>
-        <a:effectLst/>
-      </dsp:spPr>
-      <dsp:style>
-        <a:lnRef idx="0">
-          <a:scrgbClr r="0" g="0" b="0"/>
-        </a:lnRef>
-        <a:fillRef idx="0">
-          <a:scrgbClr r="0" g="0" b="0"/>
-        </a:fillRef>
-        <a:effectRef idx="0">
-          <a:scrgbClr r="0" g="0" b="0"/>
-        </a:effectRef>
-        <a:fontRef idx="minor"/>
-      </dsp:style>
-    </dsp:sp>
-    <dsp:sp modelId="{0FC2D113-702D-40D6-82BE-F042188D80B6}">
-      <dsp:nvSpPr>
-        <dsp:cNvPr id="0" name=""/>
-        <dsp:cNvSpPr/>
-      </dsp:nvSpPr>
-      <dsp:spPr>
-        <a:xfrm>
-          <a:off x="3489218" y="2581423"/>
-          <a:ext cx="541946" cy="541946"/>
-        </a:xfrm>
-        <a:prstGeom prst="ellipse">
+        <a:prstGeom prst="round2SameRect">
           <a:avLst/>
         </a:prstGeom>
         <a:solidFill>
-          <a:schemeClr val="accent4">
-            <a:hueOff val="72430"/>
-            <a:satOff val="-690"/>
-            <a:lumOff val="6928"/>
+          <a:schemeClr val="lt1">
+            <a:alpha val="90000"/>
+            <a:hueOff val="0"/>
+            <a:satOff val="0"/>
+            <a:lumOff val="0"/>
             <a:alphaOff val="0"/>
           </a:schemeClr>
         </a:solidFill>
         <a:ln w="26425" cap="flat" cmpd="sng" algn="ctr">
           <a:solidFill>
-            <a:schemeClr val="lt1">
-              <a:hueOff val="0"/>
-              <a:satOff val="0"/>
-              <a:lumOff val="0"/>
+            <a:schemeClr val="accent4">
+              <a:hueOff val="217290"/>
+              <a:satOff val="-2070"/>
+              <a:lumOff val="20784"/>
               <a:alphaOff val="0"/>
             </a:schemeClr>
           </a:solidFill>
@@ -7720,49 +7641,15 @@
         <a:effectRef idx="0">
           <a:scrgbClr r="0" g="0" b="0"/>
         </a:effectRef>
-        <a:fontRef idx="minor">
-          <a:schemeClr val="lt1"/>
-        </a:fontRef>
-      </dsp:style>
-    </dsp:sp>
-    <dsp:sp modelId="{331D9851-285C-46A6-882D-715632A19BC9}">
-      <dsp:nvSpPr>
-        <dsp:cNvPr id="0" name=""/>
-        <dsp:cNvSpPr/>
-      </dsp:nvSpPr>
-      <dsp:spPr>
-        <a:xfrm rot="17700000">
-          <a:off x="2847356" y="3335727"/>
-          <a:ext cx="1122756" cy="541351"/>
-        </a:xfrm>
-        <a:prstGeom prst="rect">
-          <a:avLst/>
-        </a:prstGeom>
-        <a:noFill/>
-        <a:ln>
-          <a:noFill/>
-        </a:ln>
-        <a:effectLst/>
-      </dsp:spPr>
-      <dsp:style>
-        <a:lnRef idx="0">
-          <a:scrgbClr r="0" g="0" b="0"/>
-        </a:lnRef>
-        <a:fillRef idx="0">
-          <a:scrgbClr r="0" g="0" b="0"/>
-        </a:fillRef>
-        <a:effectRef idx="0">
-          <a:scrgbClr r="0" g="0" b="0"/>
-        </a:effectRef>
         <a:fontRef idx="minor"/>
       </dsp:style>
       <dsp:txBody>
-        <a:bodyPr spcFirstLastPara="0" vert="horz" wrap="square" lIns="0" tIns="0" rIns="40640" bIns="0" numCol="1" spcCol="1270" anchor="ctr" anchorCtr="0">
+        <a:bodyPr spcFirstLastPara="0" vert="horz" wrap="square" lIns="113792" tIns="10160" rIns="10160" bIns="10160" numCol="1" spcCol="1270" anchor="ctr" anchorCtr="0">
           <a:noAutofit/>
         </a:bodyPr>
         <a:lstStyle/>
         <a:p>
-          <a:pPr lvl="0" algn="l" defTabSz="711200">
+          <a:pPr marL="171450" lvl="1" indent="-171450" algn="l" defTabSz="711200">
             <a:lnSpc>
               <a:spcPct val="90000"/>
             </a:lnSpc>
@@ -7770,854 +7657,25 @@
               <a:spcPct val="0"/>
             </a:spcBef>
             <a:spcAft>
-              <a:spcPct val="35000"/>
+              <a:spcPct val="15000"/>
             </a:spcAft>
-          </a:pPr>
-          <a:r>
-            <a:rPr lang="hu-HU" sz="1600" kern="1200" dirty="0" smtClean="0"/>
-            <a:t>back end fejlesztése </a:t>
-          </a:r>
-          <a:endParaRPr lang="hu-HU" sz="1600" kern="1200" dirty="0" smtClean="0"/>
-        </a:p>
-      </dsp:txBody>
-      <dsp:txXfrm>
-        <a:off x="2847356" y="3335727"/>
-        <a:ext cx="1122756" cy="541351"/>
-      </dsp:txXfrm>
-    </dsp:sp>
-    <dsp:sp modelId="{87CBAF4E-E538-4A21-BFED-F910E33AA535}">
-      <dsp:nvSpPr>
-        <dsp:cNvPr id="0" name=""/>
-        <dsp:cNvSpPr/>
-      </dsp:nvSpPr>
-      <dsp:spPr>
-        <a:xfrm rot="17700000">
-          <a:off x="3550269" y="1827714"/>
-          <a:ext cx="1122756" cy="541351"/>
-        </a:xfrm>
-        <a:prstGeom prst="rect">
-          <a:avLst/>
-        </a:prstGeom>
-        <a:noFill/>
-        <a:ln>
-          <a:noFill/>
-        </a:ln>
-        <a:effectLst/>
-      </dsp:spPr>
-      <dsp:style>
-        <a:lnRef idx="0">
-          <a:scrgbClr r="0" g="0" b="0"/>
-        </a:lnRef>
-        <a:fillRef idx="0">
-          <a:scrgbClr r="0" g="0" b="0"/>
-        </a:fillRef>
-        <a:effectRef idx="0">
-          <a:scrgbClr r="0" g="0" b="0"/>
-        </a:effectRef>
-        <a:fontRef idx="minor"/>
-      </dsp:style>
-    </dsp:sp>
-    <dsp:sp modelId="{75779121-453E-4240-9A7A-00802073DDAD}">
-      <dsp:nvSpPr>
-        <dsp:cNvPr id="0" name=""/>
-        <dsp:cNvSpPr/>
-      </dsp:nvSpPr>
-      <dsp:spPr>
-        <a:xfrm>
-          <a:off x="4109725" y="2581423"/>
-          <a:ext cx="541946" cy="541946"/>
-        </a:xfrm>
-        <a:prstGeom prst="ellipse">
-          <a:avLst/>
-        </a:prstGeom>
-        <a:solidFill>
-          <a:schemeClr val="accent4">
-            <a:hueOff val="108644"/>
-            <a:satOff val="-1035"/>
-            <a:lumOff val="10392"/>
-            <a:alphaOff val="0"/>
-          </a:schemeClr>
-        </a:solidFill>
-        <a:ln w="26425" cap="flat" cmpd="sng" algn="ctr">
-          <a:solidFill>
-            <a:schemeClr val="lt1">
-              <a:hueOff val="0"/>
-              <a:satOff val="0"/>
-              <a:lumOff val="0"/>
-              <a:alphaOff val="0"/>
-            </a:schemeClr>
-          </a:solidFill>
-          <a:prstDash val="solid"/>
-        </a:ln>
-        <a:effectLst/>
-      </dsp:spPr>
-      <dsp:style>
-        <a:lnRef idx="2">
-          <a:scrgbClr r="0" g="0" b="0"/>
-        </a:lnRef>
-        <a:fillRef idx="1">
-          <a:scrgbClr r="0" g="0" b="0"/>
-        </a:fillRef>
-        <a:effectRef idx="0">
-          <a:scrgbClr r="0" g="0" b="0"/>
-        </a:effectRef>
-        <a:fontRef idx="minor">
-          <a:schemeClr val="lt1"/>
-        </a:fontRef>
-      </dsp:style>
-    </dsp:sp>
-    <dsp:sp modelId="{75E59408-38EA-485E-9E84-322A427117FB}">
-      <dsp:nvSpPr>
-        <dsp:cNvPr id="0" name=""/>
-        <dsp:cNvSpPr/>
-      </dsp:nvSpPr>
-      <dsp:spPr>
-        <a:xfrm rot="17700000">
-          <a:off x="3485072" y="3448845"/>
-          <a:ext cx="1122756" cy="541351"/>
-        </a:xfrm>
-        <a:prstGeom prst="rect">
-          <a:avLst/>
-        </a:prstGeom>
-        <a:noFill/>
-        <a:ln>
-          <a:noFill/>
-        </a:ln>
-        <a:effectLst/>
-      </dsp:spPr>
-      <dsp:style>
-        <a:lnRef idx="0">
-          <a:scrgbClr r="0" g="0" b="0"/>
-        </a:lnRef>
-        <a:fillRef idx="0">
-          <a:scrgbClr r="0" g="0" b="0"/>
-        </a:fillRef>
-        <a:effectRef idx="0">
-          <a:scrgbClr r="0" g="0" b="0"/>
-        </a:effectRef>
-        <a:fontRef idx="minor"/>
-      </dsp:style>
-      <dsp:txBody>
-        <a:bodyPr spcFirstLastPara="0" vert="horz" wrap="square" lIns="0" tIns="0" rIns="40640" bIns="0" numCol="1" spcCol="1270" anchor="ctr" anchorCtr="0">
-          <a:noAutofit/>
-        </a:bodyPr>
-        <a:lstStyle/>
-        <a:p>
-          <a:pPr lvl="0" algn="l" defTabSz="711200">
-            <a:lnSpc>
-              <a:spcPct val="90000"/>
-            </a:lnSpc>
-            <a:spcBef>
-              <a:spcPct val="0"/>
-            </a:spcBef>
-            <a:spcAft>
-              <a:spcPct val="35000"/>
-            </a:spcAft>
-          </a:pPr>
-          <a:r>
-            <a:rPr lang="hu-HU" sz="1600" kern="1200" dirty="0" smtClean="0"/>
-            <a:t>javítások és funkciók </a:t>
-          </a:r>
-          <a:endParaRPr lang="hu-HU" sz="1600" kern="1200" dirty="0" smtClean="0"/>
-        </a:p>
-      </dsp:txBody>
-      <dsp:txXfrm>
-        <a:off x="3485072" y="3448845"/>
-        <a:ext cx="1122756" cy="541351"/>
-      </dsp:txXfrm>
-    </dsp:sp>
-    <dsp:sp modelId="{A5630AAE-9C7A-4CC1-BD9E-C29457CDC3DC}">
-      <dsp:nvSpPr>
-        <dsp:cNvPr id="0" name=""/>
-        <dsp:cNvSpPr/>
-      </dsp:nvSpPr>
-      <dsp:spPr>
-        <a:xfrm rot="17700000">
-          <a:off x="4170776" y="1827714"/>
-          <a:ext cx="1122756" cy="541351"/>
-        </a:xfrm>
-        <a:prstGeom prst="rect">
-          <a:avLst/>
-        </a:prstGeom>
-        <a:noFill/>
-        <a:ln>
-          <a:noFill/>
-        </a:ln>
-        <a:effectLst/>
-      </dsp:spPr>
-      <dsp:style>
-        <a:lnRef idx="0">
-          <a:scrgbClr r="0" g="0" b="0"/>
-        </a:lnRef>
-        <a:fillRef idx="0">
-          <a:scrgbClr r="0" g="0" b="0"/>
-        </a:fillRef>
-        <a:effectRef idx="0">
-          <a:scrgbClr r="0" g="0" b="0"/>
-        </a:effectRef>
-        <a:fontRef idx="minor"/>
-      </dsp:style>
-    </dsp:sp>
-    <dsp:sp modelId="{F92B2C29-A84B-44F4-AAA8-FF8A646DA0F5}">
-      <dsp:nvSpPr>
-        <dsp:cNvPr id="0" name=""/>
-        <dsp:cNvSpPr/>
-      </dsp:nvSpPr>
-      <dsp:spPr>
-        <a:xfrm>
-          <a:off x="4730316" y="2330354"/>
-          <a:ext cx="1044085" cy="1044085"/>
-        </a:xfrm>
-        <a:prstGeom prst="donut">
-          <a:avLst>
-            <a:gd name="adj" fmla="val 20000"/>
-          </a:avLst>
-        </a:prstGeom>
-        <a:solidFill>
-          <a:schemeClr val="accent3">
-            <a:hueOff val="0"/>
-            <a:satOff val="0"/>
-            <a:lumOff val="0"/>
-            <a:alphaOff val="0"/>
-          </a:schemeClr>
-        </a:solidFill>
-        <a:ln w="26425" cap="flat" cmpd="sng" algn="ctr">
-          <a:solidFill>
-            <a:schemeClr val="lt1">
-              <a:hueOff val="0"/>
-              <a:satOff val="0"/>
-              <a:lumOff val="0"/>
-              <a:alphaOff val="0"/>
-            </a:schemeClr>
-          </a:solidFill>
-          <a:prstDash val="solid"/>
-        </a:ln>
-        <a:effectLst/>
-      </dsp:spPr>
-      <dsp:style>
-        <a:lnRef idx="2">
-          <a:scrgbClr r="0" g="0" b="0"/>
-        </a:lnRef>
-        <a:fillRef idx="1">
-          <a:scrgbClr r="0" g="0" b="0"/>
-        </a:fillRef>
-        <a:effectRef idx="0">
-          <a:scrgbClr r="0" g="0" b="0"/>
-        </a:effectRef>
-        <a:fontRef idx="minor">
-          <a:schemeClr val="lt1"/>
-        </a:fontRef>
-      </dsp:style>
-    </dsp:sp>
-    <dsp:sp modelId="{816A918E-DBFA-40F0-B723-DA3CE7E1F180}">
-      <dsp:nvSpPr>
-        <dsp:cNvPr id="0" name=""/>
-        <dsp:cNvSpPr/>
-      </dsp:nvSpPr>
-      <dsp:spPr>
-        <a:xfrm rot="17700000">
-          <a:off x="5098204" y="1479211"/>
-          <a:ext cx="1297914" cy="625494"/>
-        </a:xfrm>
-        <a:prstGeom prst="rect">
-          <a:avLst/>
-        </a:prstGeom>
-        <a:noFill/>
-        <a:ln>
-          <a:noFill/>
-        </a:ln>
-        <a:effectLst/>
-      </dsp:spPr>
-      <dsp:style>
-        <a:lnRef idx="0">
-          <a:scrgbClr r="0" g="0" b="0"/>
-        </a:lnRef>
-        <a:fillRef idx="0">
-          <a:scrgbClr r="0" g="0" b="0"/>
-        </a:fillRef>
-        <a:effectRef idx="0">
-          <a:scrgbClr r="0" g="0" b="0"/>
-        </a:effectRef>
-        <a:fontRef idx="minor"/>
-      </dsp:style>
-      <dsp:txBody>
-        <a:bodyPr spcFirstLastPara="0" vert="horz" wrap="square" lIns="58420" tIns="0" rIns="0" bIns="0" numCol="1" spcCol="1270" anchor="ctr" anchorCtr="0">
-          <a:noAutofit/>
-        </a:bodyPr>
-        <a:lstStyle/>
-        <a:p>
-          <a:pPr lvl="0" algn="l" defTabSz="1022350">
-            <a:lnSpc>
-              <a:spcPct val="90000"/>
-            </a:lnSpc>
-            <a:spcBef>
-              <a:spcPct val="0"/>
-            </a:spcBef>
-            <a:spcAft>
-              <a:spcPct val="35000"/>
-            </a:spcAft>
-          </a:pPr>
-          <a:r>
-            <a:rPr lang="hu-HU" sz="2300" kern="1200" dirty="0" smtClean="0"/>
-            <a:t>Április</a:t>
-          </a:r>
-          <a:endParaRPr lang="hu-HU" sz="2300" kern="1200" dirty="0" smtClean="0"/>
-        </a:p>
-      </dsp:txBody>
-      <dsp:txXfrm>
-        <a:off x="5098204" y="1479211"/>
-        <a:ext cx="1297914" cy="625494"/>
-      </dsp:txXfrm>
-    </dsp:sp>
-    <dsp:sp modelId="{5CE32B6C-E51C-4BD8-9A88-320303DEB68C}">
-      <dsp:nvSpPr>
-        <dsp:cNvPr id="0" name=""/>
-        <dsp:cNvSpPr/>
-      </dsp:nvSpPr>
-      <dsp:spPr>
-        <a:xfrm>
-          <a:off x="5853045" y="2581423"/>
-          <a:ext cx="541946" cy="541946"/>
-        </a:xfrm>
-        <a:prstGeom prst="ellipse">
-          <a:avLst/>
-        </a:prstGeom>
-        <a:solidFill>
-          <a:schemeClr val="accent4">
-            <a:hueOff val="144859"/>
-            <a:satOff val="-1380"/>
-            <a:lumOff val="13856"/>
-            <a:alphaOff val="0"/>
-          </a:schemeClr>
-        </a:solidFill>
-        <a:ln w="26425" cap="flat" cmpd="sng" algn="ctr">
-          <a:solidFill>
-            <a:schemeClr val="lt1">
-              <a:hueOff val="0"/>
-              <a:satOff val="0"/>
-              <a:lumOff val="0"/>
-              <a:alphaOff val="0"/>
-            </a:schemeClr>
-          </a:solidFill>
-          <a:prstDash val="solid"/>
-        </a:ln>
-        <a:effectLst/>
-      </dsp:spPr>
-      <dsp:style>
-        <a:lnRef idx="2">
-          <a:scrgbClr r="0" g="0" b="0"/>
-        </a:lnRef>
-        <a:fillRef idx="1">
-          <a:scrgbClr r="0" g="0" b="0"/>
-        </a:fillRef>
-        <a:effectRef idx="0">
-          <a:scrgbClr r="0" g="0" b="0"/>
-        </a:effectRef>
-        <a:fontRef idx="minor">
-          <a:schemeClr val="lt1"/>
-        </a:fontRef>
-      </dsp:style>
-    </dsp:sp>
-    <dsp:sp modelId="{06B6C995-C32D-47A2-B38C-E475342560ED}">
-      <dsp:nvSpPr>
-        <dsp:cNvPr id="0" name=""/>
-        <dsp:cNvSpPr/>
-      </dsp:nvSpPr>
-      <dsp:spPr>
-        <a:xfrm rot="17700000">
-          <a:off x="5213269" y="3448845"/>
-          <a:ext cx="1122756" cy="541351"/>
-        </a:xfrm>
-        <a:prstGeom prst="rect">
-          <a:avLst/>
-        </a:prstGeom>
-        <a:noFill/>
-        <a:ln>
-          <a:noFill/>
-        </a:ln>
-        <a:effectLst/>
-      </dsp:spPr>
-      <dsp:style>
-        <a:lnRef idx="0">
-          <a:scrgbClr r="0" g="0" b="0"/>
-        </a:lnRef>
-        <a:fillRef idx="0">
-          <a:scrgbClr r="0" g="0" b="0"/>
-        </a:fillRef>
-        <a:effectRef idx="0">
-          <a:scrgbClr r="0" g="0" b="0"/>
-        </a:effectRef>
-        <a:fontRef idx="minor"/>
-      </dsp:style>
-      <dsp:txBody>
-        <a:bodyPr spcFirstLastPara="0" vert="horz" wrap="square" lIns="0" tIns="0" rIns="40640" bIns="0" numCol="1" spcCol="1270" anchor="ctr" anchorCtr="0">
-          <a:noAutofit/>
-        </a:bodyPr>
-        <a:lstStyle/>
-        <a:p>
-          <a:pPr lvl="0" algn="l" defTabSz="711200">
-            <a:lnSpc>
-              <a:spcPct val="90000"/>
-            </a:lnSpc>
-            <a:spcBef>
-              <a:spcPct val="0"/>
-            </a:spcBef>
-            <a:spcAft>
-              <a:spcPct val="35000"/>
-            </a:spcAft>
-          </a:pPr>
-          <a:r>
-            <a:rPr lang="hu-HU" sz="1600" kern="1200" dirty="0" smtClean="0"/>
-            <a:t>bemutató és </a:t>
-          </a:r>
-          <a:r>
-            <a:rPr lang="hu-HU" sz="1600" kern="1200" dirty="0" err="1" smtClean="0"/>
-            <a:t>dokumen-táció</a:t>
-          </a:r>
-          <a:endParaRPr lang="hu-HU" sz="1600" kern="1200" dirty="0" smtClean="0"/>
-        </a:p>
-      </dsp:txBody>
-      <dsp:txXfrm>
-        <a:off x="5213269" y="3448845"/>
-        <a:ext cx="1122756" cy="541351"/>
-      </dsp:txXfrm>
-    </dsp:sp>
-    <dsp:sp modelId="{E3D436F3-0708-4ACA-B1EA-24447276246C}">
-      <dsp:nvSpPr>
-        <dsp:cNvPr id="0" name=""/>
-        <dsp:cNvSpPr/>
-      </dsp:nvSpPr>
-      <dsp:spPr>
-        <a:xfrm rot="17700000">
-          <a:off x="5914096" y="1827714"/>
-          <a:ext cx="1122756" cy="541351"/>
-        </a:xfrm>
-        <a:prstGeom prst="rect">
-          <a:avLst/>
-        </a:prstGeom>
-        <a:noFill/>
-        <a:ln>
-          <a:noFill/>
-        </a:ln>
-        <a:effectLst/>
-      </dsp:spPr>
-      <dsp:style>
-        <a:lnRef idx="0">
-          <a:scrgbClr r="0" g="0" b="0"/>
-        </a:lnRef>
-        <a:fillRef idx="0">
-          <a:scrgbClr r="0" g="0" b="0"/>
-        </a:fillRef>
-        <a:effectRef idx="0">
-          <a:scrgbClr r="0" g="0" b="0"/>
-        </a:effectRef>
-        <a:fontRef idx="minor"/>
-      </dsp:style>
-    </dsp:sp>
-    <dsp:sp modelId="{D3E8D938-A134-4F99-9B05-5F374ADB3038}">
-      <dsp:nvSpPr>
-        <dsp:cNvPr id="0" name=""/>
-        <dsp:cNvSpPr/>
-      </dsp:nvSpPr>
-      <dsp:spPr>
-        <a:xfrm>
-          <a:off x="6473552" y="2581423"/>
-          <a:ext cx="541946" cy="541946"/>
-        </a:xfrm>
-        <a:prstGeom prst="ellipse">
-          <a:avLst/>
-        </a:prstGeom>
-        <a:solidFill>
-          <a:schemeClr val="accent4">
-            <a:hueOff val="181074"/>
-            <a:satOff val="-1725"/>
-            <a:lumOff val="17320"/>
-            <a:alphaOff val="0"/>
-          </a:schemeClr>
-        </a:solidFill>
-        <a:ln w="26425" cap="flat" cmpd="sng" algn="ctr">
-          <a:solidFill>
-            <a:schemeClr val="lt1">
-              <a:hueOff val="0"/>
-              <a:satOff val="0"/>
-              <a:lumOff val="0"/>
-              <a:alphaOff val="0"/>
-            </a:schemeClr>
-          </a:solidFill>
-          <a:prstDash val="solid"/>
-        </a:ln>
-        <a:effectLst/>
-      </dsp:spPr>
-      <dsp:style>
-        <a:lnRef idx="2">
-          <a:scrgbClr r="0" g="0" b="0"/>
-        </a:lnRef>
-        <a:fillRef idx="1">
-          <a:scrgbClr r="0" g="0" b="0"/>
-        </a:fillRef>
-        <a:effectRef idx="0">
-          <a:scrgbClr r="0" g="0" b="0"/>
-        </a:effectRef>
-        <a:fontRef idx="minor">
-          <a:schemeClr val="lt1"/>
-        </a:fontRef>
-      </dsp:style>
-    </dsp:sp>
-    <dsp:sp modelId="{F1C34573-A1AD-4553-B6D3-4697A7C89051}">
-      <dsp:nvSpPr>
-        <dsp:cNvPr id="0" name=""/>
-        <dsp:cNvSpPr/>
-      </dsp:nvSpPr>
-      <dsp:spPr>
-        <a:xfrm rot="17700000">
-          <a:off x="6221381" y="3448845"/>
-          <a:ext cx="1122756" cy="541351"/>
-        </a:xfrm>
-        <a:prstGeom prst="rect">
-          <a:avLst/>
-        </a:prstGeom>
-        <a:noFill/>
-        <a:ln>
-          <a:noFill/>
-        </a:ln>
-        <a:effectLst/>
-      </dsp:spPr>
-      <dsp:style>
-        <a:lnRef idx="0">
-          <a:scrgbClr r="0" g="0" b="0"/>
-        </a:lnRef>
-        <a:fillRef idx="0">
-          <a:scrgbClr r="0" g="0" b="0"/>
-        </a:fillRef>
-        <a:effectRef idx="0">
-          <a:scrgbClr r="0" g="0" b="0"/>
-        </a:effectRef>
-        <a:fontRef idx="minor"/>
-      </dsp:style>
-      <dsp:txBody>
-        <a:bodyPr spcFirstLastPara="0" vert="horz" wrap="square" lIns="0" tIns="0" rIns="40640" bIns="0" numCol="1" spcCol="1270" anchor="ctr" anchorCtr="0">
-          <a:noAutofit/>
-        </a:bodyPr>
-        <a:lstStyle/>
-        <a:p>
-          <a:pPr lvl="0" algn="l" defTabSz="711200">
-            <a:lnSpc>
-              <a:spcPct val="90000"/>
-            </a:lnSpc>
-            <a:spcBef>
-              <a:spcPct val="0"/>
-            </a:spcBef>
-            <a:spcAft>
-              <a:spcPct val="35000"/>
-            </a:spcAft>
-          </a:pPr>
-          <a:r>
-            <a:rPr lang="hu-HU" sz="1600" kern="1200" dirty="0" smtClean="0"/>
-            <a:t>a tervek </a:t>
-          </a:r>
-          <a:r>
-            <a:rPr lang="hu-HU" sz="1600" kern="1200" dirty="0" err="1" smtClean="0"/>
-            <a:t>megvalósí-tása</a:t>
-          </a:r>
-          <a:r>
-            <a:rPr lang="hu-HU" sz="1600" kern="1200" dirty="0" smtClean="0"/>
-            <a:t> </a:t>
-          </a:r>
-          <a:endParaRPr lang="hu-HU" sz="1600" kern="1200" dirty="0" smtClean="0"/>
-        </a:p>
-      </dsp:txBody>
-      <dsp:txXfrm>
-        <a:off x="6221381" y="3448845"/>
-        <a:ext cx="1122756" cy="541351"/>
-      </dsp:txXfrm>
-    </dsp:sp>
-    <dsp:sp modelId="{B9C15728-DC26-4D85-ADDE-E80575E2E9EF}">
-      <dsp:nvSpPr>
-        <dsp:cNvPr id="0" name=""/>
-        <dsp:cNvSpPr/>
-      </dsp:nvSpPr>
-      <dsp:spPr>
-        <a:xfrm rot="17700000">
-          <a:off x="6534604" y="1827714"/>
-          <a:ext cx="1122756" cy="541351"/>
-        </a:xfrm>
-        <a:prstGeom prst="rect">
-          <a:avLst/>
-        </a:prstGeom>
-        <a:noFill/>
-        <a:ln>
-          <a:noFill/>
-        </a:ln>
-        <a:effectLst/>
-      </dsp:spPr>
-      <dsp:style>
-        <a:lnRef idx="0">
-          <a:scrgbClr r="0" g="0" b="0"/>
-        </a:lnRef>
-        <a:fillRef idx="0">
-          <a:scrgbClr r="0" g="0" b="0"/>
-        </a:fillRef>
-        <a:effectRef idx="0">
-          <a:scrgbClr r="0" g="0" b="0"/>
-        </a:effectRef>
-        <a:fontRef idx="minor"/>
-      </dsp:style>
-    </dsp:sp>
-    <dsp:sp modelId="{A018408A-BEDE-4476-B17C-40A4EE127940}">
-      <dsp:nvSpPr>
-        <dsp:cNvPr id="0" name=""/>
-        <dsp:cNvSpPr/>
-      </dsp:nvSpPr>
-      <dsp:spPr>
-        <a:xfrm>
-          <a:off x="7094143" y="2330354"/>
-          <a:ext cx="1044085" cy="1044085"/>
-        </a:xfrm>
-        <a:prstGeom prst="donut">
-          <a:avLst>
-            <a:gd name="adj" fmla="val 20000"/>
-          </a:avLst>
-        </a:prstGeom>
-        <a:solidFill>
-          <a:schemeClr val="accent3">
-            <a:hueOff val="0"/>
-            <a:satOff val="0"/>
-            <a:lumOff val="0"/>
-            <a:alphaOff val="0"/>
-          </a:schemeClr>
-        </a:solidFill>
-        <a:ln w="26425" cap="flat" cmpd="sng" algn="ctr">
-          <a:solidFill>
-            <a:schemeClr val="lt1">
-              <a:hueOff val="0"/>
-              <a:satOff val="0"/>
-              <a:lumOff val="0"/>
-              <a:alphaOff val="0"/>
-            </a:schemeClr>
-          </a:solidFill>
-          <a:prstDash val="solid"/>
-        </a:ln>
-        <a:effectLst/>
-      </dsp:spPr>
-      <dsp:style>
-        <a:lnRef idx="2">
-          <a:scrgbClr r="0" g="0" b="0"/>
-        </a:lnRef>
-        <a:fillRef idx="1">
-          <a:scrgbClr r="0" g="0" b="0"/>
-        </a:fillRef>
-        <a:effectRef idx="0">
-          <a:scrgbClr r="0" g="0" b="0"/>
-        </a:effectRef>
-        <a:fontRef idx="minor">
-          <a:schemeClr val="lt1"/>
-        </a:fontRef>
-      </dsp:style>
-    </dsp:sp>
-    <dsp:sp modelId="{3F0F2F79-813B-4F6C-AF8C-4AE3BC8E5DE1}">
-      <dsp:nvSpPr>
-        <dsp:cNvPr id="0" name=""/>
-        <dsp:cNvSpPr/>
-      </dsp:nvSpPr>
-      <dsp:spPr>
-        <a:xfrm rot="17700000">
-          <a:off x="7462032" y="1479211"/>
-          <a:ext cx="1297914" cy="625494"/>
-        </a:xfrm>
-        <a:prstGeom prst="rect">
-          <a:avLst/>
-        </a:prstGeom>
-        <a:noFill/>
-        <a:ln>
-          <a:noFill/>
-        </a:ln>
-        <a:effectLst/>
-      </dsp:spPr>
-      <dsp:style>
-        <a:lnRef idx="0">
-          <a:scrgbClr r="0" g="0" b="0"/>
-        </a:lnRef>
-        <a:fillRef idx="0">
-          <a:scrgbClr r="0" g="0" b="0"/>
-        </a:fillRef>
-        <a:effectRef idx="0">
-          <a:scrgbClr r="0" g="0" b="0"/>
-        </a:effectRef>
-        <a:fontRef idx="minor"/>
-      </dsp:style>
-      <dsp:txBody>
-        <a:bodyPr spcFirstLastPara="0" vert="horz" wrap="square" lIns="58420" tIns="0" rIns="0" bIns="0" numCol="1" spcCol="1270" anchor="ctr" anchorCtr="0">
-          <a:noAutofit/>
-        </a:bodyPr>
-        <a:lstStyle/>
-        <a:p>
-          <a:pPr lvl="0" algn="l" defTabSz="1022350">
-            <a:lnSpc>
-              <a:spcPct val="90000"/>
-            </a:lnSpc>
-            <a:spcBef>
-              <a:spcPct val="0"/>
-            </a:spcBef>
-            <a:spcAft>
-              <a:spcPct val="35000"/>
-            </a:spcAft>
-          </a:pPr>
-          <a:r>
-            <a:rPr lang="hu-HU" sz="2300" kern="1200" dirty="0" smtClean="0"/>
-            <a:t>Május</a:t>
-          </a:r>
-          <a:endParaRPr lang="hu-HU" sz="2300" kern="1200" dirty="0"/>
-        </a:p>
-      </dsp:txBody>
-      <dsp:txXfrm>
-        <a:off x="7462032" y="1479211"/>
-        <a:ext cx="1297914" cy="625494"/>
-      </dsp:txXfrm>
-    </dsp:sp>
-    <dsp:sp modelId="{70DFB032-A1F1-4FA4-880B-578355A18589}">
-      <dsp:nvSpPr>
-        <dsp:cNvPr id="0" name=""/>
-        <dsp:cNvSpPr/>
-      </dsp:nvSpPr>
-      <dsp:spPr>
-        <a:xfrm>
-          <a:off x="8216873" y="2581423"/>
-          <a:ext cx="541946" cy="541946"/>
-        </a:xfrm>
-        <a:prstGeom prst="ellipse">
-          <a:avLst/>
-        </a:prstGeom>
-        <a:solidFill>
-          <a:schemeClr val="accent4">
-            <a:hueOff val="217289"/>
-            <a:satOff val="-2070"/>
-            <a:lumOff val="20784"/>
-            <a:alphaOff val="0"/>
-          </a:schemeClr>
-        </a:solidFill>
-        <a:ln w="26425" cap="flat" cmpd="sng" algn="ctr">
-          <a:solidFill>
-            <a:schemeClr val="lt1">
-              <a:hueOff val="0"/>
-              <a:satOff val="0"/>
-              <a:lumOff val="0"/>
-              <a:alphaOff val="0"/>
-            </a:schemeClr>
-          </a:solidFill>
-          <a:prstDash val="solid"/>
-        </a:ln>
-        <a:effectLst/>
-      </dsp:spPr>
-      <dsp:style>
-        <a:lnRef idx="2">
-          <a:scrgbClr r="0" g="0" b="0"/>
-        </a:lnRef>
-        <a:fillRef idx="1">
-          <a:scrgbClr r="0" g="0" b="0"/>
-        </a:fillRef>
-        <a:effectRef idx="0">
-          <a:scrgbClr r="0" g="0" b="0"/>
-        </a:effectRef>
-        <a:fontRef idx="minor">
-          <a:schemeClr val="lt1"/>
-        </a:fontRef>
-      </dsp:style>
-    </dsp:sp>
-    <dsp:sp modelId="{7CFFD670-DC0B-4A7F-8671-BA53DAD59CF2}">
-      <dsp:nvSpPr>
-        <dsp:cNvPr id="0" name=""/>
-        <dsp:cNvSpPr/>
-      </dsp:nvSpPr>
-      <dsp:spPr>
-        <a:xfrm rot="17700000">
-          <a:off x="7589527" y="3592861"/>
-          <a:ext cx="1122756" cy="541351"/>
-        </a:xfrm>
-        <a:prstGeom prst="rect">
-          <a:avLst/>
-        </a:prstGeom>
-        <a:noFill/>
-        <a:ln>
-          <a:noFill/>
-        </a:ln>
-        <a:effectLst/>
-      </dsp:spPr>
-      <dsp:style>
-        <a:lnRef idx="0">
-          <a:scrgbClr r="0" g="0" b="0"/>
-        </a:lnRef>
-        <a:fillRef idx="0">
-          <a:scrgbClr r="0" g="0" b="0"/>
-        </a:fillRef>
-        <a:effectRef idx="0">
-          <a:scrgbClr r="0" g="0" b="0"/>
-        </a:effectRef>
-        <a:fontRef idx="minor"/>
-      </dsp:style>
-      <dsp:txBody>
-        <a:bodyPr spcFirstLastPara="0" vert="horz" wrap="square" lIns="0" tIns="0" rIns="40640" bIns="0" numCol="1" spcCol="1270" anchor="ctr" anchorCtr="0">
-          <a:noAutofit/>
-        </a:bodyPr>
-        <a:lstStyle/>
-        <a:p>
-          <a:pPr lvl="0" algn="l" defTabSz="711200">
-            <a:lnSpc>
-              <a:spcPct val="90000"/>
-            </a:lnSpc>
-            <a:spcBef>
-              <a:spcPct val="0"/>
-            </a:spcBef>
-            <a:spcAft>
-              <a:spcPct val="35000"/>
-            </a:spcAft>
+            <a:buChar char="••"/>
           </a:pPr>
           <a:r>
             <a:rPr lang="hu-HU" sz="1600" kern="1200" dirty="0" smtClean="0"/>
             <a:t>második prezentáció és </a:t>
           </a:r>
           <a:r>
-            <a:rPr lang="hu-HU" sz="1600" kern="1200" dirty="0" err="1" smtClean="0"/>
-            <a:t>dokumentá-ció</a:t>
+            <a:rPr lang="hu-HU" sz="1600" kern="1200" dirty="0" smtClean="0"/>
+            <a:t>dokumentáció</a:t>
           </a:r>
           <a:endParaRPr lang="hu-HU" sz="1600" kern="1200" dirty="0"/>
         </a:p>
       </dsp:txBody>
-      <dsp:txXfrm>
-        <a:off x="7589527" y="3592861"/>
-        <a:ext cx="1122756" cy="541351"/>
+      <dsp:txXfrm rot="-5400000">
+        <a:off x="1001022" y="3909257"/>
+        <a:ext cx="7460890" cy="838770"/>
       </dsp:txXfrm>
-    </dsp:sp>
-    <dsp:sp modelId="{AAB8024B-B234-4D18-9EA3-77B62614EA77}">
-      <dsp:nvSpPr>
-        <dsp:cNvPr id="0" name=""/>
-        <dsp:cNvSpPr/>
-      </dsp:nvSpPr>
-      <dsp:spPr>
-        <a:xfrm rot="17700000">
-          <a:off x="8277924" y="1827714"/>
-          <a:ext cx="1122756" cy="541351"/>
-        </a:xfrm>
-        <a:prstGeom prst="rect">
-          <a:avLst/>
-        </a:prstGeom>
-        <a:noFill/>
-        <a:ln>
-          <a:noFill/>
-        </a:ln>
-        <a:effectLst/>
-      </dsp:spPr>
-      <dsp:style>
-        <a:lnRef idx="0">
-          <a:scrgbClr r="0" g="0" b="0"/>
-        </a:lnRef>
-        <a:fillRef idx="0">
-          <a:scrgbClr r="0" g="0" b="0"/>
-        </a:fillRef>
-        <a:effectRef idx="0">
-          <a:scrgbClr r="0" g="0" b="0"/>
-        </a:effectRef>
-        <a:fontRef idx="minor"/>
-      </dsp:style>
     </dsp:sp>
   </dsp:spTree>
 </dsp:drawing>
@@ -9301,7 +8359,7 @@
         </a:prstGeom>
         <a:solidFill>
           <a:schemeClr val="accent4">
-            <a:hueOff val="54322"/>
+            <a:hueOff val="54323"/>
             <a:satOff val="-517"/>
             <a:lumOff val="5196"/>
             <a:alphaOff val="0"/>
@@ -9377,7 +8435,7 @@
         </a:prstGeom>
         <a:solidFill>
           <a:schemeClr val="accent4">
-            <a:hueOff val="108644"/>
+            <a:hueOff val="108645"/>
             <a:satOff val="-1035"/>
             <a:lumOff val="10392"/>
             <a:alphaOff val="0"/>
@@ -9454,7 +8512,7 @@
         </a:prstGeom>
         <a:solidFill>
           <a:schemeClr val="accent4">
-            <a:hueOff val="162966"/>
+            <a:hueOff val="162968"/>
             <a:satOff val="-1552"/>
             <a:lumOff val="15588"/>
             <a:alphaOff val="0"/>
@@ -9530,7 +8588,7 @@
         </a:prstGeom>
         <a:solidFill>
           <a:schemeClr val="accent4">
-            <a:hueOff val="217289"/>
+            <a:hueOff val="217290"/>
             <a:satOff val="-2070"/>
             <a:lumOff val="20784"/>
             <a:alphaOff val="0"/>
@@ -11370,11 +10428,13 @@
 </file>
 
 <file path=ppt/diagrams/layout3.xml><?xml version="1.0" encoding="utf-8"?>
-<dgm:layoutDef xmlns:dgm="http://schemas.openxmlformats.org/drawingml/2006/diagram" xmlns:a="http://schemas.openxmlformats.org/drawingml/2006/main" uniqueId="urn:microsoft.com/office/officeart/2008/layout/CircleAccentTimeline">
+<dgm:layoutDef xmlns:dgm="http://schemas.openxmlformats.org/drawingml/2006/diagram" xmlns:a="http://schemas.openxmlformats.org/drawingml/2006/main" uniqueId="urn:microsoft.com/office/officeart/2005/8/layout/chevron2">
   <dgm:title val=""/>
   <dgm:desc val=""/>
   <dgm:catLst>
-    <dgm:cat type="process" pri="7500"/>
+    <dgm:cat type="process" pri="12000"/>
+    <dgm:cat type="list" pri="16000"/>
+    <dgm:cat type="convert" pri="11000"/>
   </dgm:catLst>
   <dgm:sampData>
     <dgm:dataModel>
@@ -11398,14 +10458,26 @@
         <dgm:pt modelId="22">
           <dgm:prSet phldr="1"/>
         </dgm:pt>
+        <dgm:pt modelId="3">
+          <dgm:prSet phldr="1"/>
+        </dgm:pt>
+        <dgm:pt modelId="31">
+          <dgm:prSet phldr="1"/>
+        </dgm:pt>
+        <dgm:pt modelId="32">
+          <dgm:prSet phldr="1"/>
+        </dgm:pt>
       </dgm:ptLst>
       <dgm:cxnLst>
         <dgm:cxn modelId="4" srcId="0" destId="1" srcOrd="0" destOrd="0"/>
-        <dgm:cxn modelId="41" srcId="1" destId="11" srcOrd="0" destOrd="0"/>
-        <dgm:cxn modelId="42" srcId="1" destId="12" srcOrd="1" destOrd="0"/>
-        <dgm:cxn modelId="5" srcId="0" destId="2" srcOrd="0" destOrd="0"/>
-        <dgm:cxn modelId="51" srcId="2" destId="21" srcOrd="0" destOrd="0"/>
-        <dgm:cxn modelId="52" srcId="2" destId="22" srcOrd="1" destOrd="0"/>
+        <dgm:cxn modelId="5" srcId="0" destId="2" srcOrd="1" destOrd="0"/>
+        <dgm:cxn modelId="6" srcId="0" destId="3" srcOrd="2" destOrd="0"/>
+        <dgm:cxn modelId="13" srcId="1" destId="11" srcOrd="0" destOrd="0"/>
+        <dgm:cxn modelId="14" srcId="1" destId="12" srcOrd="1" destOrd="0"/>
+        <dgm:cxn modelId="23" srcId="2" destId="21" srcOrd="0" destOrd="0"/>
+        <dgm:cxn modelId="24" srcId="2" destId="22" srcOrd="1" destOrd="0"/>
+        <dgm:cxn modelId="33" srcId="3" destId="31" srcOrd="0" destOrd="0"/>
+        <dgm:cxn modelId="34" srcId="3" destId="32" srcOrd="1" destOrd="0"/>
       </dgm:cxnLst>
       <dgm:bg/>
       <dgm:whole/>
@@ -11415,24 +10487,10 @@
     <dgm:dataModel>
       <dgm:ptLst>
         <dgm:pt modelId="0" type="doc"/>
-        <dgm:pt modelId="1">
-          <dgm:prSet phldr="1"/>
-        </dgm:pt>
-        <dgm:pt modelId="11">
-          <dgm:prSet phldr="1"/>
-        </dgm:pt>
-        <dgm:pt modelId="2">
-          <dgm:prSet phldr="1"/>
-        </dgm:pt>
-        <dgm:pt modelId="21">
-          <dgm:prSet phldr="1"/>
-        </dgm:pt>
+        <dgm:pt modelId="1"/>
       </dgm:ptLst>
       <dgm:cxnLst>
         <dgm:cxn modelId="4" srcId="0" destId="1" srcOrd="0" destOrd="0"/>
-        <dgm:cxn modelId="41" srcId="1" destId="11" srcOrd="0" destOrd="0"/>
-        <dgm:cxn modelId="5" srcId="0" destId="2" srcOrd="0" destOrd="0"/>
-        <dgm:cxn modelId="51" srcId="2" destId="21" srcOrd="0" destOrd="0"/>
       </dgm:cxnLst>
       <dgm:bg/>
       <dgm:whole/>
@@ -11442,154 +10500,162 @@
     <dgm:dataModel>
       <dgm:ptLst>
         <dgm:pt modelId="0" type="doc"/>
-        <dgm:pt modelId="1">
-          <dgm:prSet phldr="1"/>
-        </dgm:pt>
-        <dgm:pt modelId="11">
-          <dgm:prSet phldr="1"/>
-        </dgm:pt>
-        <dgm:pt modelId="2">
-          <dgm:prSet phldr="1"/>
-        </dgm:pt>
-        <dgm:pt modelId="21">
-          <dgm:prSet phldr="1"/>
-        </dgm:pt>
+        <dgm:pt modelId="1"/>
+        <dgm:pt modelId="11"/>
+        <dgm:pt modelId="2"/>
+        <dgm:pt modelId="21"/>
+        <dgm:pt modelId="3"/>
+        <dgm:pt modelId="31"/>
+        <dgm:pt modelId="4"/>
+        <dgm:pt modelId="41"/>
       </dgm:ptLst>
       <dgm:cxnLst>
-        <dgm:cxn modelId="4" srcId="0" destId="1" srcOrd="0" destOrd="0"/>
-        <dgm:cxn modelId="41" srcId="1" destId="11" srcOrd="0" destOrd="0"/>
-        <dgm:cxn modelId="5" srcId="0" destId="2" srcOrd="0" destOrd="0"/>
-        <dgm:cxn modelId="51" srcId="2" destId="21" srcOrd="0" destOrd="0"/>
+        <dgm:cxn modelId="5" srcId="0" destId="1" srcOrd="0" destOrd="0"/>
+        <dgm:cxn modelId="6" srcId="0" destId="2" srcOrd="1" destOrd="0"/>
+        <dgm:cxn modelId="7" srcId="0" destId="3" srcOrd="2" destOrd="0"/>
+        <dgm:cxn modelId="8" srcId="0" destId="4" srcOrd="3" destOrd="0"/>
+        <dgm:cxn modelId="13" srcId="1" destId="11" srcOrd="0" destOrd="0"/>
+        <dgm:cxn modelId="23" srcId="2" destId="21" srcOrd="0" destOrd="0"/>
+        <dgm:cxn modelId="33" srcId="3" destId="31" srcOrd="0" destOrd="0"/>
+        <dgm:cxn modelId="43" srcId="4" destId="41" srcOrd="0" destOrd="0"/>
       </dgm:cxnLst>
       <dgm:bg/>
       <dgm:whole/>
     </dgm:dataModel>
   </dgm:clrData>
-  <dgm:layoutNode name="Name0">
+  <dgm:layoutNode name="linearFlow">
     <dgm:varLst>
       <dgm:dir/>
+      <dgm:animLvl val="lvl"/>
+      <dgm:resizeHandles val="exact"/>
     </dgm:varLst>
-    <dgm:choose name="Name1">
-      <dgm:if name="Name2" func="var" arg="dir" op="equ" val="norm">
-        <dgm:alg type="lin">
-          <dgm:param type="fallback" val="2D"/>
-          <dgm:param type="nodeVertAlign" val="b"/>
-        </dgm:alg>
-      </dgm:if>
-      <dgm:else name="Name3">
-        <dgm:alg type="lin">
-          <dgm:param type="fallback" val="2D"/>
-          <dgm:param type="nodeVertAlign" val="b"/>
-          <dgm:param type="linDir" val="fromR"/>
-        </dgm:alg>
-      </dgm:else>
-    </dgm:choose>
+    <dgm:alg type="lin">
+      <dgm:param type="linDir" val="fromT"/>
+      <dgm:param type="nodeHorzAlign" val="l"/>
+    </dgm:alg>
     <dgm:shape xmlns:r="http://schemas.openxmlformats.org/officeDocument/2006/relationships" r:blip="">
       <dgm:adjLst/>
     </dgm:shape>
+    <dgm:presOf/>
     <dgm:constrLst>
-      <dgm:constr type="h" for="ch" forName="parComposite" refType="h"/>
-      <dgm:constr type="w" for="ch" forName="parComposite" refType="h" refFor="ch" refForName="parComposite" fact="0.4986"/>
-      <dgm:constr type="h" for="ch" forName="desComposite" refType="h" fact="0.8722"/>
-      <dgm:constr type="w" for="ch" forName="desComposite" refType="h" refFor="ch" refForName="desComposite" fact="0.6056"/>
-      <dgm:constr type="w" for="ch" forName="parBackupNorm" refType="w" refFor="ch" refForName="parComposite" fact="-0.3369"/>
-      <dgm:constr type="w" for="ch" forName="parBackupRTL" refType="w" refFor="ch" refForName="parComposite" fact="-0.3369"/>
-      <dgm:constr type="w" for="ch" forName="parBackupRev" refType="w" refFor="ch" refForName="parComposite" fact="0"/>
-      <dgm:constr type="w" for="ch" forName="desBackupLeftNorm" refType="w" refFor="ch" refForName="desComposite" fact="-0.3376"/>
-      <dgm:constr type="w" for="ch" forName="desBackupLeftRev" refType="w" refFor="ch" refForName="desComposite" fact="-0.3376"/>
-      <dgm:constr type="w" for="ch" forName="desBackupRightNorm" refType="w" refFor="ch" refForName="desComposite" fact="-0.3376"/>
-      <dgm:constr type="w" for="ch" forName="desBackupRightRev" refType="w" refFor="ch" refForName="desComposite" fact="-0.3376"/>
-      <dgm:constr type="w" for="ch" forName="parSpace" refType="w" refFor="ch" refForName="parComposite" fact="0.05"/>
-      <dgm:constr type="w" for="ch" forName="desSpace" refType="w" refFor="ch" refForName="parComposite" fact="0.05"/>
-      <dgm:constr type="primFontSz" for="des" forName="parTx" op="equ" val="65"/>
-      <dgm:constr type="primFontSz" for="des" forName="chTx" refType="primFontSz" refFor="des" refForName="parTx" op="lte" val="65"/>
-      <dgm:constr type="primFontSz" for="des" forName="desTx" refType="primFontSz" refFor="des" refForName="chTx" op="lte" val="65"/>
-      <dgm:constr type="primFontSz" for="des" forName="desTx" refType="primFontSz" refFor="des" refForName="parTx" op="lte"/>
+      <dgm:constr type="h" for="ch" forName="composite" refType="h"/>
+      <dgm:constr type="w" for="ch" forName="composite" refType="w"/>
+      <dgm:constr type="h" for="des" forName="parentText" op="equ"/>
+      <dgm:constr type="h" for="ch" forName="sp" val="-14.88"/>
+      <dgm:constr type="h" for="ch" forName="sp" refType="w" refFor="des" refForName="parentText" op="gte" fact="-0.3"/>
+      <dgm:constr type="primFontSz" for="des" forName="parentText" op="equ" val="65"/>
+      <dgm:constr type="primFontSz" for="des" forName="descendantText" op="equ" val="65"/>
     </dgm:constrLst>
-    <dgm:forEach name="Name4" axis="ch" ptType="node">
-      <dgm:layoutNode name="parComposite">
+    <dgm:ruleLst/>
+    <dgm:forEach name="Name0" axis="ch" ptType="node">
+      <dgm:layoutNode name="composite">
         <dgm:alg type="composite"/>
         <dgm:shape xmlns:r="http://schemas.openxmlformats.org/officeDocument/2006/relationships" r:blip="">
           <dgm:adjLst/>
         </dgm:shape>
-        <dgm:choose name="Name5">
-          <dgm:if name="Name6" func="var" arg="dir" op="equ" val="norm">
+        <dgm:presOf/>
+        <dgm:choose name="Name1">
+          <dgm:if name="Name2" func="var" arg="dir" op="equ" val="norm">
             <dgm:constrLst>
-              <dgm:constr type="l" for="ch" forName="parBigCircle"/>
-              <dgm:constr type="ctrY" for="ch" forName="parBigCircle" refType="h" fact="0.5639"/>
-              <dgm:constr type="w" for="ch" forName="parBigCircle" refType="w" fact="0.6631"/>
-              <dgm:constr type="h" for="ch" forName="parBigCircle" refType="w" refFor="ch" refForName="parBigCircle"/>
-              <dgm:constr type="r" for="ch" forName="parTx" refType="w"/>
-              <dgm:constr type="t" for="ch" forName="parTx"/>
-              <dgm:constr type="w" for="ch" forName="parTx" refType="w" fact="0.7084"/>
-              <dgm:constr type="h" for="ch" forName="parTx" refType="h" fact="0.4562"/>
-              <dgm:constr type="t" for="ch" forName="bSpace" refType="ctrY" refFor="ch" refForName="parBigCircle"/>
-              <dgm:constr type="b" for="ch" forName="bSpace" refType="h"/>
-              <dgm:constr type="l" for="ch" forName="bSpace"/>
-              <dgm:constr type="w" for="ch" forName="bSpace" val="1"/>
+              <dgm:constr type="t" for="ch" forName="parentText"/>
+              <dgm:constr type="l" for="ch" forName="parentText"/>
+              <dgm:constr type="w" for="ch" forName="parentText" refType="w" fact="0.4"/>
+              <dgm:constr type="h" for="ch" forName="parentText" refType="h"/>
+              <dgm:constr type="w" for="ch" forName="parentText" refType="w" op="lte" fact="0.5"/>
+              <dgm:constr type="w" for="ch" forName="parentText" refType="h" refFor="ch" refForName="parentText" op="lte" fact="0.7"/>
+              <dgm:constr type="h" for="ch" forName="parentText" refType="w" refFor="ch" refForName="parentText" op="lte" fact="3"/>
+              <dgm:constr type="l" for="ch" forName="descendantText" refType="w" refFor="ch" refForName="parentText"/>
+              <dgm:constr type="w" for="ch" forName="descendantText" refType="w"/>
+              <dgm:constr type="wOff" for="ch" forName="descendantText" refType="w" refFor="ch" refForName="parentText" fact="-1"/>
+              <dgm:constr type="t" for="ch" forName="descendantText"/>
+              <dgm:constr type="b" for="ch" forName="descendantText" refType="h" refFor="ch" refForName="parentText"/>
+              <dgm:constr type="bOff" for="ch" forName="descendantText" refType="w" refFor="ch" refForName="parentText" fact="-0.5"/>
             </dgm:constrLst>
           </dgm:if>
-          <dgm:else name="Name7">
+          <dgm:else name="Name3">
             <dgm:constrLst>
-              <dgm:constr type="r" for="ch" forName="parBigCircle" refType="w"/>
-              <dgm:constr type="ctrY" for="ch" forName="parBigCircle" refType="h" fact="0.5639"/>
-              <dgm:constr type="w" for="ch" forName="parBigCircle" refType="w" fact="0.6631"/>
-              <dgm:constr type="h" for="ch" forName="parBigCircle" refType="w" refFor="ch" refForName="parBigCircle"/>
-              <dgm:constr type="l" for="ch" forName="parTx" fact="0"/>
-              <dgm:constr type="t" for="ch" forName="parTx"/>
-              <dgm:constr type="w" for="ch" forName="parTx" refType="w" fact="0.7084"/>
-              <dgm:constr type="h" for="ch" forName="parTx" refType="h" fact="0.4562"/>
-              <dgm:constr type="t" for="ch" forName="bSpace" refType="ctrY" refFor="ch" refForName="parBigCircle"/>
-              <dgm:constr type="b" for="ch" forName="bSpace" refType="h"/>
-              <dgm:constr type="r" for="ch" forName="bSpace"/>
-              <dgm:constr type="w" for="ch" forName="bSpace" val="1"/>
+              <dgm:constr type="t" for="ch" forName="parentText"/>
+              <dgm:constr type="r" for="ch" forName="parentText" refType="w"/>
+              <dgm:constr type="w" for="ch" forName="parentText" refType="w" fact="0.4"/>
+              <dgm:constr type="h" for="ch" forName="parentText" refType="h"/>
+              <dgm:constr type="w" for="ch" forName="parentText" refType="w" op="lte" fact="0.5"/>
+              <dgm:constr type="w" for="ch" forName="parentText" refType="h" refFor="ch" refForName="parentText" op="lte" fact="0.7"/>
+              <dgm:constr type="h" for="ch" forName="parentText" refType="w" refFor="ch" refForName="parentText" op="lte" fact="3"/>
+              <dgm:constr type="l" for="ch" forName="descendantText"/>
+              <dgm:constr type="w" for="ch" forName="descendantText" refType="w"/>
+              <dgm:constr type="wOff" for="ch" forName="descendantText" refType="w" refFor="ch" refForName="parentText" fact="-1"/>
+              <dgm:constr type="t" for="ch" forName="descendantText"/>
+              <dgm:constr type="b" for="ch" forName="descendantText" refType="h" refFor="ch" refForName="parentText"/>
+              <dgm:constr type="bOff" for="ch" forName="descendantText" refType="w" refFor="ch" refForName="parentText" fact="-0.5"/>
             </dgm:constrLst>
           </dgm:else>
         </dgm:choose>
-        <dgm:layoutNode name="parBigCircle" styleLbl="node0">
-          <dgm:alg type="sp"/>
-          <dgm:shape xmlns:r="http://schemas.openxmlformats.org/officeDocument/2006/relationships" type="donut" r:blip="">
-            <dgm:adjLst>
-              <dgm:adj idx="1" val="0.2"/>
-            </dgm:adjLst>
+        <dgm:ruleLst/>
+        <dgm:layoutNode name="parentText" styleLbl="alignNode1">
+          <dgm:varLst>
+            <dgm:chMax val="1"/>
+            <dgm:bulletEnabled val="1"/>
+          </dgm:varLst>
+          <dgm:alg type="tx"/>
+          <dgm:shape xmlns:r="http://schemas.openxmlformats.org/officeDocument/2006/relationships" rot="90" type="chevron" r:blip="">
+            <dgm:adjLst/>
           </dgm:shape>
-          <dgm:presOf/>
+          <dgm:presOf axis="self" ptType="node"/>
           <dgm:constrLst>
-            <dgm:constr type="h" refType="w" op="equ"/>
+            <dgm:constr type="lMarg" refType="primFontSz" fact="0.05"/>
+            <dgm:constr type="rMarg" refType="primFontSz" fact="0.05"/>
+            <dgm:constr type="tMarg" refType="primFontSz" fact="0.05"/>
+            <dgm:constr type="bMarg" refType="primFontSz" fact="0.05"/>
           </dgm:constrLst>
+          <dgm:ruleLst>
+            <dgm:rule type="h" val="100" fact="NaN" max="NaN"/>
+            <dgm:rule type="primFontSz" val="24" fact="NaN" max="NaN"/>
+            <dgm:rule type="h" val="110" fact="NaN" max="NaN"/>
+            <dgm:rule type="primFontSz" val="18" fact="NaN" max="NaN"/>
+            <dgm:rule type="h" val="INF" fact="NaN" max="NaN"/>
+            <dgm:rule type="primFontSz" val="5" fact="NaN" max="NaN"/>
+          </dgm:ruleLst>
         </dgm:layoutNode>
-        <dgm:layoutNode name="parTx" styleLbl="revTx">
-          <dgm:choose name="Name8">
-            <dgm:if name="Name9" func="var" arg="dir" op="equ" val="norm">
+        <dgm:layoutNode name="descendantText" styleLbl="alignAcc1">
+          <dgm:varLst>
+            <dgm:bulletEnabled val="1"/>
+          </dgm:varLst>
+          <dgm:choose name="Name4">
+            <dgm:if name="Name5" func="var" arg="dir" op="equ" val="norm">
               <dgm:alg type="tx">
-                <dgm:param type="autoTxRot" val="grav"/>
-                <dgm:param type="parTxLTRAlign" val="l"/>
+                <dgm:param type="stBulletLvl" val="1"/>
+                <dgm:param type="txAnchorVertCh" val="mid"/>
               </dgm:alg>
-              <dgm:shape xmlns:r="http://schemas.openxmlformats.org/officeDocument/2006/relationships" rot="295" type="rect" r:blip="">
+              <dgm:shape xmlns:r="http://schemas.openxmlformats.org/officeDocument/2006/relationships" rot="90" type="round2SameRect" r:blip="">
                 <dgm:adjLst/>
               </dgm:shape>
-              <dgm:presOf axis="self" ptType="node"/>
+            </dgm:if>
+            <dgm:else name="Name6">
+              <dgm:alg type="tx">
+                <dgm:param type="stBulletLvl" val="1"/>
+                <dgm:param type="txAnchorVertCh" val="mid"/>
+              </dgm:alg>
+              <dgm:shape xmlns:r="http://schemas.openxmlformats.org/officeDocument/2006/relationships" rot="-90" type="round2SameRect" r:blip="">
+                <dgm:adjLst/>
+              </dgm:shape>
+            </dgm:else>
+          </dgm:choose>
+          <dgm:presOf axis="des" ptType="node"/>
+          <dgm:choose name="Name7">
+            <dgm:if name="Name8" func="var" arg="dir" op="equ" val="norm">
               <dgm:constrLst>
-                <dgm:constr type="lMarg" refType="primFontSz" fact="0.2"/>
-                <dgm:constr type="rMarg"/>
-                <dgm:constr type="tMarg"/>
-                <dgm:constr type="bMarg"/>
+                <dgm:constr type="secFontSz" refType="primFontSz"/>
+                <dgm:constr type="tMarg" refType="primFontSz" fact="0.05"/>
+                <dgm:constr type="bMarg" refType="primFontSz" fact="0.05"/>
+                <dgm:constr type="rMarg" refType="primFontSz" fact="0.05"/>
               </dgm:constrLst>
             </dgm:if>
-            <dgm:else name="Name10">
-              <dgm:alg type="tx">
-                <dgm:param type="autoTxRot" val="grav"/>
-                <dgm:param type="parTxLTRAlign" val="r"/>
-              </dgm:alg>
-              <dgm:shape xmlns:r="http://schemas.openxmlformats.org/officeDocument/2006/relationships" rot="65" type="rect" r:blip="">
-                <dgm:adjLst/>
-              </dgm:shape>
-              <dgm:presOf axis="self" ptType="node"/>
+            <dgm:else name="Name9">
               <dgm:constrLst>
-                <dgm:constr type="lMarg"/>
-                <dgm:constr type="rMarg" refType="primFontSz" fact="0.2"/>
-                <dgm:constr type="tMarg"/>
-                <dgm:constr type="bMarg"/>
+                <dgm:constr type="secFontSz" refType="primFontSz"/>
+                <dgm:constr type="tMarg" refType="primFontSz" fact="0.05"/>
+                <dgm:constr type="bMarg" refType="primFontSz" fact="0.05"/>
+                <dgm:constr type="lMarg" refType="primFontSz" fact="0.05"/>
               </dgm:constrLst>
             </dgm:else>
           </dgm:choose>
@@ -11597,268 +10663,21 @@
             <dgm:rule type="primFontSz" val="5" fact="NaN" max="NaN"/>
           </dgm:ruleLst>
         </dgm:layoutNode>
-        <dgm:layoutNode name="bSpace">
+      </dgm:layoutNode>
+      <dgm:forEach name="Name10" axis="followSib" ptType="sibTrans" cnt="1">
+        <dgm:layoutNode name="sp">
           <dgm:alg type="sp"/>
           <dgm:shape xmlns:r="http://schemas.openxmlformats.org/officeDocument/2006/relationships" r:blip="">
             <dgm:adjLst/>
           </dgm:shape>
-          <dgm:presOf/>
-        </dgm:layoutNode>
-      </dgm:layoutNode>
-      <dgm:choose name="Name11">
-        <dgm:if name="Name12" func="var" arg="dir" op="equ" val="norm">
-          <dgm:layoutNode name="parBackupNorm">
-            <dgm:alg type="sp"/>
-            <dgm:shape xmlns:r="http://schemas.openxmlformats.org/officeDocument/2006/relationships" r:blip="">
-              <dgm:adjLst/>
-            </dgm:shape>
-            <dgm:presOf/>
-          </dgm:layoutNode>
-        </dgm:if>
-        <dgm:else name="Name13">
-          <dgm:layoutNode name="parBackupRTL">
-            <dgm:alg type="sp"/>
-            <dgm:shape xmlns:r="http://schemas.openxmlformats.org/officeDocument/2006/relationships" r:blip="">
-              <dgm:adjLst/>
-            </dgm:shape>
-            <dgm:presOf/>
-          </dgm:layoutNode>
-        </dgm:else>
-      </dgm:choose>
-      <dgm:forEach name="Name14" axis="followSib" ptType="sibTrans" hideLastTrans="0" cnt="1">
-        <dgm:layoutNode name="parSpace">
-          <dgm:alg type="sp"/>
-          <dgm:shape xmlns:r="http://schemas.openxmlformats.org/officeDocument/2006/relationships" r:blip="">
-            <dgm:adjLst/>
-          </dgm:shape>
-          <dgm:presOf/>
+          <dgm:presOf axis="self"/>
+          <dgm:constrLst>
+            <dgm:constr type="w" val="1"/>
+            <dgm:constr type="h" val="37.5"/>
+          </dgm:constrLst>
+          <dgm:ruleLst/>
         </dgm:layoutNode>
       </dgm:forEach>
-      <dgm:forEach name="Name15" axis="ch" ptType="node">
-        <dgm:choose name="Name16">
-          <dgm:if name="Name17" func="var" arg="dir" op="equ" val="norm">
-            <dgm:layoutNode name="desBackupLeftNorm">
-              <dgm:alg type="sp"/>
-              <dgm:shape xmlns:r="http://schemas.openxmlformats.org/officeDocument/2006/relationships" r:blip="">
-                <dgm:adjLst/>
-              </dgm:shape>
-              <dgm:presOf/>
-            </dgm:layoutNode>
-          </dgm:if>
-          <dgm:else name="Name18">
-            <dgm:choose name="Name19">
-              <dgm:if name="Name20" axis="self" ptType="node" func="pos" op="equ" val="1">
-                <dgm:layoutNode name="desBackupRightRev">
-                  <dgm:alg type="sp"/>
-                  <dgm:shape xmlns:r="http://schemas.openxmlformats.org/officeDocument/2006/relationships" r:blip="">
-                    <dgm:adjLst/>
-                  </dgm:shape>
-                  <dgm:presOf/>
-                </dgm:layoutNode>
-              </dgm:if>
-              <dgm:else name="Name21"/>
-            </dgm:choose>
-          </dgm:else>
-        </dgm:choose>
-        <dgm:layoutNode name="desComposite">
-          <dgm:alg type="composite"/>
-          <dgm:shape xmlns:r="http://schemas.openxmlformats.org/officeDocument/2006/relationships" r:blip="">
-            <dgm:adjLst/>
-          </dgm:shape>
-          <dgm:choose name="Name22">
-            <dgm:if name="Name23" func="var" arg="dir" op="equ" val="norm">
-              <dgm:constrLst>
-                <dgm:constr type="ctrX" for="ch" forName="desCircle" refType="w" fact="0.5"/>
-                <dgm:constr type="ctrY" for="ch" forName="desCircle" refType="h" fact="0.5"/>
-                <dgm:constr type="w" for="ch" forName="desCircle" refType="w" fact="0.3249"/>
-                <dgm:constr type="h" for="ch" forName="desCircle" refType="w" refFor="ch" refForName="desCircle"/>
-                <dgm:constr type="l" for="ch" forName="chTx"/>
-                <dgm:constr type="b" for="ch" forName="chTx" refType="h"/>
-                <dgm:constr type="w" for="ch" forName="chTx" refType="w" fact="0.5786"/>
-                <dgm:constr type="h" for="ch" forName="chTx" refType="h" fact="0.4525"/>
-                <dgm:constr type="r" for="ch" forName="desTx" refType="w"/>
-                <dgm:constr type="t" for="ch" forName="desTx"/>
-                <dgm:constr type="w" for="ch" forName="desTx" refType="w" fact="0.5786"/>
-                <dgm:constr type="h" for="ch" forName="desTx" refType="h" fact="0.4525"/>
-              </dgm:constrLst>
-            </dgm:if>
-            <dgm:else name="Name24">
-              <dgm:constrLst>
-                <dgm:constr type="ctrX" for="ch" forName="desCircle" refType="w" fact="0.5"/>
-                <dgm:constr type="ctrY" for="ch" forName="desCircle" refType="h" fact="0.5"/>
-                <dgm:constr type="w" for="ch" forName="desCircle" refType="w" fact="0.3249"/>
-                <dgm:constr type="h" for="ch" forName="desCircle" refType="w" refFor="ch" refForName="desCircle"/>
-                <dgm:constr type="r" for="ch" forName="chTx" refType="w"/>
-                <dgm:constr type="b" for="ch" forName="chTx" refType="h"/>
-                <dgm:constr type="w" for="ch" forName="chTx" refType="w" fact="0.5786"/>
-                <dgm:constr type="h" for="ch" forName="chTx" refType="h" fact="0.4525"/>
-                <dgm:constr type="l" for="ch" forName="desTx"/>
-                <dgm:constr type="t" for="ch" forName="desTx"/>
-                <dgm:constr type="w" for="ch" forName="desTx" refType="w" fact="0.5786"/>
-                <dgm:constr type="h" for="ch" forName="desTx" refType="h" fact="0.4525"/>
-              </dgm:constrLst>
-            </dgm:else>
-          </dgm:choose>
-          <dgm:layoutNode name="desCircle" styleLbl="node1">
-            <dgm:alg type="sp"/>
-            <dgm:shape xmlns:r="http://schemas.openxmlformats.org/officeDocument/2006/relationships" type="ellipse" r:blip="">
-              <dgm:adjLst/>
-            </dgm:shape>
-            <dgm:presOf/>
-            <dgm:constrLst>
-              <dgm:constr type="h" refType="w" op="equ"/>
-            </dgm:constrLst>
-          </dgm:layoutNode>
-          <dgm:layoutNode name="chTx" styleLbl="revTx">
-            <dgm:choose name="Name25">
-              <dgm:if name="Name26" func="var" arg="dir" op="equ" val="norm">
-                <dgm:alg type="tx">
-                  <dgm:param type="autoTxRot" val="grav"/>
-                  <dgm:param type="parTxLTRAlign" val="r"/>
-                  <dgm:param type="txAnchorVert" val="mid"/>
-                  <dgm:param type="txAnchorVertCh" val="mid"/>
-                </dgm:alg>
-                <dgm:shape xmlns:r="http://schemas.openxmlformats.org/officeDocument/2006/relationships" rot="295" type="rect" r:blip="">
-                  <dgm:adjLst/>
-                </dgm:shape>
-                <dgm:presOf axis="self" ptType="node"/>
-              </dgm:if>
-              <dgm:else name="Name27">
-                <dgm:alg type="tx">
-                  <dgm:param type="autoTxRot" val="grav"/>
-                  <dgm:param type="parTxLTRAlign" val="l"/>
-                  <dgm:param type="txAnchorVert" val="mid"/>
-                  <dgm:param type="txAnchorVertCh" val="mid"/>
-                </dgm:alg>
-                <dgm:shape xmlns:r="http://schemas.openxmlformats.org/officeDocument/2006/relationships" rot="65" type="rect" r:blip="">
-                  <dgm:adjLst/>
-                </dgm:shape>
-                <dgm:presOf axis="self" ptType="node"/>
-              </dgm:else>
-            </dgm:choose>
-            <dgm:choose name="Name28">
-              <dgm:if name="Name29" func="var" arg="dir" op="equ" val="norm">
-                <dgm:constrLst>
-                  <dgm:constr type="lMarg"/>
-                  <dgm:constr type="rMarg" refType="primFontSz" fact="0.2"/>
-                  <dgm:constr type="tMarg"/>
-                  <dgm:constr type="bMarg"/>
-                </dgm:constrLst>
-              </dgm:if>
-              <dgm:else name="Name30">
-                <dgm:constrLst>
-                  <dgm:constr type="rMarg"/>
-                  <dgm:constr type="lMarg" refType="primFontSz" fact="0.2"/>
-                  <dgm:constr type="tMarg"/>
-                  <dgm:constr type="bMarg"/>
-                </dgm:constrLst>
-              </dgm:else>
-            </dgm:choose>
-            <dgm:ruleLst>
-              <dgm:rule type="primFontSz" val="5" fact="NaN" max="NaN"/>
-            </dgm:ruleLst>
-          </dgm:layoutNode>
-          <dgm:layoutNode name="desTx" styleLbl="revTx">
-            <dgm:varLst>
-              <dgm:bulletEnabled val="1"/>
-            </dgm:varLst>
-            <dgm:choose name="Name31">
-              <dgm:if name="Name32" func="var" arg="dir" op="equ" val="norm">
-                <dgm:alg type="tx">
-                  <dgm:param type="autoTxRot" val="grav"/>
-                  <dgm:param type="parTxLTRAlign" val="l"/>
-                  <dgm:param type="shpTxLTRAlignCh" val="l"/>
-                  <dgm:param type="stBulletLvl" val="1"/>
-                  <dgm:param type="txAnchorVert" val="mid"/>
-                </dgm:alg>
-                <dgm:shape xmlns:r="http://schemas.openxmlformats.org/officeDocument/2006/relationships" rot="295" type="rect" r:blip="">
-                  <dgm:adjLst/>
-                </dgm:shape>
-                <dgm:presOf axis="des" ptType="node"/>
-              </dgm:if>
-              <dgm:else name="Name33">
-                <dgm:alg type="tx">
-                  <dgm:param type="autoTxRot" val="grav"/>
-                  <dgm:param type="parTxLTRAlign" val="r"/>
-                  <dgm:param type="shpTxLTRAlignCh" val="r"/>
-                  <dgm:param type="stBulletLvl" val="1"/>
-                  <dgm:param type="txAnchorVert" val="mid"/>
-                </dgm:alg>
-                <dgm:shape xmlns:r="http://schemas.openxmlformats.org/officeDocument/2006/relationships" rot="65" type="rect" r:blip="">
-                  <dgm:adjLst/>
-                </dgm:shape>
-                <dgm:presOf axis="des" ptType="node"/>
-              </dgm:else>
-            </dgm:choose>
-            <dgm:choose name="Name34">
-              <dgm:if name="Name35" func="var" arg="dir" op="equ" val="norm">
-                <dgm:constrLst>
-                  <dgm:constr type="rMarg"/>
-                  <dgm:constr type="lMarg" refType="primFontSz" fact="0.2"/>
-                  <dgm:constr type="tMarg"/>
-                  <dgm:constr type="bMarg"/>
-                </dgm:constrLst>
-              </dgm:if>
-              <dgm:else name="Name36">
-                <dgm:constrLst>
-                  <dgm:constr type="lMarg"/>
-                  <dgm:constr type="rMarg" refType="primFontSz" fact="0.2"/>
-                  <dgm:constr type="tMarg"/>
-                  <dgm:constr type="bMarg"/>
-                </dgm:constrLst>
-              </dgm:else>
-            </dgm:choose>
-            <dgm:ruleLst>
-              <dgm:rule type="primFontSz" val="5" fact="NaN" max="NaN"/>
-            </dgm:ruleLst>
-          </dgm:layoutNode>
-        </dgm:layoutNode>
-        <dgm:layoutNode name="desBackupRightNorm">
-          <dgm:alg type="sp"/>
-          <dgm:shape xmlns:r="http://schemas.openxmlformats.org/officeDocument/2006/relationships" r:blip="">
-            <dgm:adjLst/>
-          </dgm:shape>
-          <dgm:presOf/>
-        </dgm:layoutNode>
-        <dgm:choose name="Name37">
-          <dgm:if name="Name38" func="var" arg="dir" op="neq" val="norm">
-            <dgm:choose name="Name39">
-              <dgm:if name="Name40" axis="self" ptType="node" func="revPos" op="neq" val="1">
-                <dgm:layoutNode name="desBackupLeftRev">
-                  <dgm:alg type="sp"/>
-                  <dgm:shape xmlns:r="http://schemas.openxmlformats.org/officeDocument/2006/relationships" r:blip="">
-                    <dgm:adjLst/>
-                  </dgm:shape>
-                  <dgm:presOf/>
-                </dgm:layoutNode>
-              </dgm:if>
-              <dgm:else name="Name41"/>
-            </dgm:choose>
-          </dgm:if>
-          <dgm:else name="Name42"/>
-        </dgm:choose>
-        <dgm:forEach name="Name43" axis="followSib" ptType="sibTrans" hideLastTrans="0" cnt="1">
-          <dgm:layoutNode name="desSpace">
-            <dgm:alg type="sp"/>
-            <dgm:shape xmlns:r="http://schemas.openxmlformats.org/officeDocument/2006/relationships" r:blip="">
-              <dgm:adjLst/>
-            </dgm:shape>
-            <dgm:presOf/>
-          </dgm:layoutNode>
-        </dgm:forEach>
-      </dgm:forEach>
-      <dgm:choose name="Name44">
-        <dgm:if name="Name45" func="var" arg="dir" op="neq" val="norm">
-          <dgm:layoutNode name="parBackupRev">
-            <dgm:alg type="sp"/>
-            <dgm:shape xmlns:r="http://schemas.openxmlformats.org/officeDocument/2006/relationships" r:blip="">
-              <dgm:adjLst/>
-            </dgm:shape>
-            <dgm:presOf/>
-          </dgm:layoutNode>
-        </dgm:if>
-        <dgm:else name="Name46"/>
-      </dgm:choose>
     </dgm:forEach>
   </dgm:layoutNode>
 </dgm:layoutDef>
@@ -17419,7 +16238,7 @@
           <a:p>
             <a:fld id="{00EA7FE1-4A79-42DA-B189-E0C0D0444030}" type="datetimeFigureOut">
               <a:rPr lang="hu-HU" smtClean="0"/>
-              <a:t>2018.05.03.</a:t>
+              <a:t>2018. 05. 08.</a:t>
             </a:fld>
             <a:endParaRPr lang="hu-HU"/>
           </a:p>
@@ -17875,7 +16694,7 @@
           <a:p>
             <a:fld id="{B57514D3-BC05-4BD4-A1C7-F50D08717DCD}" type="datetime1">
               <a:rPr lang="hu-HU" smtClean="0"/>
-              <a:t>2018.05.03.</a:t>
+              <a:t>2018. 05. 08.</a:t>
             </a:fld>
             <a:endParaRPr lang="hu-HU"/>
           </a:p>
@@ -18075,7 +16894,7 @@
           <a:p>
             <a:fld id="{0FDCEE9B-5E5D-4A6B-A5E4-99C36797C4BF}" type="datetime1">
               <a:rPr lang="hu-HU" smtClean="0"/>
-              <a:t>2018.05.03.</a:t>
+              <a:t>2018. 05. 08.</a:t>
             </a:fld>
             <a:endParaRPr lang="hu-HU"/>
           </a:p>
@@ -18250,7 +17069,7 @@
           <a:p>
             <a:fld id="{745D110B-A8B4-4D6F-9F53-15EEEE70EABA}" type="datetime1">
               <a:rPr lang="hu-HU" smtClean="0"/>
-              <a:t>2018.05.03.</a:t>
+              <a:t>2018. 05. 08.</a:t>
             </a:fld>
             <a:endParaRPr lang="hu-HU"/>
           </a:p>
@@ -18415,7 +17234,7 @@
           <a:p>
             <a:fld id="{0E9E1246-F42D-4391-93BF-CD65EC295D70}" type="datetime1">
               <a:rPr lang="hu-HU" smtClean="0"/>
-              <a:t>2018.05.03.</a:t>
+              <a:t>2018. 05. 08.</a:t>
             </a:fld>
             <a:endParaRPr lang="hu-HU"/>
           </a:p>
@@ -18663,7 +17482,7 @@
           <a:p>
             <a:fld id="{216F8965-3D27-4C29-B062-C221C9BDD19E}" type="datetime1">
               <a:rPr lang="hu-HU" smtClean="0"/>
-              <a:t>2018.05.03.</a:t>
+              <a:t>2018. 05. 08.</a:t>
             </a:fld>
             <a:endParaRPr lang="hu-HU"/>
           </a:p>
@@ -18981,7 +17800,7 @@
           <a:p>
             <a:fld id="{CD0550D4-7F8F-4F3D-ACAA-0C7FCE61B443}" type="datetime1">
               <a:rPr lang="hu-HU" smtClean="0"/>
-              <a:t>2018.05.03.</a:t>
+              <a:t>2018. 05. 08.</a:t>
             </a:fld>
             <a:endParaRPr lang="hu-HU"/>
           </a:p>
@@ -19447,7 +18266,7 @@
           <a:p>
             <a:fld id="{0A00802F-11E4-4467-B8D2-881B023E3FA2}" type="datetime1">
               <a:rPr lang="hu-HU" smtClean="0"/>
-              <a:t>2018.05.03.</a:t>
+              <a:t>2018. 05. 08.</a:t>
             </a:fld>
             <a:endParaRPr lang="hu-HU"/>
           </a:p>
@@ -19595,7 +18414,7 @@
           <a:p>
             <a:fld id="{526760D5-6EA3-41BB-B2DC-1B66179CA737}" type="datetime1">
               <a:rPr lang="hu-HU" smtClean="0"/>
-              <a:t>2018.05.03.</a:t>
+              <a:t>2018. 05. 08.</a:t>
             </a:fld>
             <a:endParaRPr lang="hu-HU"/>
           </a:p>
@@ -19685,7 +18504,7 @@
           <a:p>
             <a:fld id="{C521F3E4-BBE8-4294-B0C7-2AA9F18BDD38}" type="datetime1">
               <a:rPr lang="hu-HU" smtClean="0"/>
-              <a:t>2018.05.03.</a:t>
+              <a:t>2018. 05. 08.</a:t>
             </a:fld>
             <a:endParaRPr lang="hu-HU"/>
           </a:p>
@@ -19959,7 +18778,7 @@
           <a:p>
             <a:fld id="{8E1428DC-3BB8-454A-BEAC-471D2D2D99D4}" type="datetime1">
               <a:rPr lang="hu-HU" smtClean="0"/>
-              <a:t>2018.05.03.</a:t>
+              <a:t>2018. 05. 08.</a:t>
             </a:fld>
             <a:endParaRPr lang="hu-HU"/>
           </a:p>
@@ -20264,7 +19083,7 @@
           <a:p>
             <a:fld id="{5D158F11-1E36-43DE-B108-97236FB9D039}" type="datetime1">
               <a:rPr lang="hu-HU" smtClean="0"/>
-              <a:t>2018.05.03.</a:t>
+              <a:t>2018. 05. 08.</a:t>
             </a:fld>
             <a:endParaRPr lang="hu-HU"/>
           </a:p>
@@ -20562,7 +19381,7 @@
           <a:p>
             <a:fld id="{38BB757F-CAD4-4F4A-AD43-8FDFA58FE1FA}" type="datetime1">
               <a:rPr lang="hu-HU" smtClean="0"/>
-              <a:t>2018.05.03.</a:t>
+              <a:t>2018. 05. 08.</a:t>
             </a:fld>
             <a:endParaRPr lang="hu-HU"/>
           </a:p>
@@ -22827,36 +21646,6 @@
           </a:p>
         </p:txBody>
       </p:sp>
-      <p:pic>
-        <p:nvPicPr>
-          <p:cNvPr id="5" name="Kép 4"/>
-          <p:cNvPicPr>
-            <a:picLocks noChangeAspect="1"/>
-          </p:cNvPicPr>
-          <p:nvPr/>
-        </p:nvPicPr>
-        <p:blipFill>
-          <a:blip r:embed="rId2">
-            <a:extLst>
-              <a:ext uri="{28A0092B-C50C-407E-A947-70E740481C1C}">
-                <a14:useLocalDpi xmlns:a14="http://schemas.microsoft.com/office/drawing/2010/main" val="0"/>
-              </a:ext>
-            </a:extLst>
-          </a:blip>
-          <a:stretch>
-            <a:fillRect/>
-          </a:stretch>
-        </p:blipFill>
-        <p:spPr>
-          <a:xfrm>
-            <a:off x="6507219" y="332656"/>
-            <a:ext cx="2636781" cy="2636781"/>
-          </a:xfrm>
-          <a:prstGeom prst="rect">
-            <a:avLst/>
-          </a:prstGeom>
-        </p:spPr>
-      </p:pic>
       <p:graphicFrame>
         <p:nvGraphicFramePr>
           <p:cNvPr id="8" name="Diagram 7"/>
@@ -22864,21 +21653,213 @@
           <p:nvPr>
             <p:extLst>
               <p:ext uri="{D42A27DB-BD31-4B8C-83A1-F6EECF244321}">
-                <p14:modId xmlns:p14="http://schemas.microsoft.com/office/powerpoint/2010/main" val="590125358"/>
+                <p14:modId xmlns:p14="http://schemas.microsoft.com/office/powerpoint/2010/main" val="192374218"/>
               </p:ext>
             </p:extLst>
           </p:nvPr>
         </p:nvGraphicFramePr>
         <p:xfrm>
           <a:off x="179512" y="1412776"/>
-          <a:ext cx="9324528" cy="5301208"/>
+          <a:ext cx="8507288" cy="5301208"/>
         </p:xfrm>
         <a:graphic>
           <a:graphicData uri="http://schemas.openxmlformats.org/drawingml/2006/diagram">
-            <dgm:relIds xmlns:dgm="http://schemas.openxmlformats.org/drawingml/2006/diagram" xmlns:r="http://schemas.openxmlformats.org/officeDocument/2006/relationships" r:dm="rId3" r:lo="rId4" r:qs="rId5" r:cs="rId6"/>
+            <dgm:relIds xmlns:dgm="http://schemas.openxmlformats.org/drawingml/2006/diagram" xmlns:r="http://schemas.openxmlformats.org/officeDocument/2006/relationships" r:dm="rId2" r:lo="rId3" r:qs="rId4" r:cs="rId5"/>
           </a:graphicData>
         </a:graphic>
       </p:graphicFrame>
+      <p:sp>
+        <p:nvSpPr>
+          <p:cNvPr id="3" name="Szövegdoboz 2"/>
+          <p:cNvSpPr txBox="1"/>
+          <p:nvPr/>
+        </p:nvSpPr>
+        <p:spPr>
+          <a:xfrm>
+            <a:off x="6765030" y="1694145"/>
+            <a:ext cx="1338828" cy="307777"/>
+          </a:xfrm>
+          <a:prstGeom prst="rect">
+            <a:avLst/>
+          </a:prstGeom>
+          <a:noFill/>
+        </p:spPr>
+        <p:txBody>
+          <a:bodyPr wrap="none" rtlCol="0">
+            <a:spAutoFit/>
+          </a:bodyPr>
+          <a:lstStyle/>
+          <a:p>
+            <a:r>
+              <a:rPr lang="hu-HU" sz="1400" b="1" dirty="0" smtClean="0">
+                <a:solidFill>
+                  <a:srgbClr val="C00000"/>
+                </a:solidFill>
+              </a:rPr>
+              <a:t>Rádli Richárd</a:t>
+            </a:r>
+            <a:endParaRPr lang="hu-HU" sz="1400" b="1" dirty="0">
+              <a:solidFill>
+                <a:srgbClr val="C00000"/>
+              </a:solidFill>
+            </a:endParaRPr>
+          </a:p>
+        </p:txBody>
+      </p:sp>
+      <p:sp>
+        <p:nvSpPr>
+          <p:cNvPr id="7" name="Szövegdoboz 6"/>
+          <p:cNvSpPr txBox="1"/>
+          <p:nvPr/>
+        </p:nvSpPr>
+        <p:spPr>
+          <a:xfrm>
+            <a:off x="6790242" y="2687831"/>
+            <a:ext cx="1348446" cy="954107"/>
+          </a:xfrm>
+          <a:prstGeom prst="rect">
+            <a:avLst/>
+          </a:prstGeom>
+          <a:noFill/>
+        </p:spPr>
+        <p:txBody>
+          <a:bodyPr wrap="none" rtlCol="0">
+            <a:spAutoFit/>
+          </a:bodyPr>
+          <a:lstStyle/>
+          <a:p>
+            <a:r>
+              <a:rPr lang="hu-HU" sz="1400" b="1" dirty="0" smtClean="0">
+                <a:solidFill>
+                  <a:srgbClr val="C00000"/>
+                </a:solidFill>
+              </a:rPr>
+              <a:t>Hegyi Balázs</a:t>
+            </a:r>
+          </a:p>
+          <a:p>
+            <a:r>
+              <a:rPr lang="hu-HU" sz="1400" b="1" dirty="0" smtClean="0">
+                <a:solidFill>
+                  <a:srgbClr val="C00000"/>
+                </a:solidFill>
+              </a:rPr>
+              <a:t>Hegyi Balázs</a:t>
+            </a:r>
+          </a:p>
+          <a:p>
+            <a:r>
+              <a:rPr lang="hu-HU" sz="1400" b="1" dirty="0" smtClean="0">
+                <a:solidFill>
+                  <a:srgbClr val="C00000"/>
+                </a:solidFill>
+              </a:rPr>
+              <a:t>Kápli Gergely</a:t>
+            </a:r>
+          </a:p>
+          <a:p>
+            <a:r>
+              <a:rPr lang="hu-HU" sz="1400" b="1" dirty="0" smtClean="0">
+                <a:solidFill>
+                  <a:srgbClr val="C00000"/>
+                </a:solidFill>
+              </a:rPr>
+              <a:t>Egész Csapat</a:t>
+            </a:r>
+            <a:endParaRPr lang="hu-HU" sz="1400" b="1" dirty="0">
+              <a:solidFill>
+                <a:srgbClr val="C00000"/>
+              </a:solidFill>
+            </a:endParaRPr>
+          </a:p>
+        </p:txBody>
+      </p:sp>
+      <p:sp>
+        <p:nvSpPr>
+          <p:cNvPr id="9" name="Szövegdoboz 8"/>
+          <p:cNvSpPr txBox="1"/>
+          <p:nvPr/>
+        </p:nvSpPr>
+        <p:spPr>
+          <a:xfrm>
+            <a:off x="6765030" y="4155091"/>
+            <a:ext cx="1348446" cy="523220"/>
+          </a:xfrm>
+          <a:prstGeom prst="rect">
+            <a:avLst/>
+          </a:prstGeom>
+          <a:noFill/>
+        </p:spPr>
+        <p:txBody>
+          <a:bodyPr wrap="none" rtlCol="0">
+            <a:spAutoFit/>
+          </a:bodyPr>
+          <a:lstStyle/>
+          <a:p>
+            <a:r>
+              <a:rPr lang="hu-HU" sz="1400" b="1" dirty="0" smtClean="0">
+                <a:solidFill>
+                  <a:srgbClr val="C00000"/>
+                </a:solidFill>
+              </a:rPr>
+              <a:t>Pap Réka</a:t>
+            </a:r>
+          </a:p>
+          <a:p>
+            <a:r>
+              <a:rPr lang="hu-HU" sz="1400" b="1" dirty="0" smtClean="0">
+                <a:solidFill>
+                  <a:srgbClr val="C00000"/>
+                </a:solidFill>
+              </a:rPr>
+              <a:t>Egész Csapat</a:t>
+            </a:r>
+            <a:endParaRPr lang="hu-HU" sz="1400" b="1" dirty="0">
+              <a:solidFill>
+                <a:srgbClr val="C00000"/>
+              </a:solidFill>
+            </a:endParaRPr>
+          </a:p>
+        </p:txBody>
+      </p:sp>
+      <p:sp>
+        <p:nvSpPr>
+          <p:cNvPr id="10" name="Szövegdoboz 9"/>
+          <p:cNvSpPr txBox="1"/>
+          <p:nvPr/>
+        </p:nvSpPr>
+        <p:spPr>
+          <a:xfrm>
+            <a:off x="6765030" y="5542259"/>
+            <a:ext cx="1348446" cy="307777"/>
+          </a:xfrm>
+          <a:prstGeom prst="rect">
+            <a:avLst/>
+          </a:prstGeom>
+          <a:noFill/>
+        </p:spPr>
+        <p:txBody>
+          <a:bodyPr wrap="none" rtlCol="0">
+            <a:spAutoFit/>
+          </a:bodyPr>
+          <a:lstStyle/>
+          <a:p>
+            <a:r>
+              <a:rPr lang="hu-HU" sz="1400" b="1" dirty="0" smtClean="0">
+                <a:solidFill>
+                  <a:srgbClr val="C00000"/>
+                </a:solidFill>
+              </a:rPr>
+              <a:t>Egész Csapat</a:t>
+            </a:r>
+            <a:endParaRPr lang="hu-HU" sz="1400" b="1" dirty="0">
+              <a:solidFill>
+                <a:srgbClr val="C00000"/>
+              </a:solidFill>
+            </a:endParaRPr>
+          </a:p>
+        </p:txBody>
+      </p:sp>
     </p:spTree>
     <p:extLst>
       <p:ext uri="{BB962C8B-B14F-4D97-AF65-F5344CB8AC3E}">

</xml_diff>